<commit_message>
Skills not names, SAM combined
</commit_message>
<xml_diff>
--- a/Agile_Roadmap_Template_2026.pptx
+++ b/Agile_Roadmap_Template_2026.pptx
@@ -3833,8 +3833,8 @@
         </p:nvSpPr>
         <p:spPr>
           <a:xfrm>
-            <a:off x="274320" y="3931920"/>
-            <a:ext cx="2286000" cy="2286000"/>
+            <a:off x="731520" y="3931920"/>
+            <a:ext cx="3200400" cy="2286000"/>
           </a:xfrm>
           <a:prstGeom prst="roundRect">
             <a:avLst/>
@@ -3867,38 +3867,34 @@
           <a:lstStyle/>
           <a:p>
             <a:pPr algn="ctr">
-              <a:defRPr sz="1100" b="1">
+              <a:defRPr sz="1200" b="1">
                 <a:solidFill>
                   <a:srgbClr val="1D1D4D"/>
                 </a:solidFill>
               </a:defRPr>
             </a:pPr>
             <a:r>
-              <a:t>Growth (5)</a:t>
+              <a:t>Growth</a:t>
             </a:r>
           </a:p>
           <a:p>
             <a:pPr algn="l">
-              <a:defRPr sz="900">
+              <a:defRPr sz="1100">
                 <a:solidFill>
                   <a:srgbClr val="1D1D4D"/>
                 </a:solidFill>
               </a:defRPr>
             </a:pPr>
             <a:r>
-              <a:t>Steven Warner - BA</a:t>
+              <a:t>1x BA</a:t>
             </a:r>
             <a:br/>
             <a:r>
-              <a:t>Chirag Kalra - SM (Apr)</a:t>
+              <a:t>2x Delivery</a:t>
             </a:r>
             <a:br/>
             <a:r>
-              <a:t>Bharath Mahesh - QE</a:t>
-            </a:r>
-            <a:br/>
-            <a:r>
-              <a:t>Rahul Yaruva - QE</a:t>
+              <a:t>2x QE</a:t>
             </a:r>
           </a:p>
         </p:txBody>
@@ -3911,8 +3907,8 @@
         </p:nvSpPr>
         <p:spPr>
           <a:xfrm>
-            <a:off x="2651760" y="3931920"/>
-            <a:ext cx="2286000" cy="2286000"/>
+            <a:off x="4480560" y="3931920"/>
+            <a:ext cx="3200400" cy="2286000"/>
           </a:xfrm>
           <a:prstGeom prst="roundRect">
             <a:avLst/>
@@ -3945,42 +3941,34 @@
           <a:lstStyle/>
           <a:p>
             <a:pPr algn="ctr">
-              <a:defRPr sz="1100" b="1">
+              <a:defRPr sz="1200" b="1">
                 <a:solidFill>
                   <a:srgbClr val="1D1D4D"/>
                 </a:solidFill>
               </a:defRPr>
             </a:pPr>
             <a:r>
-              <a:t>Brochureware (5)</a:t>
+              <a:t>Brochureware</a:t>
             </a:r>
           </a:p>
           <a:p>
             <a:pPr algn="l">
-              <a:defRPr sz="900">
+              <a:defRPr sz="1100">
                 <a:solidFill>
                   <a:srgbClr val="1D1D4D"/>
                 </a:solidFill>
               </a:defRPr>
             </a:pPr>
             <a:r>
-              <a:t>Lee Keegan - .NET Dev</a:t>
+              <a:t>1x BA</a:t>
             </a:r>
             <a:br/>
             <a:r>
-              <a:t>Shona Stewart - BA</a:t>
+              <a:t>2x .NET Dev</a:t>
             </a:r>
             <a:br/>
             <a:r>
-              <a:t>Gopi Doli - .NET Dev</a:t>
-            </a:r>
-            <a:br/>
-            <a:r>
-              <a:t>Hrushikesh Kadu - QE</a:t>
-            </a:r>
-            <a:br/>
-            <a:r>
-              <a:t>Saurabh Mohanrao - QE</a:t>
+              <a:t>2x QE</a:t>
             </a:r>
           </a:p>
         </p:txBody>
@@ -3993,8 +3981,8 @@
         </p:nvSpPr>
         <p:spPr>
           <a:xfrm>
-            <a:off x="5029200" y="3931920"/>
-            <a:ext cx="2377440" cy="2286000"/>
+            <a:off x="8229600" y="3931920"/>
+            <a:ext cx="3474720" cy="2286000"/>
           </a:xfrm>
           <a:prstGeom prst="roundRect">
             <a:avLst/>
@@ -4027,70 +4015,62 @@
           <a:lstStyle/>
           <a:p>
             <a:pPr algn="ctr">
-              <a:defRPr sz="1100" b="1">
+              <a:defRPr sz="1200" b="1">
                 <a:solidFill>
                   <a:srgbClr val="1D1D4D"/>
                 </a:solidFill>
               </a:defRPr>
             </a:pPr>
             <a:r>
-              <a:t>SAM Collate (7)</a:t>
+              <a:t>SAM Replacement</a:t>
             </a:r>
           </a:p>
           <a:p>
             <a:pPr algn="l">
-              <a:defRPr sz="800">
+              <a:defRPr sz="1100">
                 <a:solidFill>
                   <a:srgbClr val="1D1D4D"/>
                 </a:solidFill>
               </a:defRPr>
             </a:pPr>
             <a:r>
-              <a:t>Prashant Nair - PM</a:t>
+              <a:t>3x BA</a:t>
             </a:r>
             <a:br/>
             <a:r>
-              <a:t>Sathiya Krishnaraj - Design</a:t>
+              <a:t>2x Delivery</a:t>
             </a:r>
             <a:br/>
             <a:r>
-              <a:t>Mark Butler - BA</a:t>
+              <a:t>1x Design</a:t>
             </a:r>
             <a:br/>
             <a:r>
-              <a:t>Silpa Revuru - Java</a:t>
+              <a:t>3x Java Dev</a:t>
             </a:r>
             <a:br/>
             <a:r>
-              <a:t>Arun Rajan - QE (Apr)</a:t>
-            </a:r>
-            <a:br/>
-            <a:r>
-              <a:t>Arnab Purakayestha - QE (May)</a:t>
-            </a:r>
-            <a:br/>
-            <a:r>
-              <a:t>Monisha Behera - QE (Jun)</a:t>
-            </a:r>
-          </a:p>
-        </p:txBody>
-      </p:sp>
-      <p:sp>
-        <p:nvSpPr>
-          <p:cNvPr id="19" name="Rounded Rectangle 18"/>
-          <p:cNvSpPr/>
-          <p:nvPr/>
-        </p:nvSpPr>
-        <p:spPr>
-          <a:xfrm>
-            <a:off x="7498079" y="3931920"/>
-            <a:ext cx="2286000" cy="2286000"/>
-          </a:xfrm>
-          <a:prstGeom prst="roundRect">
-            <a:avLst/>
-          </a:prstGeom>
-          <a:solidFill>
-            <a:srgbClr val="E6EEF5"/>
+              <a:t>7x QE</a:t>
+            </a:r>
+          </a:p>
+        </p:txBody>
+      </p:sp>
+      <p:sp>
+        <p:nvSpPr>
+          <p:cNvPr id="19" name="Rectangle 18"/>
+          <p:cNvSpPr/>
+          <p:nvPr/>
+        </p:nvSpPr>
+        <p:spPr>
+          <a:xfrm>
+            <a:off x="9601200" y="731520"/>
+            <a:ext cx="2286000" cy="1371600"/>
+          </a:xfrm>
+          <a:prstGeom prst="rect">
+            <a:avLst/>
+          </a:prstGeom>
+          <a:solidFill>
+            <a:srgbClr val="FFFFFF"/>
           </a:solidFill>
           <a:ln>
             <a:solidFill>
@@ -4124,163 +4104,7 @@
               </a:defRPr>
             </a:pPr>
             <a:r>
-              <a:t>SAM Squad 1 (6)</a:t>
-            </a:r>
-          </a:p>
-          <a:p>
-            <a:pPr algn="l">
-              <a:defRPr sz="900">
-                <a:solidFill>
-                  <a:srgbClr val="1D1D4D"/>
-                </a:solidFill>
-              </a:defRPr>
-            </a:pPr>
-            <a:r>
-              <a:t>Shailesh Ranjan - Lead</a:t>
-            </a:r>
-            <a:br/>
-            <a:r>
-              <a:t>Gail Miller - BA</a:t>
-            </a:r>
-            <a:br/>
-            <a:r>
-              <a:t>Rishi Kant Thakur - Java</a:t>
-            </a:r>
-            <a:br/>
-            <a:r>
-              <a:t>Java Gap (Jun)</a:t>
-            </a:r>
-            <a:br/>
-            <a:r>
-              <a:t>2x QE Gap (Jun)</a:t>
-            </a:r>
-          </a:p>
-        </p:txBody>
-      </p:sp>
-      <p:sp>
-        <p:nvSpPr>
-          <p:cNvPr id="20" name="Rounded Rectangle 19"/>
-          <p:cNvSpPr/>
-          <p:nvPr/>
-        </p:nvSpPr>
-        <p:spPr>
-          <a:xfrm>
-            <a:off x="9875520" y="3931920"/>
-            <a:ext cx="2011680" cy="2286000"/>
-          </a:xfrm>
-          <a:prstGeom prst="roundRect">
-            <a:avLst/>
-          </a:prstGeom>
-          <a:solidFill>
-            <a:srgbClr val="E6EEF5"/>
-          </a:solidFill>
-          <a:ln>
-            <a:solidFill>
-              <a:srgbClr val="1D1D4D"/>
-            </a:solidFill>
-          </a:ln>
-        </p:spPr>
-        <p:style>
-          <a:lnRef idx="1">
-            <a:schemeClr val="accent1"/>
-          </a:lnRef>
-          <a:fillRef idx="3">
-            <a:schemeClr val="accent1"/>
-          </a:fillRef>
-          <a:effectRef idx="2">
-            <a:schemeClr val="accent1"/>
-          </a:effectRef>
-          <a:fontRef idx="minor">
-            <a:schemeClr val="lt1"/>
-          </a:fontRef>
-        </p:style>
-        <p:txBody>
-          <a:bodyPr rtlCol="0" anchor="ctr" wrap="square"/>
-          <a:lstStyle/>
-          <a:p>
-            <a:pPr algn="ctr">
-              <a:defRPr sz="1100" b="1">
-                <a:solidFill>
-                  <a:srgbClr val="1D1D4D"/>
-                </a:solidFill>
-              </a:defRPr>
-            </a:pPr>
-            <a:r>
-              <a:t>SAM Squad 2 (3)</a:t>
-            </a:r>
-          </a:p>
-          <a:p>
-            <a:pPr algn="l">
-              <a:defRPr sz="900">
-                <a:solidFill>
-                  <a:srgbClr val="1D1D4D"/>
-                </a:solidFill>
-              </a:defRPr>
-            </a:pPr>
-            <a:r>
-              <a:t>Craig Studley - BA</a:t>
-            </a:r>
-            <a:br/>
-            <a:r>
-              <a:t>Ganesh Tallapudi - QE (Apr)</a:t>
-            </a:r>
-            <a:br/>
-            <a:r>
-              <a:t>QE Gap (Jun)</a:t>
-            </a:r>
-          </a:p>
-        </p:txBody>
-      </p:sp>
-      <p:sp>
-        <p:nvSpPr>
-          <p:cNvPr id="21" name="Rectangle 20"/>
-          <p:cNvSpPr/>
-          <p:nvPr/>
-        </p:nvSpPr>
-        <p:spPr>
-          <a:xfrm>
-            <a:off x="9418320" y="731520"/>
-            <a:ext cx="2468880" cy="1645920"/>
-          </a:xfrm>
-          <a:prstGeom prst="rect">
-            <a:avLst/>
-          </a:prstGeom>
-          <a:solidFill>
-            <a:srgbClr val="FFFFFF"/>
-          </a:solidFill>
-          <a:ln>
-            <a:solidFill>
-              <a:srgbClr val="1D1D4D"/>
-            </a:solidFill>
-          </a:ln>
-        </p:spPr>
-        <p:style>
-          <a:lnRef idx="1">
-            <a:schemeClr val="accent1"/>
-          </a:lnRef>
-          <a:fillRef idx="3">
-            <a:schemeClr val="accent1"/>
-          </a:fillRef>
-          <a:effectRef idx="2">
-            <a:schemeClr val="accent1"/>
-          </a:effectRef>
-          <a:fontRef idx="minor">
-            <a:schemeClr val="lt1"/>
-          </a:fontRef>
-        </p:style>
-        <p:txBody>
-          <a:bodyPr rtlCol="0" anchor="ctr" wrap="square"/>
-          <a:lstStyle/>
-          <a:p>
-            <a:pPr algn="ctr">
-              <a:defRPr sz="1100" b="1">
-                <a:solidFill>
-                  <a:srgbClr val="1D1D4D"/>
-                </a:solidFill>
-              </a:defRPr>
-            </a:pPr>
-            <a:r>
-              <a:t>FY27 Team: 26 FTE</a:t>
+              <a:t>FY27: 26 FTE</a:t>
             </a:r>
           </a:p>
           <a:p>
@@ -4317,31 +4141,7 @@
               </a:defRPr>
             </a:pPr>
             <a:r>
-              <a:t>SAM Collate: 7</a:t>
-            </a:r>
-          </a:p>
-          <a:p>
-            <a:pPr>
-              <a:defRPr sz="1000">
-                <a:solidFill>
-                  <a:srgbClr val="1D1D4D"/>
-                </a:solidFill>
-              </a:defRPr>
-            </a:pPr>
-            <a:r>
-              <a:t>SAM Squad 1: 6</a:t>
-            </a:r>
-          </a:p>
-          <a:p>
-            <a:pPr>
-              <a:defRPr sz="1000">
-                <a:solidFill>
-                  <a:srgbClr val="1D1D4D"/>
-                </a:solidFill>
-              </a:defRPr>
-            </a:pPr>
-            <a:r>
-              <a:t>SAM Squad 2: 3</a:t>
+              <a:t>SAM: 16</a:t>
             </a:r>
           </a:p>
         </p:txBody>

</xml_diff>

<commit_message>
Added quarterly releases from Jira
</commit_message>
<xml_diff>
--- a/Agile_Roadmap_Template_2026.pptx
+++ b/Agile_Roadmap_Template_2026.pptx
@@ -4676,7 +4676,7 @@
         <p:spPr>
           <a:xfrm>
             <a:off x="0" y="1280160"/>
-            <a:ext cx="12188952" cy="1005840"/>
+            <a:ext cx="12188952" cy="914400"/>
           </a:xfrm>
           <a:prstGeom prst="rect">
             <a:avLst/>
@@ -4824,6 +4824,10 @@
             <a:r>
               <a:t>Go Live</a:t>
             </a:r>
+            <a:br/>
+            <a:r>
+              <a:t>11 Feb</a:t>
+            </a:r>
           </a:p>
         </p:txBody>
       </p:sp>
@@ -4835,8 +4839,8 @@
         </p:nvSpPr>
         <p:spPr>
           <a:xfrm>
-            <a:off x="0" y="2286000"/>
-            <a:ext cx="12188952" cy="1005840"/>
+            <a:off x="0" y="2194560"/>
+            <a:ext cx="12188952" cy="914400"/>
           </a:xfrm>
           <a:prstGeom prst="rect">
             <a:avLst/>
@@ -4878,7 +4882,7 @@
         </p:nvSpPr>
         <p:spPr>
           <a:xfrm>
-            <a:off x="182880" y="2468880"/>
+            <a:off x="182880" y="2377440"/>
             <a:ext cx="1645920" cy="731520"/>
           </a:xfrm>
           <a:prstGeom prst="rect">
@@ -4917,7 +4921,7 @@
         </p:nvSpPr>
         <p:spPr>
           <a:xfrm>
-            <a:off x="3913632" y="2606040"/>
+            <a:off x="3913632" y="2514600"/>
             <a:ext cx="146304" cy="146304"/>
           </a:xfrm>
           <a:prstGeom prst="diamond">
@@ -4960,7 +4964,7 @@
         </p:nvSpPr>
         <p:spPr>
           <a:xfrm>
-            <a:off x="3529584" y="2743200"/>
+            <a:off x="3529584" y="2651760"/>
             <a:ext cx="1097280" cy="457200"/>
           </a:xfrm>
           <a:prstGeom prst="rect">
@@ -4984,6 +4988,10 @@
             <a:r>
               <a:t>CBIS Rebrand</a:t>
             </a:r>
+            <a:br/>
+            <a:r>
+              <a:t>10 Feb</a:t>
+            </a:r>
           </a:p>
         </p:txBody>
       </p:sp>
@@ -4995,7 +5003,7 @@
         </p:nvSpPr>
         <p:spPr>
           <a:xfrm>
-            <a:off x="4407408" y="2606040"/>
+            <a:off x="5230368" y="2514600"/>
             <a:ext cx="146304" cy="146304"/>
           </a:xfrm>
           <a:prstGeom prst="diamond">
@@ -5038,7 +5046,7 @@
         </p:nvSpPr>
         <p:spPr>
           <a:xfrm>
-            <a:off x="4023360" y="2743200"/>
+            <a:off x="4846320" y="2651760"/>
             <a:ext cx="1097280" cy="457200"/>
           </a:xfrm>
           <a:prstGeom prst="rect">
@@ -5062,6 +5070,10 @@
             <a:r>
               <a:t>Re-platform</a:t>
             </a:r>
+            <a:br/>
+            <a:r>
+              <a:t>2 Apr</a:t>
+            </a:r>
           </a:p>
         </p:txBody>
       </p:sp>
@@ -5073,7 +5085,7 @@
         </p:nvSpPr>
         <p:spPr>
           <a:xfrm>
-            <a:off x="5230368" y="2606040"/>
+            <a:off x="5394960" y="2514600"/>
             <a:ext cx="146304" cy="146304"/>
           </a:xfrm>
           <a:prstGeom prst="diamond">
@@ -5116,7 +5128,7 @@
         </p:nvSpPr>
         <p:spPr>
           <a:xfrm>
-            <a:off x="4846320" y="2743200"/>
+            <a:off x="5010912" y="2651760"/>
             <a:ext cx="1097280" cy="457200"/>
           </a:xfrm>
           <a:prstGeom prst="rect">
@@ -5138,7 +5150,11 @@
               </a:defRPr>
             </a:pPr>
             <a:r>
-              <a:t>FSMA Cutover</a:t>
+              <a:t>FSMA</a:t>
+            </a:r>
+            <a:br/>
+            <a:r>
+              <a:t>7 Apr</a:t>
             </a:r>
           </a:p>
         </p:txBody>
@@ -5151,8 +5167,8 @@
         </p:nvSpPr>
         <p:spPr>
           <a:xfrm>
-            <a:off x="0" y="3291840"/>
-            <a:ext cx="12188952" cy="1005840"/>
+            <a:off x="0" y="3108960"/>
+            <a:ext cx="12188952" cy="914400"/>
           </a:xfrm>
           <a:prstGeom prst="rect">
             <a:avLst/>
@@ -5194,7 +5210,7 @@
         </p:nvSpPr>
         <p:spPr>
           <a:xfrm>
-            <a:off x="182880" y="3474720"/>
+            <a:off x="182880" y="3291840"/>
             <a:ext cx="1645920" cy="731520"/>
           </a:xfrm>
           <a:prstGeom prst="rect">
@@ -5216,11 +5232,11 @@
               </a:defRPr>
             </a:pPr>
             <a:r>
-              <a:t>Growth</a:t>
+              <a:t>Brochureware</a:t>
             </a:r>
             <a:br/>
             <a:r>
-              <a:t>Ops</a:t>
+              <a:t>BAU</a:t>
             </a:r>
           </a:p>
         </p:txBody>
@@ -5233,7 +5249,7 @@
         </p:nvSpPr>
         <p:spPr>
           <a:xfrm>
-            <a:off x="4242816" y="3611880"/>
+            <a:off x="4407408" y="3429000"/>
             <a:ext cx="146304" cy="146304"/>
           </a:xfrm>
           <a:prstGeom prst="diamond">
@@ -5276,7 +5292,7 @@
         </p:nvSpPr>
         <p:spPr>
           <a:xfrm>
-            <a:off x="3858768" y="3749039"/>
+            <a:off x="4023360" y="3566160"/>
             <a:ext cx="1097280" cy="457200"/>
           </a:xfrm>
           <a:prstGeom prst="rect">
@@ -5298,27 +5314,31 @@
               </a:defRPr>
             </a:pPr>
             <a:r>
-              <a:t>10to8 &amp; Live Chat</a:t>
-            </a:r>
-          </a:p>
-        </p:txBody>
-      </p:sp>
-      <p:sp>
-        <p:nvSpPr>
-          <p:cNvPr id="29" name="Rectangle 28"/>
-          <p:cNvSpPr/>
-          <p:nvPr/>
-        </p:nvSpPr>
-        <p:spPr>
-          <a:xfrm>
-            <a:off x="0" y="4297680"/>
-            <a:ext cx="12188952" cy="1005840"/>
-          </a:xfrm>
-          <a:prstGeom prst="rect">
-            <a:avLst/>
-          </a:prstGeom>
-          <a:solidFill>
-            <a:srgbClr val="FFFFFF"/>
+              <a:t>Budget</a:t>
+            </a:r>
+            <a:br/>
+            <a:r>
+              <a:t>19 Feb</a:t>
+            </a:r>
+          </a:p>
+        </p:txBody>
+      </p:sp>
+      <p:sp>
+        <p:nvSpPr>
+          <p:cNvPr id="29" name="Diamond 28"/>
+          <p:cNvSpPr/>
+          <p:nvPr/>
+        </p:nvSpPr>
+        <p:spPr>
+          <a:xfrm>
+            <a:off x="5724144" y="3429000"/>
+            <a:ext cx="146304" cy="146304"/>
+          </a:xfrm>
+          <a:prstGeom prst="diamond">
+            <a:avLst/>
+          </a:prstGeom>
+          <a:solidFill>
+            <a:srgbClr val="1D1D4D"/>
           </a:solidFill>
           <a:ln>
             <a:noFill/>
@@ -5354,8 +5374,8 @@
         </p:nvSpPr>
         <p:spPr>
           <a:xfrm>
-            <a:off x="182880" y="4480560"/>
-            <a:ext cx="1645920" cy="731520"/>
+            <a:off x="5340096" y="3566160"/>
+            <a:ext cx="1097280" cy="457200"/>
           </a:xfrm>
           <a:prstGeom prst="rect">
             <a:avLst/>
@@ -5368,19 +5388,19 @@
           </a:bodyPr>
           <a:lstStyle/>
           <a:p>
-            <a:pPr>
-              <a:defRPr sz="1100" b="1">
+            <a:pPr algn="ctr">
+              <a:defRPr sz="800">
                 <a:solidFill>
                   <a:srgbClr val="1D1D4D"/>
                 </a:solidFill>
               </a:defRPr>
             </a:pPr>
             <a:r>
-              <a:t>Growth</a:t>
+              <a:t>PTO Synergy</a:t>
             </a:r>
             <a:br/>
             <a:r>
-              <a:t>Comms</a:t>
+              <a:t>30 Apr</a:t>
             </a:r>
           </a:p>
         </p:txBody>
@@ -5393,14 +5413,14 @@
         </p:nvSpPr>
         <p:spPr>
           <a:xfrm>
-            <a:off x="4572000" y="4617720"/>
+            <a:off x="6217920" y="3429000"/>
             <a:ext cx="146304" cy="146304"/>
           </a:xfrm>
           <a:prstGeom prst="diamond">
             <a:avLst/>
           </a:prstGeom>
           <a:solidFill>
-            <a:srgbClr val="FF991F"/>
+            <a:srgbClr val="1D1D4D"/>
           </a:solidFill>
           <a:ln>
             <a:noFill/>
@@ -5436,7 +5456,7 @@
         </p:nvSpPr>
         <p:spPr>
           <a:xfrm>
-            <a:off x="4187952" y="4754880"/>
+            <a:off x="5833872" y="3566160"/>
             <a:ext cx="1097280" cy="457200"/>
           </a:xfrm>
           <a:prstGeom prst="rect">
@@ -5458,7 +5478,11 @@
               </a:defRPr>
             </a:pPr>
             <a:r>
-              <a:t>Broker Comms Strategy</a:t>
+              <a:t>VM Indirect</a:t>
+            </a:r>
+            <a:br/>
+            <a:r>
+              <a:t>31 May</a:t>
             </a:r>
           </a:p>
         </p:txBody>
@@ -5471,14 +5495,14 @@
         </p:nvSpPr>
         <p:spPr>
           <a:xfrm>
-            <a:off x="0" y="5303520"/>
-            <a:ext cx="12188952" cy="1005840"/>
-          </a:xfrm>
-          <a:prstGeom prst="rect">
-            <a:avLst/>
-          </a:prstGeom>
-          <a:solidFill>
-            <a:srgbClr val="E6EEF5"/>
+            <a:off x="0" y="4023360"/>
+            <a:ext cx="12188952" cy="914400"/>
+          </a:xfrm>
+          <a:prstGeom prst="rect">
+            <a:avLst/>
+          </a:prstGeom>
+          <a:solidFill>
+            <a:srgbClr val="FFFFFF"/>
           </a:solidFill>
           <a:ln>
             <a:noFill/>
@@ -5514,7 +5538,7 @@
         </p:nvSpPr>
         <p:spPr>
           <a:xfrm>
-            <a:off x="182880" y="5486400"/>
+            <a:off x="182880" y="4206240"/>
             <a:ext cx="1645920" cy="731520"/>
           </a:xfrm>
           <a:prstGeom prst="rect">
@@ -5536,11 +5560,11 @@
               </a:defRPr>
             </a:pPr>
             <a:r>
-              <a:t>SAM</a:t>
+              <a:t>Growth</a:t>
             </a:r>
             <a:br/>
             <a:r>
-              <a:t>Replacement</a:t>
+              <a:t>Releases</a:t>
             </a:r>
           </a:p>
         </p:txBody>
@@ -5553,7 +5577,7 @@
         </p:nvSpPr>
         <p:spPr>
           <a:xfrm>
-            <a:off x="4407408" y="5623560"/>
+            <a:off x="4242816" y="4343400"/>
             <a:ext cx="146304" cy="146304"/>
           </a:xfrm>
           <a:prstGeom prst="diamond">
@@ -5596,7 +5620,7 @@
         </p:nvSpPr>
         <p:spPr>
           <a:xfrm>
-            <a:off x="4023360" y="5760720"/>
+            <a:off x="3858768" y="4480560"/>
             <a:ext cx="1097280" cy="457200"/>
           </a:xfrm>
           <a:prstGeom prst="rect">
@@ -5618,7 +5642,11 @@
               </a:defRPr>
             </a:pPr>
             <a:r>
-              <a:t>Discovery</a:t>
+              <a:t>10to8</a:t>
+            </a:r>
+            <a:br/>
+            <a:r>
+              <a:t>18 Feb</a:t>
             </a:r>
           </a:p>
         </p:txBody>
@@ -5631,7 +5659,7 @@
         </p:nvSpPr>
         <p:spPr>
           <a:xfrm>
-            <a:off x="5230368" y="5623560"/>
+            <a:off x="6793992" y="4343400"/>
             <a:ext cx="146304" cy="146304"/>
           </a:xfrm>
           <a:prstGeom prst="diamond">
@@ -5674,7 +5702,7 @@
         </p:nvSpPr>
         <p:spPr>
           <a:xfrm>
-            <a:off x="4846320" y="5760720"/>
+            <a:off x="6409944" y="4480560"/>
             <a:ext cx="1097280" cy="457200"/>
           </a:xfrm>
           <a:prstGeom prst="rect">
@@ -5696,7 +5724,11 @@
               </a:defRPr>
             </a:pPr>
             <a:r>
-              <a:t>Decision</a:t>
+              <a:t>Q2 Release</a:t>
+            </a:r>
+            <a:br/>
+            <a:r>
+              <a:t>30 Jun</a:t>
             </a:r>
           </a:p>
         </p:txBody>
@@ -5709,14 +5741,14 @@
         </p:nvSpPr>
         <p:spPr>
           <a:xfrm>
-            <a:off x="6876288" y="5623560"/>
+            <a:off x="8439912" y="4343400"/>
             <a:ext cx="146304" cy="146304"/>
           </a:xfrm>
           <a:prstGeom prst="diamond">
             <a:avLst/>
           </a:prstGeom>
           <a:solidFill>
-            <a:srgbClr val="FF991F"/>
+            <a:srgbClr val="1D1D4D"/>
           </a:solidFill>
           <a:ln>
             <a:noFill/>
@@ -5752,7 +5784,7 @@
         </p:nvSpPr>
         <p:spPr>
           <a:xfrm>
-            <a:off x="6492240" y="5760720"/>
+            <a:off x="8055864" y="4480560"/>
             <a:ext cx="1097280" cy="457200"/>
           </a:xfrm>
           <a:prstGeom prst="rect">
@@ -5774,7 +5806,11 @@
               </a:defRPr>
             </a:pPr>
             <a:r>
-              <a:t>Implementation</a:t>
+              <a:t>Q3 Release</a:t>
+            </a:r>
+            <a:br/>
+            <a:r>
+              <a:t>30 Sep</a:t>
             </a:r>
           </a:p>
         </p:txBody>
@@ -5787,7 +5823,7 @@
         </p:nvSpPr>
         <p:spPr>
           <a:xfrm>
-            <a:off x="9838944" y="5623560"/>
+            <a:off x="10661903" y="4343400"/>
             <a:ext cx="146304" cy="146304"/>
           </a:xfrm>
           <a:prstGeom prst="diamond">
@@ -5830,7 +5866,7 @@
         </p:nvSpPr>
         <p:spPr>
           <a:xfrm>
-            <a:off x="9454896" y="5760720"/>
+            <a:off x="10277855" y="4480560"/>
             <a:ext cx="1097280" cy="457200"/>
           </a:xfrm>
           <a:prstGeom prst="rect">
@@ -5852,7 +5888,11 @@
               </a:defRPr>
             </a:pPr>
             <a:r>
-              <a:t>Go Live</a:t>
+              <a:t>FY27</a:t>
+            </a:r>
+            <a:br/>
+            <a:r>
+              <a:t>24 Mar</a:t>
             </a:r>
           </a:p>
         </p:txBody>
@@ -5865,14 +5905,14 @@
         </p:nvSpPr>
         <p:spPr>
           <a:xfrm>
-            <a:off x="3749039" y="822960"/>
-            <a:ext cx="18288" cy="5029200"/>
-          </a:xfrm>
-          <a:prstGeom prst="rect">
-            <a:avLst/>
-          </a:prstGeom>
-          <a:solidFill>
-            <a:srgbClr val="E50050"/>
+            <a:off x="0" y="4937760"/>
+            <a:ext cx="12188952" cy="914400"/>
+          </a:xfrm>
+          <a:prstGeom prst="rect">
+            <a:avLst/>
+          </a:prstGeom>
+          <a:solidFill>
+            <a:srgbClr val="E6EEF5"/>
           </a:solidFill>
           <a:ln>
             <a:noFill/>
@@ -5903,6 +5943,334 @@
       <p:sp>
         <p:nvSpPr>
           <p:cNvPr id="44" name="TextBox 43"/>
+          <p:cNvSpPr txBox="1"/>
+          <p:nvPr/>
+        </p:nvSpPr>
+        <p:spPr>
+          <a:xfrm>
+            <a:off x="182880" y="5120640"/>
+            <a:ext cx="1645920" cy="731520"/>
+          </a:xfrm>
+          <a:prstGeom prst="rect">
+            <a:avLst/>
+          </a:prstGeom>
+          <a:noFill/>
+        </p:spPr>
+        <p:txBody>
+          <a:bodyPr wrap="square">
+            <a:spAutoFit/>
+          </a:bodyPr>
+          <a:lstStyle/>
+          <a:p>
+            <a:pPr>
+              <a:defRPr sz="1100" b="1">
+                <a:solidFill>
+                  <a:srgbClr val="1D1D4D"/>
+                </a:solidFill>
+              </a:defRPr>
+            </a:pPr>
+            <a:r>
+              <a:t>SAM</a:t>
+            </a:r>
+            <a:br/>
+            <a:r>
+              <a:t>Replacement</a:t>
+            </a:r>
+          </a:p>
+        </p:txBody>
+      </p:sp>
+      <p:sp>
+        <p:nvSpPr>
+          <p:cNvPr id="45" name="Diamond 44"/>
+          <p:cNvSpPr/>
+          <p:nvPr/>
+        </p:nvSpPr>
+        <p:spPr>
+          <a:xfrm>
+            <a:off x="4901184" y="5257800"/>
+            <a:ext cx="146304" cy="146304"/>
+          </a:xfrm>
+          <a:prstGeom prst="diamond">
+            <a:avLst/>
+          </a:prstGeom>
+          <a:solidFill>
+            <a:srgbClr val="1D1D4D"/>
+          </a:solidFill>
+          <a:ln>
+            <a:noFill/>
+          </a:ln>
+        </p:spPr>
+        <p:style>
+          <a:lnRef idx="1">
+            <a:schemeClr val="accent1"/>
+          </a:lnRef>
+          <a:fillRef idx="3">
+            <a:schemeClr val="accent1"/>
+          </a:fillRef>
+          <a:effectRef idx="2">
+            <a:schemeClr val="accent1"/>
+          </a:effectRef>
+          <a:fontRef idx="minor">
+            <a:schemeClr val="lt1"/>
+          </a:fontRef>
+        </p:style>
+        <p:txBody>
+          <a:bodyPr rtlCol="0" anchor="ctr"/>
+          <a:lstStyle/>
+          <a:p>
+            <a:pPr algn="ctr"/>
+          </a:p>
+        </p:txBody>
+      </p:sp>
+      <p:sp>
+        <p:nvSpPr>
+          <p:cNvPr id="46" name="TextBox 45"/>
+          <p:cNvSpPr txBox="1"/>
+          <p:nvPr/>
+        </p:nvSpPr>
+        <p:spPr>
+          <a:xfrm>
+            <a:off x="4517136" y="5394960"/>
+            <a:ext cx="1097280" cy="457200"/>
+          </a:xfrm>
+          <a:prstGeom prst="rect">
+            <a:avLst/>
+          </a:prstGeom>
+          <a:noFill/>
+        </p:spPr>
+        <p:txBody>
+          <a:bodyPr wrap="square">
+            <a:spAutoFit/>
+          </a:bodyPr>
+          <a:lstStyle/>
+          <a:p>
+            <a:pPr algn="ctr">
+              <a:defRPr sz="800">
+                <a:solidFill>
+                  <a:srgbClr val="1D1D4D"/>
+                </a:solidFill>
+              </a:defRPr>
+            </a:pPr>
+            <a:r>
+              <a:t>Discovery</a:t>
+            </a:r>
+            <a:br/>
+            <a:r>
+              <a:t>27 Feb</a:t>
+            </a:r>
+          </a:p>
+        </p:txBody>
+      </p:sp>
+      <p:sp>
+        <p:nvSpPr>
+          <p:cNvPr id="47" name="Diamond 46"/>
+          <p:cNvSpPr/>
+          <p:nvPr/>
+        </p:nvSpPr>
+        <p:spPr>
+          <a:xfrm>
+            <a:off x="5230368" y="5257800"/>
+            <a:ext cx="146304" cy="146304"/>
+          </a:xfrm>
+          <a:prstGeom prst="diamond">
+            <a:avLst/>
+          </a:prstGeom>
+          <a:solidFill>
+            <a:srgbClr val="1D1D4D"/>
+          </a:solidFill>
+          <a:ln>
+            <a:noFill/>
+          </a:ln>
+        </p:spPr>
+        <p:style>
+          <a:lnRef idx="1">
+            <a:schemeClr val="accent1"/>
+          </a:lnRef>
+          <a:fillRef idx="3">
+            <a:schemeClr val="accent1"/>
+          </a:fillRef>
+          <a:effectRef idx="2">
+            <a:schemeClr val="accent1"/>
+          </a:effectRef>
+          <a:fontRef idx="minor">
+            <a:schemeClr val="lt1"/>
+          </a:fontRef>
+        </p:style>
+        <p:txBody>
+          <a:bodyPr rtlCol="0" anchor="ctr"/>
+          <a:lstStyle/>
+          <a:p>
+            <a:pPr algn="ctr"/>
+          </a:p>
+        </p:txBody>
+      </p:sp>
+      <p:sp>
+        <p:nvSpPr>
+          <p:cNvPr id="48" name="TextBox 47"/>
+          <p:cNvSpPr txBox="1"/>
+          <p:nvPr/>
+        </p:nvSpPr>
+        <p:spPr>
+          <a:xfrm>
+            <a:off x="4846320" y="5394960"/>
+            <a:ext cx="1097280" cy="457200"/>
+          </a:xfrm>
+          <a:prstGeom prst="rect">
+            <a:avLst/>
+          </a:prstGeom>
+          <a:noFill/>
+        </p:spPr>
+        <p:txBody>
+          <a:bodyPr wrap="square">
+            <a:spAutoFit/>
+          </a:bodyPr>
+          <a:lstStyle/>
+          <a:p>
+            <a:pPr algn="ctr">
+              <a:defRPr sz="800">
+                <a:solidFill>
+                  <a:srgbClr val="1D1D4D"/>
+                </a:solidFill>
+              </a:defRPr>
+            </a:pPr>
+            <a:r>
+              <a:t>Decision</a:t>
+            </a:r>
+            <a:br/>
+            <a:r>
+              <a:t>3 Apr</a:t>
+            </a:r>
+          </a:p>
+        </p:txBody>
+      </p:sp>
+      <p:sp>
+        <p:nvSpPr>
+          <p:cNvPr id="49" name="Diamond 48"/>
+          <p:cNvSpPr/>
+          <p:nvPr/>
+        </p:nvSpPr>
+        <p:spPr>
+          <a:xfrm>
+            <a:off x="9838944" y="5257800"/>
+            <a:ext cx="146304" cy="146304"/>
+          </a:xfrm>
+          <a:prstGeom prst="diamond">
+            <a:avLst/>
+          </a:prstGeom>
+          <a:solidFill>
+            <a:srgbClr val="FF991F"/>
+          </a:solidFill>
+          <a:ln>
+            <a:noFill/>
+          </a:ln>
+        </p:spPr>
+        <p:style>
+          <a:lnRef idx="1">
+            <a:schemeClr val="accent1"/>
+          </a:lnRef>
+          <a:fillRef idx="3">
+            <a:schemeClr val="accent1"/>
+          </a:fillRef>
+          <a:effectRef idx="2">
+            <a:schemeClr val="accent1"/>
+          </a:effectRef>
+          <a:fontRef idx="minor">
+            <a:schemeClr val="lt1"/>
+          </a:fontRef>
+        </p:style>
+        <p:txBody>
+          <a:bodyPr rtlCol="0" anchor="ctr"/>
+          <a:lstStyle/>
+          <a:p>
+            <a:pPr algn="ctr"/>
+          </a:p>
+        </p:txBody>
+      </p:sp>
+      <p:sp>
+        <p:nvSpPr>
+          <p:cNvPr id="50" name="TextBox 49"/>
+          <p:cNvSpPr txBox="1"/>
+          <p:nvPr/>
+        </p:nvSpPr>
+        <p:spPr>
+          <a:xfrm>
+            <a:off x="9454896" y="5394960"/>
+            <a:ext cx="1097280" cy="457200"/>
+          </a:xfrm>
+          <a:prstGeom prst="rect">
+            <a:avLst/>
+          </a:prstGeom>
+          <a:noFill/>
+        </p:spPr>
+        <p:txBody>
+          <a:bodyPr wrap="square">
+            <a:spAutoFit/>
+          </a:bodyPr>
+          <a:lstStyle/>
+          <a:p>
+            <a:pPr algn="ctr">
+              <a:defRPr sz="800">
+                <a:solidFill>
+                  <a:srgbClr val="1D1D4D"/>
+                </a:solidFill>
+              </a:defRPr>
+            </a:pPr>
+            <a:r>
+              <a:t>Go Live</a:t>
+            </a:r>
+            <a:br/>
+            <a:r>
+              <a:t>Dec 26</a:t>
+            </a:r>
+          </a:p>
+        </p:txBody>
+      </p:sp>
+      <p:sp>
+        <p:nvSpPr>
+          <p:cNvPr id="51" name="Rectangle 50"/>
+          <p:cNvSpPr/>
+          <p:nvPr/>
+        </p:nvSpPr>
+        <p:spPr>
+          <a:xfrm>
+            <a:off x="3749039" y="822960"/>
+            <a:ext cx="18288" cy="4572000"/>
+          </a:xfrm>
+          <a:prstGeom prst="rect">
+            <a:avLst/>
+          </a:prstGeom>
+          <a:solidFill>
+            <a:srgbClr val="E50050"/>
+          </a:solidFill>
+          <a:ln>
+            <a:noFill/>
+          </a:ln>
+        </p:spPr>
+        <p:style>
+          <a:lnRef idx="1">
+            <a:schemeClr val="accent1"/>
+          </a:lnRef>
+          <a:fillRef idx="3">
+            <a:schemeClr val="accent1"/>
+          </a:fillRef>
+          <a:effectRef idx="2">
+            <a:schemeClr val="accent1"/>
+          </a:effectRef>
+          <a:fontRef idx="minor">
+            <a:schemeClr val="lt1"/>
+          </a:fontRef>
+        </p:style>
+        <p:txBody>
+          <a:bodyPr rtlCol="0" anchor="ctr"/>
+          <a:lstStyle/>
+          <a:p>
+            <a:pPr algn="ctr"/>
+          </a:p>
+        </p:txBody>
+      </p:sp>
+      <p:sp>
+        <p:nvSpPr>
+          <p:cNvPr id="52" name="TextBox 51"/>
           <p:cNvSpPr txBox="1"/>
           <p:nvPr/>
         </p:nvSpPr>
@@ -5937,7 +6305,7 @@
       </p:sp>
       <p:sp>
         <p:nvSpPr>
-          <p:cNvPr id="45" name="TextBox 44"/>
+          <p:cNvPr id="53" name="TextBox 52"/>
           <p:cNvSpPr txBox="1"/>
           <p:nvPr/>
         </p:nvSpPr>

</xml_diff>

<commit_message>
Stripped L0/L1 duplicates from roadmap
</commit_message>
<xml_diff>
--- a/Agile_Roadmap_Template_2026.pptx
+++ b/Agile_Roadmap_Template_2026.pptx
@@ -4676,7 +4676,7 @@
         <p:spPr>
           <a:xfrm>
             <a:off x="0" y="1280160"/>
-            <a:ext cx="12188952" cy="914400"/>
+            <a:ext cx="12188952" cy="1097280"/>
           </a:xfrm>
           <a:prstGeom prst="rect">
             <a:avLst/>
@@ -4740,11 +4740,11 @@
               </a:defRPr>
             </a:pPr>
             <a:r>
-              <a:t>Waracle</a:t>
+              <a:t>Brochureware</a:t>
             </a:r>
             <a:br/>
             <a:r>
-              <a:t>Calculator</a:t>
+              <a:t>Releases</a:t>
             </a:r>
           </a:p>
         </p:txBody>
@@ -4757,7 +4757,7 @@
         </p:nvSpPr>
         <p:spPr>
           <a:xfrm>
-            <a:off x="4078224" y="1600200"/>
+            <a:off x="4407408" y="1600200"/>
             <a:ext cx="146304" cy="146304"/>
           </a:xfrm>
           <a:prstGeom prst="diamond">
@@ -4800,7 +4800,7 @@
         </p:nvSpPr>
         <p:spPr>
           <a:xfrm>
-            <a:off x="3694176" y="1737360"/>
+            <a:off x="4023360" y="1737360"/>
             <a:ext cx="1097280" cy="457200"/>
           </a:xfrm>
           <a:prstGeom prst="rect">
@@ -4822,31 +4822,31 @@
               </a:defRPr>
             </a:pPr>
             <a:r>
-              <a:t>Go Live</a:t>
+              <a:t>Budget Updates</a:t>
             </a:r>
             <a:br/>
             <a:r>
-              <a:t>11 Feb</a:t>
-            </a:r>
-          </a:p>
-        </p:txBody>
-      </p:sp>
-      <p:sp>
-        <p:nvSpPr>
-          <p:cNvPr id="17" name="Rectangle 16"/>
-          <p:cNvSpPr/>
-          <p:nvPr/>
-        </p:nvSpPr>
-        <p:spPr>
-          <a:xfrm>
-            <a:off x="0" y="2194560"/>
-            <a:ext cx="12188952" cy="914400"/>
-          </a:xfrm>
-          <a:prstGeom prst="rect">
-            <a:avLst/>
-          </a:prstGeom>
-          <a:solidFill>
-            <a:srgbClr val="FFFFFF"/>
+              <a:t>19 Feb</a:t>
+            </a:r>
+          </a:p>
+        </p:txBody>
+      </p:sp>
+      <p:sp>
+        <p:nvSpPr>
+          <p:cNvPr id="17" name="Diamond 16"/>
+          <p:cNvSpPr/>
+          <p:nvPr/>
+        </p:nvSpPr>
+        <p:spPr>
+          <a:xfrm>
+            <a:off x="5724144" y="1600200"/>
+            <a:ext cx="146304" cy="146304"/>
+          </a:xfrm>
+          <a:prstGeom prst="diamond">
+            <a:avLst/>
+          </a:prstGeom>
+          <a:solidFill>
+            <a:srgbClr val="1D1D4D"/>
           </a:solidFill>
           <a:ln>
             <a:noFill/>
@@ -4882,8 +4882,8 @@
         </p:nvSpPr>
         <p:spPr>
           <a:xfrm>
-            <a:off x="182880" y="2377440"/>
-            <a:ext cx="1645920" cy="731520"/>
+            <a:off x="5340096" y="1737360"/>
+            <a:ext cx="1097280" cy="457200"/>
           </a:xfrm>
           <a:prstGeom prst="rect">
             <a:avLst/>
@@ -4896,19 +4896,19 @@
           </a:bodyPr>
           <a:lstStyle/>
           <a:p>
-            <a:pPr>
-              <a:defRPr sz="1100" b="1">
+            <a:pPr algn="ctr">
+              <a:defRPr sz="800">
                 <a:solidFill>
                   <a:srgbClr val="1D1D4D"/>
                 </a:solidFill>
               </a:defRPr>
             </a:pPr>
             <a:r>
-              <a:t>Direct</a:t>
+              <a:t>PTO Synergy</a:t>
             </a:r>
             <a:br/>
             <a:r>
-              <a:t>Website</a:t>
+              <a:t>30 Apr</a:t>
             </a:r>
           </a:p>
         </p:txBody>
@@ -4921,7 +4921,7 @@
         </p:nvSpPr>
         <p:spPr>
           <a:xfrm>
-            <a:off x="3913632" y="2514600"/>
+            <a:off x="6217920" y="1600200"/>
             <a:ext cx="146304" cy="146304"/>
           </a:xfrm>
           <a:prstGeom prst="diamond">
@@ -4964,7 +4964,7 @@
         </p:nvSpPr>
         <p:spPr>
           <a:xfrm>
-            <a:off x="3529584" y="2651760"/>
+            <a:off x="5833872" y="1737360"/>
             <a:ext cx="1097280" cy="457200"/>
           </a:xfrm>
           <a:prstGeom prst="rect">
@@ -4986,31 +4986,31 @@
               </a:defRPr>
             </a:pPr>
             <a:r>
-              <a:t>CBIS Rebrand</a:t>
+              <a:t>VM Indirect</a:t>
             </a:r>
             <a:br/>
             <a:r>
-              <a:t>10 Feb</a:t>
-            </a:r>
-          </a:p>
-        </p:txBody>
-      </p:sp>
-      <p:sp>
-        <p:nvSpPr>
-          <p:cNvPr id="21" name="Diamond 20"/>
-          <p:cNvSpPr/>
-          <p:nvPr/>
-        </p:nvSpPr>
-        <p:spPr>
-          <a:xfrm>
-            <a:off x="5230368" y="2514600"/>
-            <a:ext cx="146304" cy="146304"/>
-          </a:xfrm>
-          <a:prstGeom prst="diamond">
-            <a:avLst/>
-          </a:prstGeom>
-          <a:solidFill>
-            <a:srgbClr val="1D1D4D"/>
+              <a:t>31 May</a:t>
+            </a:r>
+          </a:p>
+        </p:txBody>
+      </p:sp>
+      <p:sp>
+        <p:nvSpPr>
+          <p:cNvPr id="21" name="Rectangle 20"/>
+          <p:cNvSpPr/>
+          <p:nvPr/>
+        </p:nvSpPr>
+        <p:spPr>
+          <a:xfrm>
+            <a:off x="0" y="2377439"/>
+            <a:ext cx="12188952" cy="1097280"/>
+          </a:xfrm>
+          <a:prstGeom prst="rect">
+            <a:avLst/>
+          </a:prstGeom>
+          <a:solidFill>
+            <a:srgbClr val="FFFFFF"/>
           </a:solidFill>
           <a:ln>
             <a:noFill/>
@@ -5046,8 +5046,8 @@
         </p:nvSpPr>
         <p:spPr>
           <a:xfrm>
-            <a:off x="4846320" y="2651760"/>
-            <a:ext cx="1097280" cy="457200"/>
+            <a:off x="182880" y="2560320"/>
+            <a:ext cx="1645920" cy="731520"/>
           </a:xfrm>
           <a:prstGeom prst="rect">
             <a:avLst/>
@@ -5060,19 +5060,19 @@
           </a:bodyPr>
           <a:lstStyle/>
           <a:p>
-            <a:pPr algn="ctr">
-              <a:defRPr sz="800">
+            <a:pPr>
+              <a:defRPr sz="1100" b="1">
                 <a:solidFill>
                   <a:srgbClr val="1D1D4D"/>
                 </a:solidFill>
               </a:defRPr>
             </a:pPr>
             <a:r>
-              <a:t>Re-platform</a:t>
+              <a:t>Growth</a:t>
             </a:r>
             <a:br/>
             <a:r>
-              <a:t>2 Apr</a:t>
+              <a:t>Releases</a:t>
             </a:r>
           </a:p>
         </p:txBody>
@@ -5085,7 +5085,7 @@
         </p:nvSpPr>
         <p:spPr>
           <a:xfrm>
-            <a:off x="5394960" y="2514600"/>
+            <a:off x="6793992" y="2697479"/>
             <a:ext cx="146304" cy="146304"/>
           </a:xfrm>
           <a:prstGeom prst="diamond">
@@ -5128,7 +5128,7 @@
         </p:nvSpPr>
         <p:spPr>
           <a:xfrm>
-            <a:off x="5010912" y="2651760"/>
+            <a:off x="6409944" y="2834639"/>
             <a:ext cx="1097280" cy="457200"/>
           </a:xfrm>
           <a:prstGeom prst="rect">
@@ -5150,31 +5150,31 @@
               </a:defRPr>
             </a:pPr>
             <a:r>
-              <a:t>FSMA</a:t>
+              <a:t>Q2 Release</a:t>
             </a:r>
             <a:br/>
             <a:r>
-              <a:t>7 Apr</a:t>
-            </a:r>
-          </a:p>
-        </p:txBody>
-      </p:sp>
-      <p:sp>
-        <p:nvSpPr>
-          <p:cNvPr id="25" name="Rectangle 24"/>
-          <p:cNvSpPr/>
-          <p:nvPr/>
-        </p:nvSpPr>
-        <p:spPr>
-          <a:xfrm>
-            <a:off x="0" y="3108960"/>
-            <a:ext cx="12188952" cy="914400"/>
-          </a:xfrm>
-          <a:prstGeom prst="rect">
-            <a:avLst/>
-          </a:prstGeom>
-          <a:solidFill>
-            <a:srgbClr val="E6EEF5"/>
+              <a:t>30 Jun</a:t>
+            </a:r>
+          </a:p>
+        </p:txBody>
+      </p:sp>
+      <p:sp>
+        <p:nvSpPr>
+          <p:cNvPr id="25" name="Diamond 24"/>
+          <p:cNvSpPr/>
+          <p:nvPr/>
+        </p:nvSpPr>
+        <p:spPr>
+          <a:xfrm>
+            <a:off x="8439912" y="2697479"/>
+            <a:ext cx="146304" cy="146304"/>
+          </a:xfrm>
+          <a:prstGeom prst="diamond">
+            <a:avLst/>
+          </a:prstGeom>
+          <a:solidFill>
+            <a:srgbClr val="1D1D4D"/>
           </a:solidFill>
           <a:ln>
             <a:noFill/>
@@ -5210,8 +5210,8 @@
         </p:nvSpPr>
         <p:spPr>
           <a:xfrm>
-            <a:off x="182880" y="3291840"/>
-            <a:ext cx="1645920" cy="731520"/>
+            <a:off x="8055864" y="2834639"/>
+            <a:ext cx="1097280" cy="457200"/>
           </a:xfrm>
           <a:prstGeom prst="rect">
             <a:avLst/>
@@ -5224,39 +5224,39 @@
           </a:bodyPr>
           <a:lstStyle/>
           <a:p>
-            <a:pPr>
-              <a:defRPr sz="1100" b="1">
+            <a:pPr algn="ctr">
+              <a:defRPr sz="800">
                 <a:solidFill>
                   <a:srgbClr val="1D1D4D"/>
                 </a:solidFill>
               </a:defRPr>
             </a:pPr>
             <a:r>
-              <a:t>Brochureware</a:t>
+              <a:t>Q3 Release</a:t>
             </a:r>
             <a:br/>
             <a:r>
-              <a:t>BAU</a:t>
-            </a:r>
-          </a:p>
-        </p:txBody>
-      </p:sp>
-      <p:sp>
-        <p:nvSpPr>
-          <p:cNvPr id="27" name="Diamond 26"/>
-          <p:cNvSpPr/>
-          <p:nvPr/>
-        </p:nvSpPr>
-        <p:spPr>
-          <a:xfrm>
-            <a:off x="4407408" y="3429000"/>
-            <a:ext cx="146304" cy="146304"/>
-          </a:xfrm>
-          <a:prstGeom prst="diamond">
-            <a:avLst/>
-          </a:prstGeom>
-          <a:solidFill>
-            <a:srgbClr val="1D1D4D"/>
+              <a:t>30 Sep</a:t>
+            </a:r>
+          </a:p>
+        </p:txBody>
+      </p:sp>
+      <p:sp>
+        <p:nvSpPr>
+          <p:cNvPr id="27" name="Rectangle 26"/>
+          <p:cNvSpPr/>
+          <p:nvPr/>
+        </p:nvSpPr>
+        <p:spPr>
+          <a:xfrm>
+            <a:off x="3749039" y="822960"/>
+            <a:ext cx="18288" cy="2560320"/>
+          </a:xfrm>
+          <a:prstGeom prst="rect">
+            <a:avLst/>
+          </a:prstGeom>
+          <a:solidFill>
+            <a:srgbClr val="E50050"/>
           </a:solidFill>
           <a:ln>
             <a:noFill/>
@@ -5292,991 +5292,7 @@
         </p:nvSpPr>
         <p:spPr>
           <a:xfrm>
-            <a:off x="4023360" y="3566160"/>
-            <a:ext cx="1097280" cy="457200"/>
-          </a:xfrm>
-          <a:prstGeom prst="rect">
-            <a:avLst/>
-          </a:prstGeom>
-          <a:noFill/>
-        </p:spPr>
-        <p:txBody>
-          <a:bodyPr wrap="square">
-            <a:spAutoFit/>
-          </a:bodyPr>
-          <a:lstStyle/>
-          <a:p>
-            <a:pPr algn="ctr">
-              <a:defRPr sz="800">
-                <a:solidFill>
-                  <a:srgbClr val="1D1D4D"/>
-                </a:solidFill>
-              </a:defRPr>
-            </a:pPr>
-            <a:r>
-              <a:t>Budget</a:t>
-            </a:r>
-            <a:br/>
-            <a:r>
-              <a:t>19 Feb</a:t>
-            </a:r>
-          </a:p>
-        </p:txBody>
-      </p:sp>
-      <p:sp>
-        <p:nvSpPr>
-          <p:cNvPr id="29" name="Diamond 28"/>
-          <p:cNvSpPr/>
-          <p:nvPr/>
-        </p:nvSpPr>
-        <p:spPr>
-          <a:xfrm>
-            <a:off x="5724144" y="3429000"/>
-            <a:ext cx="146304" cy="146304"/>
-          </a:xfrm>
-          <a:prstGeom prst="diamond">
-            <a:avLst/>
-          </a:prstGeom>
-          <a:solidFill>
-            <a:srgbClr val="1D1D4D"/>
-          </a:solidFill>
-          <a:ln>
-            <a:noFill/>
-          </a:ln>
-        </p:spPr>
-        <p:style>
-          <a:lnRef idx="1">
-            <a:schemeClr val="accent1"/>
-          </a:lnRef>
-          <a:fillRef idx="3">
-            <a:schemeClr val="accent1"/>
-          </a:fillRef>
-          <a:effectRef idx="2">
-            <a:schemeClr val="accent1"/>
-          </a:effectRef>
-          <a:fontRef idx="minor">
-            <a:schemeClr val="lt1"/>
-          </a:fontRef>
-        </p:style>
-        <p:txBody>
-          <a:bodyPr rtlCol="0" anchor="ctr"/>
-          <a:lstStyle/>
-          <a:p>
-            <a:pPr algn="ctr"/>
-          </a:p>
-        </p:txBody>
-      </p:sp>
-      <p:sp>
-        <p:nvSpPr>
-          <p:cNvPr id="30" name="TextBox 29"/>
-          <p:cNvSpPr txBox="1"/>
-          <p:nvPr/>
-        </p:nvSpPr>
-        <p:spPr>
-          <a:xfrm>
-            <a:off x="5340096" y="3566160"/>
-            <a:ext cx="1097280" cy="457200"/>
-          </a:xfrm>
-          <a:prstGeom prst="rect">
-            <a:avLst/>
-          </a:prstGeom>
-          <a:noFill/>
-        </p:spPr>
-        <p:txBody>
-          <a:bodyPr wrap="square">
-            <a:spAutoFit/>
-          </a:bodyPr>
-          <a:lstStyle/>
-          <a:p>
-            <a:pPr algn="ctr">
-              <a:defRPr sz="800">
-                <a:solidFill>
-                  <a:srgbClr val="1D1D4D"/>
-                </a:solidFill>
-              </a:defRPr>
-            </a:pPr>
-            <a:r>
-              <a:t>PTO Synergy</a:t>
-            </a:r>
-            <a:br/>
-            <a:r>
-              <a:t>30 Apr</a:t>
-            </a:r>
-          </a:p>
-        </p:txBody>
-      </p:sp>
-      <p:sp>
-        <p:nvSpPr>
-          <p:cNvPr id="31" name="Diamond 30"/>
-          <p:cNvSpPr/>
-          <p:nvPr/>
-        </p:nvSpPr>
-        <p:spPr>
-          <a:xfrm>
-            <a:off x="6217920" y="3429000"/>
-            <a:ext cx="146304" cy="146304"/>
-          </a:xfrm>
-          <a:prstGeom prst="diamond">
-            <a:avLst/>
-          </a:prstGeom>
-          <a:solidFill>
-            <a:srgbClr val="1D1D4D"/>
-          </a:solidFill>
-          <a:ln>
-            <a:noFill/>
-          </a:ln>
-        </p:spPr>
-        <p:style>
-          <a:lnRef idx="1">
-            <a:schemeClr val="accent1"/>
-          </a:lnRef>
-          <a:fillRef idx="3">
-            <a:schemeClr val="accent1"/>
-          </a:fillRef>
-          <a:effectRef idx="2">
-            <a:schemeClr val="accent1"/>
-          </a:effectRef>
-          <a:fontRef idx="minor">
-            <a:schemeClr val="lt1"/>
-          </a:fontRef>
-        </p:style>
-        <p:txBody>
-          <a:bodyPr rtlCol="0" anchor="ctr"/>
-          <a:lstStyle/>
-          <a:p>
-            <a:pPr algn="ctr"/>
-          </a:p>
-        </p:txBody>
-      </p:sp>
-      <p:sp>
-        <p:nvSpPr>
-          <p:cNvPr id="32" name="TextBox 31"/>
-          <p:cNvSpPr txBox="1"/>
-          <p:nvPr/>
-        </p:nvSpPr>
-        <p:spPr>
-          <a:xfrm>
-            <a:off x="5833872" y="3566160"/>
-            <a:ext cx="1097280" cy="457200"/>
-          </a:xfrm>
-          <a:prstGeom prst="rect">
-            <a:avLst/>
-          </a:prstGeom>
-          <a:noFill/>
-        </p:spPr>
-        <p:txBody>
-          <a:bodyPr wrap="square">
-            <a:spAutoFit/>
-          </a:bodyPr>
-          <a:lstStyle/>
-          <a:p>
-            <a:pPr algn="ctr">
-              <a:defRPr sz="800">
-                <a:solidFill>
-                  <a:srgbClr val="1D1D4D"/>
-                </a:solidFill>
-              </a:defRPr>
-            </a:pPr>
-            <a:r>
-              <a:t>VM Indirect</a:t>
-            </a:r>
-            <a:br/>
-            <a:r>
-              <a:t>31 May</a:t>
-            </a:r>
-          </a:p>
-        </p:txBody>
-      </p:sp>
-      <p:sp>
-        <p:nvSpPr>
-          <p:cNvPr id="33" name="Rectangle 32"/>
-          <p:cNvSpPr/>
-          <p:nvPr/>
-        </p:nvSpPr>
-        <p:spPr>
-          <a:xfrm>
-            <a:off x="0" y="4023360"/>
-            <a:ext cx="12188952" cy="914400"/>
-          </a:xfrm>
-          <a:prstGeom prst="rect">
-            <a:avLst/>
-          </a:prstGeom>
-          <a:solidFill>
-            <a:srgbClr val="FFFFFF"/>
-          </a:solidFill>
-          <a:ln>
-            <a:noFill/>
-          </a:ln>
-        </p:spPr>
-        <p:style>
-          <a:lnRef idx="1">
-            <a:schemeClr val="accent1"/>
-          </a:lnRef>
-          <a:fillRef idx="3">
-            <a:schemeClr val="accent1"/>
-          </a:fillRef>
-          <a:effectRef idx="2">
-            <a:schemeClr val="accent1"/>
-          </a:effectRef>
-          <a:fontRef idx="minor">
-            <a:schemeClr val="lt1"/>
-          </a:fontRef>
-        </p:style>
-        <p:txBody>
-          <a:bodyPr rtlCol="0" anchor="ctr"/>
-          <a:lstStyle/>
-          <a:p>
-            <a:pPr algn="ctr"/>
-          </a:p>
-        </p:txBody>
-      </p:sp>
-      <p:sp>
-        <p:nvSpPr>
-          <p:cNvPr id="34" name="TextBox 33"/>
-          <p:cNvSpPr txBox="1"/>
-          <p:nvPr/>
-        </p:nvSpPr>
-        <p:spPr>
-          <a:xfrm>
-            <a:off x="182880" y="4206240"/>
-            <a:ext cx="1645920" cy="731520"/>
-          </a:xfrm>
-          <a:prstGeom prst="rect">
-            <a:avLst/>
-          </a:prstGeom>
-          <a:noFill/>
-        </p:spPr>
-        <p:txBody>
-          <a:bodyPr wrap="square">
-            <a:spAutoFit/>
-          </a:bodyPr>
-          <a:lstStyle/>
-          <a:p>
-            <a:pPr>
-              <a:defRPr sz="1100" b="1">
-                <a:solidFill>
-                  <a:srgbClr val="1D1D4D"/>
-                </a:solidFill>
-              </a:defRPr>
-            </a:pPr>
-            <a:r>
-              <a:t>Growth</a:t>
-            </a:r>
-            <a:br/>
-            <a:r>
-              <a:t>Releases</a:t>
-            </a:r>
-          </a:p>
-        </p:txBody>
-      </p:sp>
-      <p:sp>
-        <p:nvSpPr>
-          <p:cNvPr id="35" name="Diamond 34"/>
-          <p:cNvSpPr/>
-          <p:nvPr/>
-        </p:nvSpPr>
-        <p:spPr>
-          <a:xfrm>
-            <a:off x="4242816" y="4343400"/>
-            <a:ext cx="146304" cy="146304"/>
-          </a:xfrm>
-          <a:prstGeom prst="diamond">
-            <a:avLst/>
-          </a:prstGeom>
-          <a:solidFill>
-            <a:srgbClr val="1D1D4D"/>
-          </a:solidFill>
-          <a:ln>
-            <a:noFill/>
-          </a:ln>
-        </p:spPr>
-        <p:style>
-          <a:lnRef idx="1">
-            <a:schemeClr val="accent1"/>
-          </a:lnRef>
-          <a:fillRef idx="3">
-            <a:schemeClr val="accent1"/>
-          </a:fillRef>
-          <a:effectRef idx="2">
-            <a:schemeClr val="accent1"/>
-          </a:effectRef>
-          <a:fontRef idx="minor">
-            <a:schemeClr val="lt1"/>
-          </a:fontRef>
-        </p:style>
-        <p:txBody>
-          <a:bodyPr rtlCol="0" anchor="ctr"/>
-          <a:lstStyle/>
-          <a:p>
-            <a:pPr algn="ctr"/>
-          </a:p>
-        </p:txBody>
-      </p:sp>
-      <p:sp>
-        <p:nvSpPr>
-          <p:cNvPr id="36" name="TextBox 35"/>
-          <p:cNvSpPr txBox="1"/>
-          <p:nvPr/>
-        </p:nvSpPr>
-        <p:spPr>
-          <a:xfrm>
-            <a:off x="3858768" y="4480560"/>
-            <a:ext cx="1097280" cy="457200"/>
-          </a:xfrm>
-          <a:prstGeom prst="rect">
-            <a:avLst/>
-          </a:prstGeom>
-          <a:noFill/>
-        </p:spPr>
-        <p:txBody>
-          <a:bodyPr wrap="square">
-            <a:spAutoFit/>
-          </a:bodyPr>
-          <a:lstStyle/>
-          <a:p>
-            <a:pPr algn="ctr">
-              <a:defRPr sz="800">
-                <a:solidFill>
-                  <a:srgbClr val="1D1D4D"/>
-                </a:solidFill>
-              </a:defRPr>
-            </a:pPr>
-            <a:r>
-              <a:t>10to8</a:t>
-            </a:r>
-            <a:br/>
-            <a:r>
-              <a:t>18 Feb</a:t>
-            </a:r>
-          </a:p>
-        </p:txBody>
-      </p:sp>
-      <p:sp>
-        <p:nvSpPr>
-          <p:cNvPr id="37" name="Diamond 36"/>
-          <p:cNvSpPr/>
-          <p:nvPr/>
-        </p:nvSpPr>
-        <p:spPr>
-          <a:xfrm>
-            <a:off x="6793992" y="4343400"/>
-            <a:ext cx="146304" cy="146304"/>
-          </a:xfrm>
-          <a:prstGeom prst="diamond">
-            <a:avLst/>
-          </a:prstGeom>
-          <a:solidFill>
-            <a:srgbClr val="1D1D4D"/>
-          </a:solidFill>
-          <a:ln>
-            <a:noFill/>
-          </a:ln>
-        </p:spPr>
-        <p:style>
-          <a:lnRef idx="1">
-            <a:schemeClr val="accent1"/>
-          </a:lnRef>
-          <a:fillRef idx="3">
-            <a:schemeClr val="accent1"/>
-          </a:fillRef>
-          <a:effectRef idx="2">
-            <a:schemeClr val="accent1"/>
-          </a:effectRef>
-          <a:fontRef idx="minor">
-            <a:schemeClr val="lt1"/>
-          </a:fontRef>
-        </p:style>
-        <p:txBody>
-          <a:bodyPr rtlCol="0" anchor="ctr"/>
-          <a:lstStyle/>
-          <a:p>
-            <a:pPr algn="ctr"/>
-          </a:p>
-        </p:txBody>
-      </p:sp>
-      <p:sp>
-        <p:nvSpPr>
-          <p:cNvPr id="38" name="TextBox 37"/>
-          <p:cNvSpPr txBox="1"/>
-          <p:nvPr/>
-        </p:nvSpPr>
-        <p:spPr>
-          <a:xfrm>
-            <a:off x="6409944" y="4480560"/>
-            <a:ext cx="1097280" cy="457200"/>
-          </a:xfrm>
-          <a:prstGeom prst="rect">
-            <a:avLst/>
-          </a:prstGeom>
-          <a:noFill/>
-        </p:spPr>
-        <p:txBody>
-          <a:bodyPr wrap="square">
-            <a:spAutoFit/>
-          </a:bodyPr>
-          <a:lstStyle/>
-          <a:p>
-            <a:pPr algn="ctr">
-              <a:defRPr sz="800">
-                <a:solidFill>
-                  <a:srgbClr val="1D1D4D"/>
-                </a:solidFill>
-              </a:defRPr>
-            </a:pPr>
-            <a:r>
-              <a:t>Q2 Release</a:t>
-            </a:r>
-            <a:br/>
-            <a:r>
-              <a:t>30 Jun</a:t>
-            </a:r>
-          </a:p>
-        </p:txBody>
-      </p:sp>
-      <p:sp>
-        <p:nvSpPr>
-          <p:cNvPr id="39" name="Diamond 38"/>
-          <p:cNvSpPr/>
-          <p:nvPr/>
-        </p:nvSpPr>
-        <p:spPr>
-          <a:xfrm>
-            <a:off x="8439912" y="4343400"/>
-            <a:ext cx="146304" cy="146304"/>
-          </a:xfrm>
-          <a:prstGeom prst="diamond">
-            <a:avLst/>
-          </a:prstGeom>
-          <a:solidFill>
-            <a:srgbClr val="1D1D4D"/>
-          </a:solidFill>
-          <a:ln>
-            <a:noFill/>
-          </a:ln>
-        </p:spPr>
-        <p:style>
-          <a:lnRef idx="1">
-            <a:schemeClr val="accent1"/>
-          </a:lnRef>
-          <a:fillRef idx="3">
-            <a:schemeClr val="accent1"/>
-          </a:fillRef>
-          <a:effectRef idx="2">
-            <a:schemeClr val="accent1"/>
-          </a:effectRef>
-          <a:fontRef idx="minor">
-            <a:schemeClr val="lt1"/>
-          </a:fontRef>
-        </p:style>
-        <p:txBody>
-          <a:bodyPr rtlCol="0" anchor="ctr"/>
-          <a:lstStyle/>
-          <a:p>
-            <a:pPr algn="ctr"/>
-          </a:p>
-        </p:txBody>
-      </p:sp>
-      <p:sp>
-        <p:nvSpPr>
-          <p:cNvPr id="40" name="TextBox 39"/>
-          <p:cNvSpPr txBox="1"/>
-          <p:nvPr/>
-        </p:nvSpPr>
-        <p:spPr>
-          <a:xfrm>
-            <a:off x="8055864" y="4480560"/>
-            <a:ext cx="1097280" cy="457200"/>
-          </a:xfrm>
-          <a:prstGeom prst="rect">
-            <a:avLst/>
-          </a:prstGeom>
-          <a:noFill/>
-        </p:spPr>
-        <p:txBody>
-          <a:bodyPr wrap="square">
-            <a:spAutoFit/>
-          </a:bodyPr>
-          <a:lstStyle/>
-          <a:p>
-            <a:pPr algn="ctr">
-              <a:defRPr sz="800">
-                <a:solidFill>
-                  <a:srgbClr val="1D1D4D"/>
-                </a:solidFill>
-              </a:defRPr>
-            </a:pPr>
-            <a:r>
-              <a:t>Q3 Release</a:t>
-            </a:r>
-            <a:br/>
-            <a:r>
-              <a:t>30 Sep</a:t>
-            </a:r>
-          </a:p>
-        </p:txBody>
-      </p:sp>
-      <p:sp>
-        <p:nvSpPr>
-          <p:cNvPr id="41" name="Diamond 40"/>
-          <p:cNvSpPr/>
-          <p:nvPr/>
-        </p:nvSpPr>
-        <p:spPr>
-          <a:xfrm>
-            <a:off x="10661903" y="4343400"/>
-            <a:ext cx="146304" cy="146304"/>
-          </a:xfrm>
-          <a:prstGeom prst="diamond">
-            <a:avLst/>
-          </a:prstGeom>
-          <a:solidFill>
-            <a:srgbClr val="1D1D4D"/>
-          </a:solidFill>
-          <a:ln>
-            <a:noFill/>
-          </a:ln>
-        </p:spPr>
-        <p:style>
-          <a:lnRef idx="1">
-            <a:schemeClr val="accent1"/>
-          </a:lnRef>
-          <a:fillRef idx="3">
-            <a:schemeClr val="accent1"/>
-          </a:fillRef>
-          <a:effectRef idx="2">
-            <a:schemeClr val="accent1"/>
-          </a:effectRef>
-          <a:fontRef idx="minor">
-            <a:schemeClr val="lt1"/>
-          </a:fontRef>
-        </p:style>
-        <p:txBody>
-          <a:bodyPr rtlCol="0" anchor="ctr"/>
-          <a:lstStyle/>
-          <a:p>
-            <a:pPr algn="ctr"/>
-          </a:p>
-        </p:txBody>
-      </p:sp>
-      <p:sp>
-        <p:nvSpPr>
-          <p:cNvPr id="42" name="TextBox 41"/>
-          <p:cNvSpPr txBox="1"/>
-          <p:nvPr/>
-        </p:nvSpPr>
-        <p:spPr>
-          <a:xfrm>
-            <a:off x="10277855" y="4480560"/>
-            <a:ext cx="1097280" cy="457200"/>
-          </a:xfrm>
-          <a:prstGeom prst="rect">
-            <a:avLst/>
-          </a:prstGeom>
-          <a:noFill/>
-        </p:spPr>
-        <p:txBody>
-          <a:bodyPr wrap="square">
-            <a:spAutoFit/>
-          </a:bodyPr>
-          <a:lstStyle/>
-          <a:p>
-            <a:pPr algn="ctr">
-              <a:defRPr sz="800">
-                <a:solidFill>
-                  <a:srgbClr val="1D1D4D"/>
-                </a:solidFill>
-              </a:defRPr>
-            </a:pPr>
-            <a:r>
-              <a:t>FY27</a:t>
-            </a:r>
-            <a:br/>
-            <a:r>
-              <a:t>24 Mar</a:t>
-            </a:r>
-          </a:p>
-        </p:txBody>
-      </p:sp>
-      <p:sp>
-        <p:nvSpPr>
-          <p:cNvPr id="43" name="Rectangle 42"/>
-          <p:cNvSpPr/>
-          <p:nvPr/>
-        </p:nvSpPr>
-        <p:spPr>
-          <a:xfrm>
-            <a:off x="0" y="4937760"/>
-            <a:ext cx="12188952" cy="914400"/>
-          </a:xfrm>
-          <a:prstGeom prst="rect">
-            <a:avLst/>
-          </a:prstGeom>
-          <a:solidFill>
-            <a:srgbClr val="E6EEF5"/>
-          </a:solidFill>
-          <a:ln>
-            <a:noFill/>
-          </a:ln>
-        </p:spPr>
-        <p:style>
-          <a:lnRef idx="1">
-            <a:schemeClr val="accent1"/>
-          </a:lnRef>
-          <a:fillRef idx="3">
-            <a:schemeClr val="accent1"/>
-          </a:fillRef>
-          <a:effectRef idx="2">
-            <a:schemeClr val="accent1"/>
-          </a:effectRef>
-          <a:fontRef idx="minor">
-            <a:schemeClr val="lt1"/>
-          </a:fontRef>
-        </p:style>
-        <p:txBody>
-          <a:bodyPr rtlCol="0" anchor="ctr"/>
-          <a:lstStyle/>
-          <a:p>
-            <a:pPr algn="ctr"/>
-          </a:p>
-        </p:txBody>
-      </p:sp>
-      <p:sp>
-        <p:nvSpPr>
-          <p:cNvPr id="44" name="TextBox 43"/>
-          <p:cNvSpPr txBox="1"/>
-          <p:nvPr/>
-        </p:nvSpPr>
-        <p:spPr>
-          <a:xfrm>
-            <a:off x="182880" y="5120640"/>
-            <a:ext cx="1645920" cy="731520"/>
-          </a:xfrm>
-          <a:prstGeom prst="rect">
-            <a:avLst/>
-          </a:prstGeom>
-          <a:noFill/>
-        </p:spPr>
-        <p:txBody>
-          <a:bodyPr wrap="square">
-            <a:spAutoFit/>
-          </a:bodyPr>
-          <a:lstStyle/>
-          <a:p>
-            <a:pPr>
-              <a:defRPr sz="1100" b="1">
-                <a:solidFill>
-                  <a:srgbClr val="1D1D4D"/>
-                </a:solidFill>
-              </a:defRPr>
-            </a:pPr>
-            <a:r>
-              <a:t>SAM</a:t>
-            </a:r>
-            <a:br/>
-            <a:r>
-              <a:t>Replacement</a:t>
-            </a:r>
-          </a:p>
-        </p:txBody>
-      </p:sp>
-      <p:sp>
-        <p:nvSpPr>
-          <p:cNvPr id="45" name="Diamond 44"/>
-          <p:cNvSpPr/>
-          <p:nvPr/>
-        </p:nvSpPr>
-        <p:spPr>
-          <a:xfrm>
-            <a:off x="4901184" y="5257800"/>
-            <a:ext cx="146304" cy="146304"/>
-          </a:xfrm>
-          <a:prstGeom prst="diamond">
-            <a:avLst/>
-          </a:prstGeom>
-          <a:solidFill>
-            <a:srgbClr val="1D1D4D"/>
-          </a:solidFill>
-          <a:ln>
-            <a:noFill/>
-          </a:ln>
-        </p:spPr>
-        <p:style>
-          <a:lnRef idx="1">
-            <a:schemeClr val="accent1"/>
-          </a:lnRef>
-          <a:fillRef idx="3">
-            <a:schemeClr val="accent1"/>
-          </a:fillRef>
-          <a:effectRef idx="2">
-            <a:schemeClr val="accent1"/>
-          </a:effectRef>
-          <a:fontRef idx="minor">
-            <a:schemeClr val="lt1"/>
-          </a:fontRef>
-        </p:style>
-        <p:txBody>
-          <a:bodyPr rtlCol="0" anchor="ctr"/>
-          <a:lstStyle/>
-          <a:p>
-            <a:pPr algn="ctr"/>
-          </a:p>
-        </p:txBody>
-      </p:sp>
-      <p:sp>
-        <p:nvSpPr>
-          <p:cNvPr id="46" name="TextBox 45"/>
-          <p:cNvSpPr txBox="1"/>
-          <p:nvPr/>
-        </p:nvSpPr>
-        <p:spPr>
-          <a:xfrm>
-            <a:off x="4517136" y="5394960"/>
-            <a:ext cx="1097280" cy="457200"/>
-          </a:xfrm>
-          <a:prstGeom prst="rect">
-            <a:avLst/>
-          </a:prstGeom>
-          <a:noFill/>
-        </p:spPr>
-        <p:txBody>
-          <a:bodyPr wrap="square">
-            <a:spAutoFit/>
-          </a:bodyPr>
-          <a:lstStyle/>
-          <a:p>
-            <a:pPr algn="ctr">
-              <a:defRPr sz="800">
-                <a:solidFill>
-                  <a:srgbClr val="1D1D4D"/>
-                </a:solidFill>
-              </a:defRPr>
-            </a:pPr>
-            <a:r>
-              <a:t>Discovery</a:t>
-            </a:r>
-            <a:br/>
-            <a:r>
-              <a:t>27 Feb</a:t>
-            </a:r>
-          </a:p>
-        </p:txBody>
-      </p:sp>
-      <p:sp>
-        <p:nvSpPr>
-          <p:cNvPr id="47" name="Diamond 46"/>
-          <p:cNvSpPr/>
-          <p:nvPr/>
-        </p:nvSpPr>
-        <p:spPr>
-          <a:xfrm>
-            <a:off x="5230368" y="5257800"/>
-            <a:ext cx="146304" cy="146304"/>
-          </a:xfrm>
-          <a:prstGeom prst="diamond">
-            <a:avLst/>
-          </a:prstGeom>
-          <a:solidFill>
-            <a:srgbClr val="1D1D4D"/>
-          </a:solidFill>
-          <a:ln>
-            <a:noFill/>
-          </a:ln>
-        </p:spPr>
-        <p:style>
-          <a:lnRef idx="1">
-            <a:schemeClr val="accent1"/>
-          </a:lnRef>
-          <a:fillRef idx="3">
-            <a:schemeClr val="accent1"/>
-          </a:fillRef>
-          <a:effectRef idx="2">
-            <a:schemeClr val="accent1"/>
-          </a:effectRef>
-          <a:fontRef idx="minor">
-            <a:schemeClr val="lt1"/>
-          </a:fontRef>
-        </p:style>
-        <p:txBody>
-          <a:bodyPr rtlCol="0" anchor="ctr"/>
-          <a:lstStyle/>
-          <a:p>
-            <a:pPr algn="ctr"/>
-          </a:p>
-        </p:txBody>
-      </p:sp>
-      <p:sp>
-        <p:nvSpPr>
-          <p:cNvPr id="48" name="TextBox 47"/>
-          <p:cNvSpPr txBox="1"/>
-          <p:nvPr/>
-        </p:nvSpPr>
-        <p:spPr>
-          <a:xfrm>
-            <a:off x="4846320" y="5394960"/>
-            <a:ext cx="1097280" cy="457200"/>
-          </a:xfrm>
-          <a:prstGeom prst="rect">
-            <a:avLst/>
-          </a:prstGeom>
-          <a:noFill/>
-        </p:spPr>
-        <p:txBody>
-          <a:bodyPr wrap="square">
-            <a:spAutoFit/>
-          </a:bodyPr>
-          <a:lstStyle/>
-          <a:p>
-            <a:pPr algn="ctr">
-              <a:defRPr sz="800">
-                <a:solidFill>
-                  <a:srgbClr val="1D1D4D"/>
-                </a:solidFill>
-              </a:defRPr>
-            </a:pPr>
-            <a:r>
-              <a:t>Decision</a:t>
-            </a:r>
-            <a:br/>
-            <a:r>
-              <a:t>3 Apr</a:t>
-            </a:r>
-          </a:p>
-        </p:txBody>
-      </p:sp>
-      <p:sp>
-        <p:nvSpPr>
-          <p:cNvPr id="49" name="Diamond 48"/>
-          <p:cNvSpPr/>
-          <p:nvPr/>
-        </p:nvSpPr>
-        <p:spPr>
-          <a:xfrm>
-            <a:off x="9838944" y="5257800"/>
-            <a:ext cx="146304" cy="146304"/>
-          </a:xfrm>
-          <a:prstGeom prst="diamond">
-            <a:avLst/>
-          </a:prstGeom>
-          <a:solidFill>
-            <a:srgbClr val="FF991F"/>
-          </a:solidFill>
-          <a:ln>
-            <a:noFill/>
-          </a:ln>
-        </p:spPr>
-        <p:style>
-          <a:lnRef idx="1">
-            <a:schemeClr val="accent1"/>
-          </a:lnRef>
-          <a:fillRef idx="3">
-            <a:schemeClr val="accent1"/>
-          </a:fillRef>
-          <a:effectRef idx="2">
-            <a:schemeClr val="accent1"/>
-          </a:effectRef>
-          <a:fontRef idx="minor">
-            <a:schemeClr val="lt1"/>
-          </a:fontRef>
-        </p:style>
-        <p:txBody>
-          <a:bodyPr rtlCol="0" anchor="ctr"/>
-          <a:lstStyle/>
-          <a:p>
-            <a:pPr algn="ctr"/>
-          </a:p>
-        </p:txBody>
-      </p:sp>
-      <p:sp>
-        <p:nvSpPr>
-          <p:cNvPr id="50" name="TextBox 49"/>
-          <p:cNvSpPr txBox="1"/>
-          <p:nvPr/>
-        </p:nvSpPr>
-        <p:spPr>
-          <a:xfrm>
-            <a:off x="9454896" y="5394960"/>
-            <a:ext cx="1097280" cy="457200"/>
-          </a:xfrm>
-          <a:prstGeom prst="rect">
-            <a:avLst/>
-          </a:prstGeom>
-          <a:noFill/>
-        </p:spPr>
-        <p:txBody>
-          <a:bodyPr wrap="square">
-            <a:spAutoFit/>
-          </a:bodyPr>
-          <a:lstStyle/>
-          <a:p>
-            <a:pPr algn="ctr">
-              <a:defRPr sz="800">
-                <a:solidFill>
-                  <a:srgbClr val="1D1D4D"/>
-                </a:solidFill>
-              </a:defRPr>
-            </a:pPr>
-            <a:r>
-              <a:t>Go Live</a:t>
-            </a:r>
-            <a:br/>
-            <a:r>
-              <a:t>Dec 26</a:t>
-            </a:r>
-          </a:p>
-        </p:txBody>
-      </p:sp>
-      <p:sp>
-        <p:nvSpPr>
-          <p:cNvPr id="51" name="Rectangle 50"/>
-          <p:cNvSpPr/>
-          <p:nvPr/>
-        </p:nvSpPr>
-        <p:spPr>
-          <a:xfrm>
-            <a:off x="3749039" y="822960"/>
-            <a:ext cx="18288" cy="4572000"/>
-          </a:xfrm>
-          <a:prstGeom prst="rect">
-            <a:avLst/>
-          </a:prstGeom>
-          <a:solidFill>
-            <a:srgbClr val="E50050"/>
-          </a:solidFill>
-          <a:ln>
-            <a:noFill/>
-          </a:ln>
-        </p:spPr>
-        <p:style>
-          <a:lnRef idx="1">
-            <a:schemeClr val="accent1"/>
-          </a:lnRef>
-          <a:fillRef idx="3">
-            <a:schemeClr val="accent1"/>
-          </a:fillRef>
-          <a:effectRef idx="2">
-            <a:schemeClr val="accent1"/>
-          </a:effectRef>
-          <a:fontRef idx="minor">
-            <a:schemeClr val="lt1"/>
-          </a:fontRef>
-        </p:style>
-        <p:txBody>
-          <a:bodyPr rtlCol="0" anchor="ctr"/>
-          <a:lstStyle/>
-          <a:p>
-            <a:pPr algn="ctr"/>
-          </a:p>
-        </p:txBody>
-      </p:sp>
-      <p:sp>
-        <p:nvSpPr>
-          <p:cNvPr id="52" name="TextBox 51"/>
-          <p:cNvSpPr txBox="1"/>
-          <p:nvPr/>
-        </p:nvSpPr>
-        <p:spPr>
-          <a:xfrm>
-            <a:off x="3566159" y="5852160"/>
+            <a:off x="3566159" y="3474720"/>
             <a:ext cx="457200" cy="274320"/>
           </a:xfrm>
           <a:prstGeom prst="rect">
@@ -6305,14 +5321,14 @@
       </p:sp>
       <p:sp>
         <p:nvSpPr>
-          <p:cNvPr id="53" name="TextBox 52"/>
+          <p:cNvPr id="29" name="TextBox 28"/>
           <p:cNvSpPr txBox="1"/>
           <p:nvPr/>
         </p:nvSpPr>
         <p:spPr>
           <a:xfrm>
-            <a:off x="274320" y="6217920"/>
-            <a:ext cx="4572000" cy="274320"/>
+            <a:off x="274320" y="3840480"/>
+            <a:ext cx="9144000" cy="274320"/>
           </a:xfrm>
           <a:prstGeom prst="rect">
             <a:avLst/>
@@ -6326,14 +5342,14 @@
           <a:lstStyle/>
           <a:p>
             <a:pPr>
-              <a:defRPr sz="900">
+              <a:defRPr sz="1000" i="1">
                 <a:solidFill>
                   <a:srgbClr val="666666"/>
                 </a:solidFill>
               </a:defRPr>
             </a:pPr>
             <a:r>
-              <a:t>◆ Confirmed milestone    ◆ TBC/In planning</a:t>
+              <a:t>L0/L1 milestones shown on separate slide</a:t>
             </a:r>
           </a:p>
         </p:txBody>

</xml_diff>

<commit_message>
Updated L1 milestones and Risks from live Jira data
</commit_message>
<xml_diff>
--- a/Agile_Roadmap_Template_2026.pptx
+++ b/Agile_Roadmap_Template_2026.pptx
@@ -8274,7 +8274,7 @@
               </a:defRPr>
             </a:pPr>
             <a:r>
-              <a:t>CB AFCALC Review &amp; Rebuild</a:t>
+              <a:t>SAM Discovery</a:t>
             </a:r>
           </a:p>
         </p:txBody>
@@ -8328,7 +8328,7 @@
               </a:defRPr>
             </a:pPr>
             <a:r>
-              <a:t>Waracle</a:t>
+              <a:t>SAM</a:t>
             </a:r>
           </a:p>
         </p:txBody>
@@ -8490,7 +8490,7 @@
               </a:defRPr>
             </a:pPr>
             <a:r>
-              <a:t>SAM Discovery Complete</a:t>
+              <a:t>SAM Decision</a:t>
             </a:r>
           </a:p>
         </p:txBody>
@@ -8598,7 +8598,7 @@
               </a:defRPr>
             </a:pPr>
             <a:r>
-              <a:t>27 Feb</a:t>
+              <a:t>03 Apr</a:t>
             </a:r>
           </a:p>
         </p:txBody>
@@ -8612,438 +8612,6 @@
         <p:spPr>
           <a:xfrm>
             <a:off x="5760720" y="5943600"/>
-            <a:ext cx="731520" cy="320040"/>
-          </a:xfrm>
-          <a:prstGeom prst="rect">
-            <a:avLst/>
-          </a:prstGeom>
-          <a:solidFill>
-            <a:srgbClr val="36B37E"/>
-          </a:solidFill>
-          <a:ln w="6350">
-            <a:solidFill>
-              <a:srgbClr val="CCCCCC"/>
-            </a:solidFill>
-          </a:ln>
-        </p:spPr>
-        <p:style>
-          <a:lnRef idx="1">
-            <a:schemeClr val="accent1"/>
-          </a:lnRef>
-          <a:fillRef idx="3">
-            <a:schemeClr val="accent1"/>
-          </a:fillRef>
-          <a:effectRef idx="2">
-            <a:schemeClr val="accent1"/>
-          </a:effectRef>
-          <a:fontRef idx="minor">
-            <a:schemeClr val="lt1"/>
-          </a:fontRef>
-        </p:style>
-        <p:txBody>
-          <a:bodyPr rtlCol="0" anchor="ctr" wrap="square"/>
-          <a:lstStyle/>
-          <a:p>
-            <a:pPr algn="ctr">
-              <a:defRPr sz="1000" b="0">
-                <a:solidFill>
-                  <a:srgbClr val="FFFFFF"/>
-                </a:solidFill>
-              </a:defRPr>
-            </a:pPr>
-            <a:r>
-              <a:t>Green</a:t>
-            </a:r>
-          </a:p>
-        </p:txBody>
-      </p:sp>
-      <p:sp>
-        <p:nvSpPr>
-          <p:cNvPr id="65" name="Rectangle 64"/>
-          <p:cNvSpPr/>
-          <p:nvPr/>
-        </p:nvSpPr>
-        <p:spPr>
-          <a:xfrm>
-            <a:off x="274320" y="6263640"/>
-            <a:ext cx="2926080" cy="320040"/>
-          </a:xfrm>
-          <a:prstGeom prst="rect">
-            <a:avLst/>
-          </a:prstGeom>
-          <a:solidFill>
-            <a:srgbClr val="FFFFFF"/>
-          </a:solidFill>
-          <a:ln w="6350">
-            <a:solidFill>
-              <a:srgbClr val="CCCCCC"/>
-            </a:solidFill>
-          </a:ln>
-        </p:spPr>
-        <p:style>
-          <a:lnRef idx="1">
-            <a:schemeClr val="accent1"/>
-          </a:lnRef>
-          <a:fillRef idx="3">
-            <a:schemeClr val="accent1"/>
-          </a:fillRef>
-          <a:effectRef idx="2">
-            <a:schemeClr val="accent1"/>
-          </a:effectRef>
-          <a:fontRef idx="minor">
-            <a:schemeClr val="lt1"/>
-          </a:fontRef>
-        </p:style>
-        <p:txBody>
-          <a:bodyPr rtlCol="0" anchor="ctr" wrap="square"/>
-          <a:lstStyle/>
-          <a:p>
-            <a:pPr algn="l">
-              <a:defRPr sz="1000" b="0">
-                <a:solidFill>
-                  <a:srgbClr val="1D1D4D"/>
-                </a:solidFill>
-              </a:defRPr>
-            </a:pPr>
-            <a:r>
-              <a:t>FSMA Part VII Cutover</a:t>
-            </a:r>
-          </a:p>
-        </p:txBody>
-      </p:sp>
-      <p:sp>
-        <p:nvSpPr>
-          <p:cNvPr id="66" name="Rectangle 65"/>
-          <p:cNvSpPr/>
-          <p:nvPr/>
-        </p:nvSpPr>
-        <p:spPr>
-          <a:xfrm>
-            <a:off x="3200400" y="6263640"/>
-            <a:ext cx="1645920" cy="320040"/>
-          </a:xfrm>
-          <a:prstGeom prst="rect">
-            <a:avLst/>
-          </a:prstGeom>
-          <a:solidFill>
-            <a:srgbClr val="FFFFFF"/>
-          </a:solidFill>
-          <a:ln w="6350">
-            <a:solidFill>
-              <a:srgbClr val="CCCCCC"/>
-            </a:solidFill>
-          </a:ln>
-        </p:spPr>
-        <p:style>
-          <a:lnRef idx="1">
-            <a:schemeClr val="accent1"/>
-          </a:lnRef>
-          <a:fillRef idx="3">
-            <a:schemeClr val="accent1"/>
-          </a:fillRef>
-          <a:effectRef idx="2">
-            <a:schemeClr val="accent1"/>
-          </a:effectRef>
-          <a:fontRef idx="minor">
-            <a:schemeClr val="lt1"/>
-          </a:fontRef>
-        </p:style>
-        <p:txBody>
-          <a:bodyPr rtlCol="0" anchor="ctr" wrap="square"/>
-          <a:lstStyle/>
-          <a:p>
-            <a:pPr algn="l">
-              <a:defRPr sz="1000" b="0">
-                <a:solidFill>
-                  <a:srgbClr val="1D1D4D"/>
-                </a:solidFill>
-              </a:defRPr>
-            </a:pPr>
-            <a:r>
-              <a:t>Direct Website</a:t>
-            </a:r>
-          </a:p>
-        </p:txBody>
-      </p:sp>
-      <p:sp>
-        <p:nvSpPr>
-          <p:cNvPr id="67" name="Rectangle 66"/>
-          <p:cNvSpPr/>
-          <p:nvPr/>
-        </p:nvSpPr>
-        <p:spPr>
-          <a:xfrm>
-            <a:off x="4846320" y="6263640"/>
-            <a:ext cx="914400" cy="320040"/>
-          </a:xfrm>
-          <a:prstGeom prst="rect">
-            <a:avLst/>
-          </a:prstGeom>
-          <a:solidFill>
-            <a:srgbClr val="FFFFFF"/>
-          </a:solidFill>
-          <a:ln w="6350">
-            <a:solidFill>
-              <a:srgbClr val="CCCCCC"/>
-            </a:solidFill>
-          </a:ln>
-        </p:spPr>
-        <p:style>
-          <a:lnRef idx="1">
-            <a:schemeClr val="accent1"/>
-          </a:lnRef>
-          <a:fillRef idx="3">
-            <a:schemeClr val="accent1"/>
-          </a:fillRef>
-          <a:effectRef idx="2">
-            <a:schemeClr val="accent1"/>
-          </a:effectRef>
-          <a:fontRef idx="minor">
-            <a:schemeClr val="lt1"/>
-          </a:fontRef>
-        </p:style>
-        <p:txBody>
-          <a:bodyPr rtlCol="0" anchor="ctr" wrap="square"/>
-          <a:lstStyle/>
-          <a:p>
-            <a:pPr algn="ctr">
-              <a:defRPr sz="1000" b="0">
-                <a:solidFill>
-                  <a:srgbClr val="1D1D4D"/>
-                </a:solidFill>
-              </a:defRPr>
-            </a:pPr>
-            <a:r>
-              <a:t>02 Apr</a:t>
-            </a:r>
-          </a:p>
-        </p:txBody>
-      </p:sp>
-      <p:sp>
-        <p:nvSpPr>
-          <p:cNvPr id="68" name="Rectangle 67"/>
-          <p:cNvSpPr/>
-          <p:nvPr/>
-        </p:nvSpPr>
-        <p:spPr>
-          <a:xfrm>
-            <a:off x="5760720" y="6263640"/>
-            <a:ext cx="731520" cy="320040"/>
-          </a:xfrm>
-          <a:prstGeom prst="rect">
-            <a:avLst/>
-          </a:prstGeom>
-          <a:solidFill>
-            <a:srgbClr val="36B37E"/>
-          </a:solidFill>
-          <a:ln w="6350">
-            <a:solidFill>
-              <a:srgbClr val="CCCCCC"/>
-            </a:solidFill>
-          </a:ln>
-        </p:spPr>
-        <p:style>
-          <a:lnRef idx="1">
-            <a:schemeClr val="accent1"/>
-          </a:lnRef>
-          <a:fillRef idx="3">
-            <a:schemeClr val="accent1"/>
-          </a:fillRef>
-          <a:effectRef idx="2">
-            <a:schemeClr val="accent1"/>
-          </a:effectRef>
-          <a:fontRef idx="minor">
-            <a:schemeClr val="lt1"/>
-          </a:fontRef>
-        </p:style>
-        <p:txBody>
-          <a:bodyPr rtlCol="0" anchor="ctr" wrap="square"/>
-          <a:lstStyle/>
-          <a:p>
-            <a:pPr algn="ctr">
-              <a:defRPr sz="1000" b="0">
-                <a:solidFill>
-                  <a:srgbClr val="FFFFFF"/>
-                </a:solidFill>
-              </a:defRPr>
-            </a:pPr>
-            <a:r>
-              <a:t>Green</a:t>
-            </a:r>
-          </a:p>
-        </p:txBody>
-      </p:sp>
-      <p:sp>
-        <p:nvSpPr>
-          <p:cNvPr id="69" name="Rectangle 68"/>
-          <p:cNvSpPr/>
-          <p:nvPr/>
-        </p:nvSpPr>
-        <p:spPr>
-          <a:xfrm>
-            <a:off x="274320" y="6583680"/>
-            <a:ext cx="2926080" cy="320040"/>
-          </a:xfrm>
-          <a:prstGeom prst="rect">
-            <a:avLst/>
-          </a:prstGeom>
-          <a:solidFill>
-            <a:srgbClr val="E6EEF5"/>
-          </a:solidFill>
-          <a:ln w="6350">
-            <a:solidFill>
-              <a:srgbClr val="CCCCCC"/>
-            </a:solidFill>
-          </a:ln>
-        </p:spPr>
-        <p:style>
-          <a:lnRef idx="1">
-            <a:schemeClr val="accent1"/>
-          </a:lnRef>
-          <a:fillRef idx="3">
-            <a:schemeClr val="accent1"/>
-          </a:fillRef>
-          <a:effectRef idx="2">
-            <a:schemeClr val="accent1"/>
-          </a:effectRef>
-          <a:fontRef idx="minor">
-            <a:schemeClr val="lt1"/>
-          </a:fontRef>
-        </p:style>
-        <p:txBody>
-          <a:bodyPr rtlCol="0" anchor="ctr" wrap="square"/>
-          <a:lstStyle/>
-          <a:p>
-            <a:pPr algn="l">
-              <a:defRPr sz="1000" b="0">
-                <a:solidFill>
-                  <a:srgbClr val="1D1D4D"/>
-                </a:solidFill>
-              </a:defRPr>
-            </a:pPr>
-            <a:r>
-              <a:t>SAM Decision</a:t>
-            </a:r>
-          </a:p>
-        </p:txBody>
-      </p:sp>
-      <p:sp>
-        <p:nvSpPr>
-          <p:cNvPr id="70" name="Rectangle 69"/>
-          <p:cNvSpPr/>
-          <p:nvPr/>
-        </p:nvSpPr>
-        <p:spPr>
-          <a:xfrm>
-            <a:off x="3200400" y="6583680"/>
-            <a:ext cx="1645920" cy="320040"/>
-          </a:xfrm>
-          <a:prstGeom prst="rect">
-            <a:avLst/>
-          </a:prstGeom>
-          <a:solidFill>
-            <a:srgbClr val="E6EEF5"/>
-          </a:solidFill>
-          <a:ln w="6350">
-            <a:solidFill>
-              <a:srgbClr val="CCCCCC"/>
-            </a:solidFill>
-          </a:ln>
-        </p:spPr>
-        <p:style>
-          <a:lnRef idx="1">
-            <a:schemeClr val="accent1"/>
-          </a:lnRef>
-          <a:fillRef idx="3">
-            <a:schemeClr val="accent1"/>
-          </a:fillRef>
-          <a:effectRef idx="2">
-            <a:schemeClr val="accent1"/>
-          </a:effectRef>
-          <a:fontRef idx="minor">
-            <a:schemeClr val="lt1"/>
-          </a:fontRef>
-        </p:style>
-        <p:txBody>
-          <a:bodyPr rtlCol="0" anchor="ctr" wrap="square"/>
-          <a:lstStyle/>
-          <a:p>
-            <a:pPr algn="l">
-              <a:defRPr sz="1000" b="0">
-                <a:solidFill>
-                  <a:srgbClr val="1D1D4D"/>
-                </a:solidFill>
-              </a:defRPr>
-            </a:pPr>
-            <a:r>
-              <a:t>SAM</a:t>
-            </a:r>
-          </a:p>
-        </p:txBody>
-      </p:sp>
-      <p:sp>
-        <p:nvSpPr>
-          <p:cNvPr id="71" name="Rectangle 70"/>
-          <p:cNvSpPr/>
-          <p:nvPr/>
-        </p:nvSpPr>
-        <p:spPr>
-          <a:xfrm>
-            <a:off x="4846320" y="6583680"/>
-            <a:ext cx="914400" cy="320040"/>
-          </a:xfrm>
-          <a:prstGeom prst="rect">
-            <a:avLst/>
-          </a:prstGeom>
-          <a:solidFill>
-            <a:srgbClr val="E6EEF5"/>
-          </a:solidFill>
-          <a:ln w="6350">
-            <a:solidFill>
-              <a:srgbClr val="CCCCCC"/>
-            </a:solidFill>
-          </a:ln>
-        </p:spPr>
-        <p:style>
-          <a:lnRef idx="1">
-            <a:schemeClr val="accent1"/>
-          </a:lnRef>
-          <a:fillRef idx="3">
-            <a:schemeClr val="accent1"/>
-          </a:fillRef>
-          <a:effectRef idx="2">
-            <a:schemeClr val="accent1"/>
-          </a:effectRef>
-          <a:fontRef idx="minor">
-            <a:schemeClr val="lt1"/>
-          </a:fontRef>
-        </p:style>
-        <p:txBody>
-          <a:bodyPr rtlCol="0" anchor="ctr" wrap="square"/>
-          <a:lstStyle/>
-          <a:p>
-            <a:pPr algn="ctr">
-              <a:defRPr sz="1000" b="0">
-                <a:solidFill>
-                  <a:srgbClr val="1D1D4D"/>
-                </a:solidFill>
-              </a:defRPr>
-            </a:pPr>
-            <a:r>
-              <a:t>03 Apr</a:t>
-            </a:r>
-          </a:p>
-        </p:txBody>
-      </p:sp>
-      <p:sp>
-        <p:nvSpPr>
-          <p:cNvPr id="72" name="Rectangle 71"/>
-          <p:cNvSpPr/>
-          <p:nvPr/>
-        </p:nvSpPr>
-        <p:spPr>
-          <a:xfrm>
-            <a:off x="5760720" y="6583680"/>
             <a:ext cx="731520" cy="320040"/>
           </a:xfrm>
           <a:prstGeom prst="rect">
@@ -9652,7 +9220,7 @@
               </a:defRPr>
             </a:pPr>
             <a:r>
-              <a:t>Waracle 3rd party dependency</a:t>
+              <a:t>SAM not replaced before Dec 2026</a:t>
             </a:r>
           </a:p>
         </p:txBody>
@@ -9706,7 +9274,7 @@
               </a:defRPr>
             </a:pPr>
             <a:r>
-              <a:t>Waracle</a:t>
+              <a:t>SAM</a:t>
             </a:r>
           </a:p>
         </p:txBody>
@@ -9726,7 +9294,7 @@
             <a:avLst/>
           </a:prstGeom>
           <a:solidFill>
-            <a:srgbClr val="36B37E"/>
+            <a:srgbClr val="FF991F"/>
           </a:solidFill>
           <a:ln>
             <a:solidFill>
@@ -9760,7 +9328,7 @@
               </a:defRPr>
             </a:pPr>
             <a:r>
-              <a:t>Green</a:t>
+              <a:t>Amber</a:t>
             </a:r>
           </a:p>
         </p:txBody>
@@ -9814,7 +9382,7 @@
               </a:defRPr>
             </a:pPr>
             <a:r>
-              <a:t>28 Feb</a:t>
+              <a:t>27 Feb</a:t>
             </a:r>
           </a:p>
         </p:txBody>
@@ -9868,7 +9436,7 @@
               </a:defRPr>
             </a:pPr>
             <a:r>
-              <a:t>Michael James</a:t>
+              <a:t>Prashant Nair</a:t>
             </a:r>
           </a:p>
         </p:txBody>
@@ -9922,7 +9490,7 @@
               </a:defRPr>
             </a:pPr>
             <a:r>
-              <a:t>SAM Collate Capabilities</a:t>
+              <a:t>Collate Capabilities</a:t>
             </a:r>
           </a:p>
         </p:txBody>
@@ -10138,7 +9706,7 @@
               </a:defRPr>
             </a:pPr>
             <a:r>
-              <a:t>Graeme Cumming</a:t>
+              <a:t>Prashant Nair</a:t>
             </a:r>
           </a:p>
         </p:txBody>
@@ -10192,7 +9760,7 @@
               </a:defRPr>
             </a:pPr>
             <a:r>
-              <a:t>SAM not replaced in time</a:t>
+              <a:t>Design Support Availability</a:t>
             </a:r>
           </a:p>
         </p:txBody>
@@ -10354,7 +9922,7 @@
               </a:defRPr>
             </a:pPr>
             <a:r>
-              <a:t>27 Feb</a:t>
+              <a:t>28 Feb</a:t>
             </a:r>
           </a:p>
         </p:txBody>
@@ -10408,14 +9976,284 @@
               </a:defRPr>
             </a:pPr>
             <a:r>
-              <a:t>Graeme Cumming</a:t>
-            </a:r>
-          </a:p>
-        </p:txBody>
-      </p:sp>
-      <p:sp>
-        <p:nvSpPr>
-          <p:cNvPr id="28" name="TextBox 27"/>
+              <a:t>Prashant Nair</a:t>
+            </a:r>
+          </a:p>
+        </p:txBody>
+      </p:sp>
+      <p:sp>
+        <p:nvSpPr>
+          <p:cNvPr id="28" name="Rectangle 27"/>
+          <p:cNvSpPr/>
+          <p:nvPr/>
+        </p:nvSpPr>
+        <p:spPr>
+          <a:xfrm>
+            <a:off x="274320" y="2560320"/>
+            <a:ext cx="3657600" cy="365760"/>
+          </a:xfrm>
+          <a:prstGeom prst="rect">
+            <a:avLst/>
+          </a:prstGeom>
+          <a:solidFill>
+            <a:srgbClr val="FFFFFF"/>
+          </a:solidFill>
+          <a:ln>
+            <a:solidFill>
+              <a:srgbClr val="CCCCCC"/>
+            </a:solidFill>
+          </a:ln>
+        </p:spPr>
+        <p:style>
+          <a:lnRef idx="1">
+            <a:schemeClr val="accent1"/>
+          </a:lnRef>
+          <a:fillRef idx="3">
+            <a:schemeClr val="accent1"/>
+          </a:fillRef>
+          <a:effectRef idx="2">
+            <a:schemeClr val="accent1"/>
+          </a:effectRef>
+          <a:fontRef idx="minor">
+            <a:schemeClr val="lt1"/>
+          </a:fontRef>
+        </p:style>
+        <p:txBody>
+          <a:bodyPr rtlCol="0" anchor="ctr"/>
+          <a:lstStyle/>
+          <a:p>
+            <a:pPr algn="l">
+              <a:defRPr sz="1000" b="0">
+                <a:solidFill>
+                  <a:srgbClr val="1D1D4D"/>
+                </a:solidFill>
+              </a:defRPr>
+            </a:pPr>
+            <a:r>
+              <a:t>QE Test Availability</a:t>
+            </a:r>
+          </a:p>
+        </p:txBody>
+      </p:sp>
+      <p:sp>
+        <p:nvSpPr>
+          <p:cNvPr id="29" name="Rectangle 28"/>
+          <p:cNvSpPr/>
+          <p:nvPr/>
+        </p:nvSpPr>
+        <p:spPr>
+          <a:xfrm>
+            <a:off x="3931920" y="2560320"/>
+            <a:ext cx="1371600" cy="365760"/>
+          </a:xfrm>
+          <a:prstGeom prst="rect">
+            <a:avLst/>
+          </a:prstGeom>
+          <a:solidFill>
+            <a:srgbClr val="FFFFFF"/>
+          </a:solidFill>
+          <a:ln>
+            <a:solidFill>
+              <a:srgbClr val="CCCCCC"/>
+            </a:solidFill>
+          </a:ln>
+        </p:spPr>
+        <p:style>
+          <a:lnRef idx="1">
+            <a:schemeClr val="accent1"/>
+          </a:lnRef>
+          <a:fillRef idx="3">
+            <a:schemeClr val="accent1"/>
+          </a:fillRef>
+          <a:effectRef idx="2">
+            <a:schemeClr val="accent1"/>
+          </a:effectRef>
+          <a:fontRef idx="minor">
+            <a:schemeClr val="lt1"/>
+          </a:fontRef>
+        </p:style>
+        <p:txBody>
+          <a:bodyPr rtlCol="0" anchor="ctr"/>
+          <a:lstStyle/>
+          <a:p>
+            <a:pPr algn="ctr">
+              <a:defRPr sz="1000" b="0">
+                <a:solidFill>
+                  <a:srgbClr val="1D1D4D"/>
+                </a:solidFill>
+              </a:defRPr>
+            </a:pPr>
+            <a:r>
+              <a:t>SAM</a:t>
+            </a:r>
+          </a:p>
+        </p:txBody>
+      </p:sp>
+      <p:sp>
+        <p:nvSpPr>
+          <p:cNvPr id="30" name="Rectangle 29"/>
+          <p:cNvSpPr/>
+          <p:nvPr/>
+        </p:nvSpPr>
+        <p:spPr>
+          <a:xfrm>
+            <a:off x="5303520" y="2560320"/>
+            <a:ext cx="731520" cy="365760"/>
+          </a:xfrm>
+          <a:prstGeom prst="rect">
+            <a:avLst/>
+          </a:prstGeom>
+          <a:solidFill>
+            <a:srgbClr val="FF991F"/>
+          </a:solidFill>
+          <a:ln>
+            <a:solidFill>
+              <a:srgbClr val="CCCCCC"/>
+            </a:solidFill>
+          </a:ln>
+        </p:spPr>
+        <p:style>
+          <a:lnRef idx="1">
+            <a:schemeClr val="accent1"/>
+          </a:lnRef>
+          <a:fillRef idx="3">
+            <a:schemeClr val="accent1"/>
+          </a:fillRef>
+          <a:effectRef idx="2">
+            <a:schemeClr val="accent1"/>
+          </a:effectRef>
+          <a:fontRef idx="minor">
+            <a:schemeClr val="lt1"/>
+          </a:fontRef>
+        </p:style>
+        <p:txBody>
+          <a:bodyPr rtlCol="0" anchor="ctr"/>
+          <a:lstStyle/>
+          <a:p>
+            <a:pPr algn="ctr">
+              <a:defRPr sz="1000" b="0">
+                <a:solidFill>
+                  <a:srgbClr val="FFFFFF"/>
+                </a:solidFill>
+              </a:defRPr>
+            </a:pPr>
+            <a:r>
+              <a:t>Amber</a:t>
+            </a:r>
+          </a:p>
+        </p:txBody>
+      </p:sp>
+      <p:sp>
+        <p:nvSpPr>
+          <p:cNvPr id="31" name="Rectangle 30"/>
+          <p:cNvSpPr/>
+          <p:nvPr/>
+        </p:nvSpPr>
+        <p:spPr>
+          <a:xfrm>
+            <a:off x="6035040" y="2560320"/>
+            <a:ext cx="914400" cy="365760"/>
+          </a:xfrm>
+          <a:prstGeom prst="rect">
+            <a:avLst/>
+          </a:prstGeom>
+          <a:solidFill>
+            <a:srgbClr val="FFFFFF"/>
+          </a:solidFill>
+          <a:ln>
+            <a:solidFill>
+              <a:srgbClr val="CCCCCC"/>
+            </a:solidFill>
+          </a:ln>
+        </p:spPr>
+        <p:style>
+          <a:lnRef idx="1">
+            <a:schemeClr val="accent1"/>
+          </a:lnRef>
+          <a:fillRef idx="3">
+            <a:schemeClr val="accent1"/>
+          </a:fillRef>
+          <a:effectRef idx="2">
+            <a:schemeClr val="accent1"/>
+          </a:effectRef>
+          <a:fontRef idx="minor">
+            <a:schemeClr val="lt1"/>
+          </a:fontRef>
+        </p:style>
+        <p:txBody>
+          <a:bodyPr rtlCol="0" anchor="ctr"/>
+          <a:lstStyle/>
+          <a:p>
+            <a:pPr algn="ctr">
+              <a:defRPr sz="1000" b="0">
+                <a:solidFill>
+                  <a:srgbClr val="1D1D4D"/>
+                </a:solidFill>
+              </a:defRPr>
+            </a:pPr>
+            <a:r>
+              <a:t>28 Feb</a:t>
+            </a:r>
+          </a:p>
+        </p:txBody>
+      </p:sp>
+      <p:sp>
+        <p:nvSpPr>
+          <p:cNvPr id="32" name="Rectangle 31"/>
+          <p:cNvSpPr/>
+          <p:nvPr/>
+        </p:nvSpPr>
+        <p:spPr>
+          <a:xfrm>
+            <a:off x="6949440" y="2560320"/>
+            <a:ext cx="1828800" cy="365760"/>
+          </a:xfrm>
+          <a:prstGeom prst="rect">
+            <a:avLst/>
+          </a:prstGeom>
+          <a:solidFill>
+            <a:srgbClr val="FFFFFF"/>
+          </a:solidFill>
+          <a:ln>
+            <a:solidFill>
+              <a:srgbClr val="CCCCCC"/>
+            </a:solidFill>
+          </a:ln>
+        </p:spPr>
+        <p:style>
+          <a:lnRef idx="1">
+            <a:schemeClr val="accent1"/>
+          </a:lnRef>
+          <a:fillRef idx="3">
+            <a:schemeClr val="accent1"/>
+          </a:fillRef>
+          <a:effectRef idx="2">
+            <a:schemeClr val="accent1"/>
+          </a:effectRef>
+          <a:fontRef idx="minor">
+            <a:schemeClr val="lt1"/>
+          </a:fontRef>
+        </p:style>
+        <p:txBody>
+          <a:bodyPr rtlCol="0" anchor="ctr"/>
+          <a:lstStyle/>
+          <a:p>
+            <a:pPr algn="ctr">
+              <a:defRPr sz="1000" b="0">
+                <a:solidFill>
+                  <a:srgbClr val="1D1D4D"/>
+                </a:solidFill>
+              </a:defRPr>
+            </a:pPr>
+            <a:r>
+              <a:t>Sam Terrance</a:t>
+            </a:r>
+          </a:p>
+        </p:txBody>
+      </p:sp>
+      <p:sp>
+        <p:nvSpPr>
+          <p:cNvPr id="33" name="TextBox 32"/>
           <p:cNvSpPr txBox="1"/>
           <p:nvPr/>
         </p:nvSpPr>
@@ -10450,7 +10288,7 @@
       </p:sp>
       <p:sp>
         <p:nvSpPr>
-          <p:cNvPr id="29" name="TextBox 28"/>
+          <p:cNvPr id="34" name="TextBox 33"/>
           <p:cNvSpPr txBox="1"/>
           <p:nvPr/>
         </p:nvSpPr>
@@ -10481,7 +10319,7 @@
               </a:defRPr>
             </a:pPr>
             <a:r>
-              <a:t>• Waracle delivery tight (11 Feb) - governance sign-off in progress</a:t>
+              <a:t>• SAM resource ramp-up - QE and Design availability constraints (Feb-Jun)</a:t>
             </a:r>
           </a:p>
           <a:p>
@@ -10496,7 +10334,7 @@
               </a:defRPr>
             </a:pPr>
             <a:r>
-              <a:t>• SAM vendor decision pending (Q2) - Collate capability validation ongoing</a:t>
+              <a:t>• SAM vendor decision pending (Apr) - Collate capability validation ongoing</a:t>
             </a:r>
           </a:p>
           <a:p>
@@ -10511,7 +10349,7 @@
               </a:defRPr>
             </a:pPr>
             <a:r>
-              <a:t>• Growth Case Segmentation re-prioritised to focus on 10to8 &amp; Live Chat</a:t>
+              <a:t>• Growth quarterly releases need scope clarity for Q2 and Q3</a:t>
             </a:r>
           </a:p>
           <a:p>

</xml_diff>

<commit_message>
POAP style slide showing L0/L1 relationships
</commit_message>
<xml_diff>
--- a/Agile_Roadmap_Template_2026.pptx
+++ b/Agile_Roadmap_Template_2026.pptx
@@ -4280,7 +4280,7 @@
               </a:defRPr>
             </a:pPr>
             <a:r>
-              <a:t>Value Stream Roadmap</a:t>
+              <a:t>Mortgage Systems POAP</a:t>
             </a:r>
           </a:p>
         </p:txBody>
@@ -4363,8 +4363,8 @@
         </p:nvSpPr>
         <p:spPr>
           <a:xfrm>
-            <a:off x="2011680" y="822960"/>
-            <a:ext cx="1645920" cy="320040"/>
+            <a:off x="2194560" y="822960"/>
+            <a:ext cx="1554480" cy="320040"/>
           </a:xfrm>
           <a:prstGeom prst="rect">
             <a:avLst/>
@@ -4395,7 +4395,7 @@
           <a:lstStyle/>
           <a:p>
             <a:pPr algn="ctr">
-              <a:defRPr sz="1100" b="1">
+              <a:defRPr sz="1000" b="1">
                 <a:solidFill>
                   <a:srgbClr val="FFFFFF"/>
                 </a:solidFill>
@@ -4415,8 +4415,8 @@
         </p:nvSpPr>
         <p:spPr>
           <a:xfrm>
-            <a:off x="3657600" y="822960"/>
-            <a:ext cx="1645920" cy="320040"/>
+            <a:off x="3749039" y="822960"/>
+            <a:ext cx="1554480" cy="320040"/>
           </a:xfrm>
           <a:prstGeom prst="rect">
             <a:avLst/>
@@ -4447,7 +4447,7 @@
           <a:lstStyle/>
           <a:p>
             <a:pPr algn="ctr">
-              <a:defRPr sz="1100" b="1">
+              <a:defRPr sz="1000" b="1">
                 <a:solidFill>
                   <a:srgbClr val="FFFFFF"/>
                 </a:solidFill>
@@ -4468,7 +4468,7 @@
         <p:spPr>
           <a:xfrm>
             <a:off x="5303520" y="822960"/>
-            <a:ext cx="1645920" cy="320040"/>
+            <a:ext cx="1554480" cy="320040"/>
           </a:xfrm>
           <a:prstGeom prst="rect">
             <a:avLst/>
@@ -4499,7 +4499,7 @@
           <a:lstStyle/>
           <a:p>
             <a:pPr algn="ctr">
-              <a:defRPr sz="1100" b="1">
+              <a:defRPr sz="1000" b="1">
                 <a:solidFill>
                   <a:srgbClr val="FFFFFF"/>
                 </a:solidFill>
@@ -4519,8 +4519,8 @@
         </p:nvSpPr>
         <p:spPr>
           <a:xfrm>
-            <a:off x="6949440" y="822960"/>
-            <a:ext cx="1645920" cy="320040"/>
+            <a:off x="6858000" y="822960"/>
+            <a:ext cx="1554480" cy="320040"/>
           </a:xfrm>
           <a:prstGeom prst="rect">
             <a:avLst/>
@@ -4551,7 +4551,7 @@
           <a:lstStyle/>
           <a:p>
             <a:pPr algn="ctr">
-              <a:defRPr sz="1100" b="1">
+              <a:defRPr sz="1000" b="1">
                 <a:solidFill>
                   <a:srgbClr val="FFFFFF"/>
                 </a:solidFill>
@@ -4571,8 +4571,8 @@
         </p:nvSpPr>
         <p:spPr>
           <a:xfrm>
-            <a:off x="8595360" y="822960"/>
-            <a:ext cx="1645920" cy="320040"/>
+            <a:off x="8412480" y="822960"/>
+            <a:ext cx="1554480" cy="320040"/>
           </a:xfrm>
           <a:prstGeom prst="rect">
             <a:avLst/>
@@ -4603,7 +4603,7 @@
           <a:lstStyle/>
           <a:p>
             <a:pPr algn="ctr">
-              <a:defRPr sz="1100" b="1">
+              <a:defRPr sz="1000" b="1">
                 <a:solidFill>
                   <a:srgbClr val="FFFFFF"/>
                 </a:solidFill>
@@ -4623,8 +4623,8 @@
         </p:nvSpPr>
         <p:spPr>
           <a:xfrm>
-            <a:off x="10241280" y="822960"/>
-            <a:ext cx="1645920" cy="320040"/>
+            <a:off x="9966960" y="822960"/>
+            <a:ext cx="1554480" cy="320040"/>
           </a:xfrm>
           <a:prstGeom prst="rect">
             <a:avLst/>
@@ -4655,7 +4655,7 @@
           <a:lstStyle/>
           <a:p>
             <a:pPr algn="ctr">
-              <a:defRPr sz="1100" b="1">
+              <a:defRPr sz="1000" b="1">
                 <a:solidFill>
                   <a:srgbClr val="FFFFFF"/>
                 </a:solidFill>
@@ -4675,8 +4675,8 @@
         </p:nvSpPr>
         <p:spPr>
           <a:xfrm>
-            <a:off x="0" y="1280160"/>
-            <a:ext cx="12188952" cy="1097280"/>
+            <a:off x="0" y="1234440"/>
+            <a:ext cx="12188952" cy="1005840"/>
           </a:xfrm>
           <a:prstGeom prst="rect">
             <a:avLst/>
@@ -4718,8 +4718,8 @@
         </p:nvSpPr>
         <p:spPr>
           <a:xfrm>
-            <a:off x="182880" y="1463039"/>
-            <a:ext cx="1645920" cy="731520"/>
+            <a:off x="137160" y="1371600"/>
+            <a:ext cx="1920240" cy="822960"/>
           </a:xfrm>
           <a:prstGeom prst="rect">
             <a:avLst/>
@@ -4733,18 +4733,18 @@
           <a:lstStyle/>
           <a:p>
             <a:pPr>
-              <a:defRPr sz="1100" b="1">
+              <a:defRPr sz="1000" b="1">
                 <a:solidFill>
                   <a:srgbClr val="1D1D4D"/>
                 </a:solidFill>
               </a:defRPr>
             </a:pPr>
             <a:r>
-              <a:t>Brochureware</a:t>
+              <a:t>Waracle</a:t>
             </a:r>
             <a:br/>
             <a:r>
-              <a:t>Releases</a:t>
+              <a:t>Calculator</a:t>
             </a:r>
           </a:p>
         </p:txBody>
@@ -4757,8 +4757,8 @@
         </p:nvSpPr>
         <p:spPr>
           <a:xfrm>
-            <a:off x="4407408" y="1600200"/>
-            <a:ext cx="146304" cy="146304"/>
+            <a:off x="3918203" y="1527048"/>
+            <a:ext cx="128016" cy="128016"/>
           </a:xfrm>
           <a:prstGeom prst="diamond">
             <a:avLst/>
@@ -4800,8 +4800,8 @@
         </p:nvSpPr>
         <p:spPr>
           <a:xfrm>
-            <a:off x="4023360" y="1737360"/>
-            <a:ext cx="1097280" cy="457200"/>
+            <a:off x="3616451" y="1673352"/>
+            <a:ext cx="822960" cy="502920"/>
           </a:xfrm>
           <a:prstGeom prst="rect">
             <a:avLst/>
@@ -4815,38 +4815,92 @@
           <a:lstStyle/>
           <a:p>
             <a:pPr algn="ctr">
-              <a:defRPr sz="800">
+              <a:defRPr sz="700">
                 <a:solidFill>
                   <a:srgbClr val="1D1D4D"/>
                 </a:solidFill>
               </a:defRPr>
             </a:pPr>
             <a:r>
-              <a:t>Budget Updates</a:t>
+              <a:t>Governance</a:t>
+            </a:r>
+          </a:p>
+        </p:txBody>
+      </p:sp>
+      <p:sp>
+        <p:nvSpPr>
+          <p:cNvPr id="17" name="Rounded Rectangle 16"/>
+          <p:cNvSpPr/>
+          <p:nvPr/>
+        </p:nvSpPr>
+        <p:spPr>
+          <a:xfrm>
+            <a:off x="3927347" y="1399032"/>
+            <a:ext cx="777240" cy="640080"/>
+          </a:xfrm>
+          <a:prstGeom prst="roundRect">
+            <a:avLst/>
+          </a:prstGeom>
+          <a:solidFill>
+            <a:srgbClr val="36B37E"/>
+          </a:solidFill>
+          <a:ln w="12700">
+            <a:solidFill>
+              <a:srgbClr val="1D1D4D"/>
+            </a:solidFill>
+          </a:ln>
+        </p:spPr>
+        <p:style>
+          <a:lnRef idx="1">
+            <a:schemeClr val="accent1"/>
+          </a:lnRef>
+          <a:fillRef idx="3">
+            <a:schemeClr val="accent1"/>
+          </a:fillRef>
+          <a:effectRef idx="2">
+            <a:schemeClr val="accent1"/>
+          </a:effectRef>
+          <a:fontRef idx="minor">
+            <a:schemeClr val="lt1"/>
+          </a:fontRef>
+        </p:style>
+        <p:txBody>
+          <a:bodyPr rtlCol="0" anchor="ctr" wrap="square"/>
+          <a:lstStyle/>
+          <a:p>
+            <a:pPr algn="ctr">
+              <a:defRPr sz="700" b="1">
+                <a:solidFill>
+                  <a:srgbClr val="FFFFFF"/>
+                </a:solidFill>
+              </a:defRPr>
+            </a:pPr>
+            <a:r>
+              <a:t>L0: Go Live</a:t>
             </a:r>
             <a:br/>
             <a:r>
-              <a:t>19 Feb</a:t>
-            </a:r>
-          </a:p>
-        </p:txBody>
-      </p:sp>
-      <p:sp>
-        <p:nvSpPr>
-          <p:cNvPr id="17" name="Diamond 16"/>
-          <p:cNvSpPr/>
-          <p:nvPr/>
-        </p:nvSpPr>
-        <p:spPr>
-          <a:xfrm>
-            <a:off x="5724144" y="1600200"/>
-            <a:ext cx="146304" cy="146304"/>
-          </a:xfrm>
-          <a:prstGeom prst="diamond">
-            <a:avLst/>
-          </a:prstGeom>
-          <a:solidFill>
-            <a:srgbClr val="1D1D4D"/>
+              <a:t>11 Feb</a:t>
+            </a:r>
+          </a:p>
+        </p:txBody>
+      </p:sp>
+      <p:sp>
+        <p:nvSpPr>
+          <p:cNvPr id="18" name="Rectangle 17"/>
+          <p:cNvSpPr/>
+          <p:nvPr/>
+        </p:nvSpPr>
+        <p:spPr>
+          <a:xfrm>
+            <a:off x="0" y="2240280"/>
+            <a:ext cx="12188952" cy="1005840"/>
+          </a:xfrm>
+          <a:prstGeom prst="rect">
+            <a:avLst/>
+          </a:prstGeom>
+          <a:solidFill>
+            <a:srgbClr val="FFFFFF"/>
           </a:solidFill>
           <a:ln>
             <a:noFill/>
@@ -4876,14 +4930,14 @@
       </p:sp>
       <p:sp>
         <p:nvSpPr>
-          <p:cNvPr id="18" name="TextBox 17"/>
+          <p:cNvPr id="19" name="TextBox 18"/>
           <p:cNvSpPr txBox="1"/>
           <p:nvPr/>
         </p:nvSpPr>
         <p:spPr>
           <a:xfrm>
-            <a:off x="5340096" y="1737360"/>
-            <a:ext cx="1097280" cy="457200"/>
+            <a:off x="137160" y="2377440"/>
+            <a:ext cx="1920240" cy="822960"/>
           </a:xfrm>
           <a:prstGeom prst="rect">
             <a:avLst/>
@@ -4896,33 +4950,33 @@
           </a:bodyPr>
           <a:lstStyle/>
           <a:p>
-            <a:pPr algn="ctr">
-              <a:defRPr sz="800">
+            <a:pPr>
+              <a:defRPr sz="1000" b="1">
                 <a:solidFill>
                   <a:srgbClr val="1D1D4D"/>
                 </a:solidFill>
               </a:defRPr>
             </a:pPr>
             <a:r>
-              <a:t>PTO Synergy</a:t>
+              <a:t>Direct</a:t>
             </a:r>
             <a:br/>
             <a:r>
-              <a:t>30 Apr</a:t>
-            </a:r>
-          </a:p>
-        </p:txBody>
-      </p:sp>
-      <p:sp>
-        <p:nvSpPr>
-          <p:cNvPr id="19" name="Diamond 18"/>
-          <p:cNvSpPr/>
-          <p:nvPr/>
-        </p:nvSpPr>
-        <p:spPr>
-          <a:xfrm>
-            <a:off x="6217920" y="1600200"/>
-            <a:ext cx="146304" cy="146304"/>
+              <a:t>Website</a:t>
+            </a:r>
+          </a:p>
+        </p:txBody>
+      </p:sp>
+      <p:sp>
+        <p:nvSpPr>
+          <p:cNvPr id="20" name="Diamond 19"/>
+          <p:cNvSpPr/>
+          <p:nvPr/>
+        </p:nvSpPr>
+        <p:spPr>
+          <a:xfrm>
+            <a:off x="3995927" y="2532888"/>
+            <a:ext cx="128016" cy="128016"/>
           </a:xfrm>
           <a:prstGeom prst="diamond">
             <a:avLst/>
@@ -4958,14 +5012,14 @@
       </p:sp>
       <p:sp>
         <p:nvSpPr>
-          <p:cNvPr id="20" name="TextBox 19"/>
+          <p:cNvPr id="21" name="TextBox 20"/>
           <p:cNvSpPr txBox="1"/>
           <p:nvPr/>
         </p:nvSpPr>
         <p:spPr>
           <a:xfrm>
-            <a:off x="5833872" y="1737360"/>
-            <a:ext cx="1097280" cy="457200"/>
+            <a:off x="3694175" y="2679192"/>
+            <a:ext cx="822960" cy="502920"/>
           </a:xfrm>
           <a:prstGeom prst="rect">
             <a:avLst/>
@@ -4979,38 +5033,38 @@
           <a:lstStyle/>
           <a:p>
             <a:pPr algn="ctr">
-              <a:defRPr sz="800">
+              <a:defRPr sz="700">
                 <a:solidFill>
                   <a:srgbClr val="1D1D4D"/>
                 </a:solidFill>
               </a:defRPr>
             </a:pPr>
             <a:r>
-              <a:t>VM Indirect</a:t>
+              <a:t>CBIS</a:t>
             </a:r>
             <a:br/>
             <a:r>
-              <a:t>31 May</a:t>
-            </a:r>
-          </a:p>
-        </p:txBody>
-      </p:sp>
-      <p:sp>
-        <p:nvSpPr>
-          <p:cNvPr id="21" name="Rectangle 20"/>
-          <p:cNvSpPr/>
-          <p:nvPr/>
-        </p:nvSpPr>
-        <p:spPr>
-          <a:xfrm>
-            <a:off x="0" y="2377439"/>
-            <a:ext cx="12188952" cy="1097280"/>
-          </a:xfrm>
-          <a:prstGeom prst="rect">
-            <a:avLst/>
-          </a:prstGeom>
-          <a:solidFill>
-            <a:srgbClr val="FFFFFF"/>
+              <a:t>Rebrand</a:t>
+            </a:r>
+          </a:p>
+        </p:txBody>
+      </p:sp>
+      <p:sp>
+        <p:nvSpPr>
+          <p:cNvPr id="22" name="Diamond 21"/>
+          <p:cNvSpPr/>
+          <p:nvPr/>
+        </p:nvSpPr>
+        <p:spPr>
+          <a:xfrm>
+            <a:off x="4539996" y="2532888"/>
+            <a:ext cx="128016" cy="128016"/>
+          </a:xfrm>
+          <a:prstGeom prst="diamond">
+            <a:avLst/>
+          </a:prstGeom>
+          <a:solidFill>
+            <a:srgbClr val="1D1D4D"/>
           </a:solidFill>
           <a:ln>
             <a:noFill/>
@@ -5040,14 +5094,14 @@
       </p:sp>
       <p:sp>
         <p:nvSpPr>
-          <p:cNvPr id="22" name="TextBox 21"/>
+          <p:cNvPr id="23" name="TextBox 22"/>
           <p:cNvSpPr txBox="1"/>
           <p:nvPr/>
         </p:nvSpPr>
         <p:spPr>
           <a:xfrm>
-            <a:off x="182880" y="2560320"/>
-            <a:ext cx="1645920" cy="731520"/>
+            <a:off x="4238244" y="2679192"/>
+            <a:ext cx="822960" cy="502920"/>
           </a:xfrm>
           <a:prstGeom prst="rect">
             <a:avLst/>
@@ -5060,39 +5114,97 @@
           </a:bodyPr>
           <a:lstStyle/>
           <a:p>
-            <a:pPr>
-              <a:defRPr sz="1100" b="1">
+            <a:pPr algn="ctr">
+              <a:defRPr sz="700">
                 <a:solidFill>
                   <a:srgbClr val="1D1D4D"/>
                 </a:solidFill>
               </a:defRPr>
             </a:pPr>
             <a:r>
-              <a:t>Growth</a:t>
+              <a:t>Re-platform</a:t>
             </a:r>
             <a:br/>
             <a:r>
-              <a:t>Releases</a:t>
-            </a:r>
-          </a:p>
-        </p:txBody>
-      </p:sp>
-      <p:sp>
-        <p:nvSpPr>
-          <p:cNvPr id="23" name="Diamond 22"/>
-          <p:cNvSpPr/>
-          <p:nvPr/>
-        </p:nvSpPr>
-        <p:spPr>
-          <a:xfrm>
-            <a:off x="6793992" y="2697479"/>
-            <a:ext cx="146304" cy="146304"/>
-          </a:xfrm>
-          <a:prstGeom prst="diamond">
-            <a:avLst/>
-          </a:prstGeom>
-          <a:solidFill>
-            <a:srgbClr val="1D1D4D"/>
+              <a:t>Build</a:t>
+            </a:r>
+          </a:p>
+        </p:txBody>
+      </p:sp>
+      <p:sp>
+        <p:nvSpPr>
+          <p:cNvPr id="24" name="Rounded Rectangle 23"/>
+          <p:cNvSpPr/>
+          <p:nvPr/>
+        </p:nvSpPr>
+        <p:spPr>
+          <a:xfrm>
+            <a:off x="5015483" y="2404872"/>
+            <a:ext cx="777240" cy="640080"/>
+          </a:xfrm>
+          <a:prstGeom prst="roundRect">
+            <a:avLst/>
+          </a:prstGeom>
+          <a:solidFill>
+            <a:srgbClr val="36B37E"/>
+          </a:solidFill>
+          <a:ln w="12700">
+            <a:solidFill>
+              <a:srgbClr val="1D1D4D"/>
+            </a:solidFill>
+          </a:ln>
+        </p:spPr>
+        <p:style>
+          <a:lnRef idx="1">
+            <a:schemeClr val="accent1"/>
+          </a:lnRef>
+          <a:fillRef idx="3">
+            <a:schemeClr val="accent1"/>
+          </a:fillRef>
+          <a:effectRef idx="2">
+            <a:schemeClr val="accent1"/>
+          </a:effectRef>
+          <a:fontRef idx="minor">
+            <a:schemeClr val="lt1"/>
+          </a:fontRef>
+        </p:style>
+        <p:txBody>
+          <a:bodyPr rtlCol="0" anchor="ctr" wrap="square"/>
+          <a:lstStyle/>
+          <a:p>
+            <a:pPr algn="ctr">
+              <a:defRPr sz="700" b="1">
+                <a:solidFill>
+                  <a:srgbClr val="FFFFFF"/>
+                </a:solidFill>
+              </a:defRPr>
+            </a:pPr>
+            <a:r>
+              <a:t>L0: FSMA</a:t>
+            </a:r>
+            <a:br/>
+            <a:r>
+              <a:t>2 Apr</a:t>
+            </a:r>
+          </a:p>
+        </p:txBody>
+      </p:sp>
+      <p:sp>
+        <p:nvSpPr>
+          <p:cNvPr id="25" name="Rectangle 24"/>
+          <p:cNvSpPr/>
+          <p:nvPr/>
+        </p:nvSpPr>
+        <p:spPr>
+          <a:xfrm>
+            <a:off x="0" y="3246120"/>
+            <a:ext cx="12188952" cy="1005840"/>
+          </a:xfrm>
+          <a:prstGeom prst="rect">
+            <a:avLst/>
+          </a:prstGeom>
+          <a:solidFill>
+            <a:srgbClr val="E6EEF5"/>
           </a:solidFill>
           <a:ln>
             <a:noFill/>
@@ -5122,14 +5234,14 @@
       </p:sp>
       <p:sp>
         <p:nvSpPr>
-          <p:cNvPr id="24" name="TextBox 23"/>
+          <p:cNvPr id="26" name="TextBox 25"/>
           <p:cNvSpPr txBox="1"/>
           <p:nvPr/>
         </p:nvSpPr>
         <p:spPr>
           <a:xfrm>
-            <a:off x="6409944" y="2834639"/>
-            <a:ext cx="1097280" cy="457200"/>
+            <a:off x="137160" y="3383280"/>
+            <a:ext cx="1920240" cy="822960"/>
           </a:xfrm>
           <a:prstGeom prst="rect">
             <a:avLst/>
@@ -5142,33 +5254,29 @@
           </a:bodyPr>
           <a:lstStyle/>
           <a:p>
-            <a:pPr algn="ctr">
-              <a:defRPr sz="800">
+            <a:pPr>
+              <a:defRPr sz="1000" b="1">
                 <a:solidFill>
                   <a:srgbClr val="1D1D4D"/>
                 </a:solidFill>
               </a:defRPr>
             </a:pPr>
             <a:r>
-              <a:t>Q2 Release</a:t>
-            </a:r>
-            <a:br/>
-            <a:r>
-              <a:t>30 Jun</a:t>
-            </a:r>
-          </a:p>
-        </p:txBody>
-      </p:sp>
-      <p:sp>
-        <p:nvSpPr>
-          <p:cNvPr id="25" name="Diamond 24"/>
-          <p:cNvSpPr/>
-          <p:nvPr/>
-        </p:nvSpPr>
-        <p:spPr>
-          <a:xfrm>
-            <a:off x="8439912" y="2697479"/>
-            <a:ext cx="146304" cy="146304"/>
+              <a:t>Growth</a:t>
+            </a:r>
+          </a:p>
+        </p:txBody>
+      </p:sp>
+      <p:sp>
+        <p:nvSpPr>
+          <p:cNvPr id="27" name="Diamond 26"/>
+          <p:cNvSpPr/>
+          <p:nvPr/>
+        </p:nvSpPr>
+        <p:spPr>
+          <a:xfrm>
+            <a:off x="4384547" y="3538728"/>
+            <a:ext cx="128016" cy="128016"/>
           </a:xfrm>
           <a:prstGeom prst="diamond">
             <a:avLst/>
@@ -5204,14 +5312,14 @@
       </p:sp>
       <p:sp>
         <p:nvSpPr>
-          <p:cNvPr id="26" name="TextBox 25"/>
+          <p:cNvPr id="28" name="TextBox 27"/>
           <p:cNvSpPr txBox="1"/>
           <p:nvPr/>
         </p:nvSpPr>
         <p:spPr>
           <a:xfrm>
-            <a:off x="8055864" y="2834639"/>
-            <a:ext cx="1097280" cy="457200"/>
+            <a:off x="4082795" y="3685032"/>
+            <a:ext cx="822960" cy="502920"/>
           </a:xfrm>
           <a:prstGeom prst="rect">
             <a:avLst/>
@@ -5225,38 +5333,38 @@
           <a:lstStyle/>
           <a:p>
             <a:pPr algn="ctr">
-              <a:defRPr sz="800">
+              <a:defRPr sz="700">
                 <a:solidFill>
                   <a:srgbClr val="1D1D4D"/>
                 </a:solidFill>
               </a:defRPr>
             </a:pPr>
             <a:r>
-              <a:t>Q3 Release</a:t>
+              <a:t>10to8</a:t>
             </a:r>
             <a:br/>
             <a:r>
-              <a:t>30 Sep</a:t>
-            </a:r>
-          </a:p>
-        </p:txBody>
-      </p:sp>
-      <p:sp>
-        <p:nvSpPr>
-          <p:cNvPr id="27" name="Rectangle 26"/>
-          <p:cNvSpPr/>
-          <p:nvPr/>
-        </p:nvSpPr>
-        <p:spPr>
-          <a:xfrm>
-            <a:off x="3749039" y="822960"/>
-            <a:ext cx="18288" cy="2560320"/>
-          </a:xfrm>
-          <a:prstGeom prst="rect">
-            <a:avLst/>
-          </a:prstGeom>
-          <a:solidFill>
-            <a:srgbClr val="E50050"/>
+              <a:t>18 Feb</a:t>
+            </a:r>
+          </a:p>
+        </p:txBody>
+      </p:sp>
+      <p:sp>
+        <p:nvSpPr>
+          <p:cNvPr id="29" name="Diamond 28"/>
+          <p:cNvSpPr/>
+          <p:nvPr/>
+        </p:nvSpPr>
+        <p:spPr>
+          <a:xfrm>
+            <a:off x="6716268" y="3538728"/>
+            <a:ext cx="128016" cy="128016"/>
+          </a:xfrm>
+          <a:prstGeom prst="diamond">
+            <a:avLst/>
+          </a:prstGeom>
+          <a:solidFill>
+            <a:srgbClr val="1D1D4D"/>
           </a:solidFill>
           <a:ln>
             <a:noFill/>
@@ -5286,14 +5394,868 @@
       </p:sp>
       <p:sp>
         <p:nvSpPr>
-          <p:cNvPr id="28" name="TextBox 27"/>
+          <p:cNvPr id="30" name="TextBox 29"/>
           <p:cNvSpPr txBox="1"/>
           <p:nvPr/>
         </p:nvSpPr>
         <p:spPr>
           <a:xfrm>
-            <a:off x="3566159" y="3474720"/>
-            <a:ext cx="457200" cy="274320"/>
+            <a:off x="6414516" y="3685032"/>
+            <a:ext cx="822960" cy="502920"/>
+          </a:xfrm>
+          <a:prstGeom prst="rect">
+            <a:avLst/>
+          </a:prstGeom>
+          <a:noFill/>
+        </p:spPr>
+        <p:txBody>
+          <a:bodyPr wrap="square">
+            <a:spAutoFit/>
+          </a:bodyPr>
+          <a:lstStyle/>
+          <a:p>
+            <a:pPr algn="ctr">
+              <a:defRPr sz="700">
+                <a:solidFill>
+                  <a:srgbClr val="1D1D4D"/>
+                </a:solidFill>
+              </a:defRPr>
+            </a:pPr>
+            <a:r>
+              <a:t>Q2</a:t>
+            </a:r>
+            <a:br/>
+            <a:r>
+              <a:t>Release</a:t>
+            </a:r>
+          </a:p>
+        </p:txBody>
+      </p:sp>
+      <p:sp>
+        <p:nvSpPr>
+          <p:cNvPr id="31" name="Diamond 30"/>
+          <p:cNvSpPr/>
+          <p:nvPr/>
+        </p:nvSpPr>
+        <p:spPr>
+          <a:xfrm>
+            <a:off x="8270748" y="3538728"/>
+            <a:ext cx="128016" cy="128016"/>
+          </a:xfrm>
+          <a:prstGeom prst="diamond">
+            <a:avLst/>
+          </a:prstGeom>
+          <a:solidFill>
+            <a:srgbClr val="1D1D4D"/>
+          </a:solidFill>
+          <a:ln>
+            <a:noFill/>
+          </a:ln>
+        </p:spPr>
+        <p:style>
+          <a:lnRef idx="1">
+            <a:schemeClr val="accent1"/>
+          </a:lnRef>
+          <a:fillRef idx="3">
+            <a:schemeClr val="accent1"/>
+          </a:fillRef>
+          <a:effectRef idx="2">
+            <a:schemeClr val="accent1"/>
+          </a:effectRef>
+          <a:fontRef idx="minor">
+            <a:schemeClr val="lt1"/>
+          </a:fontRef>
+        </p:style>
+        <p:txBody>
+          <a:bodyPr rtlCol="0" anchor="ctr"/>
+          <a:lstStyle/>
+          <a:p>
+            <a:pPr algn="ctr"/>
+          </a:p>
+        </p:txBody>
+      </p:sp>
+      <p:sp>
+        <p:nvSpPr>
+          <p:cNvPr id="32" name="TextBox 31"/>
+          <p:cNvSpPr txBox="1"/>
+          <p:nvPr/>
+        </p:nvSpPr>
+        <p:spPr>
+          <a:xfrm>
+            <a:off x="7968996" y="3685032"/>
+            <a:ext cx="822960" cy="502920"/>
+          </a:xfrm>
+          <a:prstGeom prst="rect">
+            <a:avLst/>
+          </a:prstGeom>
+          <a:noFill/>
+        </p:spPr>
+        <p:txBody>
+          <a:bodyPr wrap="square">
+            <a:spAutoFit/>
+          </a:bodyPr>
+          <a:lstStyle/>
+          <a:p>
+            <a:pPr algn="ctr">
+              <a:defRPr sz="700">
+                <a:solidFill>
+                  <a:srgbClr val="1D1D4D"/>
+                </a:solidFill>
+              </a:defRPr>
+            </a:pPr>
+            <a:r>
+              <a:t>Q3</a:t>
+            </a:r>
+            <a:br/>
+            <a:r>
+              <a:t>Release</a:t>
+            </a:r>
+          </a:p>
+        </p:txBody>
+      </p:sp>
+      <p:sp>
+        <p:nvSpPr>
+          <p:cNvPr id="33" name="Rounded Rectangle 32"/>
+          <p:cNvSpPr/>
+          <p:nvPr/>
+        </p:nvSpPr>
+        <p:spPr>
+          <a:xfrm>
+            <a:off x="10067544" y="3410712"/>
+            <a:ext cx="777240" cy="640080"/>
+          </a:xfrm>
+          <a:prstGeom prst="roundRect">
+            <a:avLst/>
+          </a:prstGeom>
+          <a:solidFill>
+            <a:srgbClr val="36B37E"/>
+          </a:solidFill>
+          <a:ln w="12700">
+            <a:solidFill>
+              <a:srgbClr val="1D1D4D"/>
+            </a:solidFill>
+          </a:ln>
+        </p:spPr>
+        <p:style>
+          <a:lnRef idx="1">
+            <a:schemeClr val="accent1"/>
+          </a:lnRef>
+          <a:fillRef idx="3">
+            <a:schemeClr val="accent1"/>
+          </a:fillRef>
+          <a:effectRef idx="2">
+            <a:schemeClr val="accent1"/>
+          </a:effectRef>
+          <a:fontRef idx="minor">
+            <a:schemeClr val="lt1"/>
+          </a:fontRef>
+        </p:style>
+        <p:txBody>
+          <a:bodyPr rtlCol="0" anchor="ctr" wrap="square"/>
+          <a:lstStyle/>
+          <a:p>
+            <a:pPr algn="ctr">
+              <a:defRPr sz="700" b="1">
+                <a:solidFill>
+                  <a:srgbClr val="FFFFFF"/>
+                </a:solidFill>
+              </a:defRPr>
+            </a:pPr>
+            <a:r>
+              <a:t>L0: FY27</a:t>
+            </a:r>
+            <a:br/>
+            <a:r>
+              <a:t>31 Mar 27</a:t>
+            </a:r>
+          </a:p>
+        </p:txBody>
+      </p:sp>
+      <p:sp>
+        <p:nvSpPr>
+          <p:cNvPr id="34" name="Rectangle 33"/>
+          <p:cNvSpPr/>
+          <p:nvPr/>
+        </p:nvSpPr>
+        <p:spPr>
+          <a:xfrm>
+            <a:off x="0" y="4251960"/>
+            <a:ext cx="12188952" cy="1005840"/>
+          </a:xfrm>
+          <a:prstGeom prst="rect">
+            <a:avLst/>
+          </a:prstGeom>
+          <a:solidFill>
+            <a:srgbClr val="FFFFFF"/>
+          </a:solidFill>
+          <a:ln>
+            <a:noFill/>
+          </a:ln>
+        </p:spPr>
+        <p:style>
+          <a:lnRef idx="1">
+            <a:schemeClr val="accent1"/>
+          </a:lnRef>
+          <a:fillRef idx="3">
+            <a:schemeClr val="accent1"/>
+          </a:fillRef>
+          <a:effectRef idx="2">
+            <a:schemeClr val="accent1"/>
+          </a:effectRef>
+          <a:fontRef idx="minor">
+            <a:schemeClr val="lt1"/>
+          </a:fontRef>
+        </p:style>
+        <p:txBody>
+          <a:bodyPr rtlCol="0" anchor="ctr"/>
+          <a:lstStyle/>
+          <a:p>
+            <a:pPr algn="ctr"/>
+          </a:p>
+        </p:txBody>
+      </p:sp>
+      <p:sp>
+        <p:nvSpPr>
+          <p:cNvPr id="35" name="TextBox 34"/>
+          <p:cNvSpPr txBox="1"/>
+          <p:nvPr/>
+        </p:nvSpPr>
+        <p:spPr>
+          <a:xfrm>
+            <a:off x="137160" y="4389120"/>
+            <a:ext cx="1920240" cy="822960"/>
+          </a:xfrm>
+          <a:prstGeom prst="rect">
+            <a:avLst/>
+          </a:prstGeom>
+          <a:noFill/>
+        </p:spPr>
+        <p:txBody>
+          <a:bodyPr wrap="square">
+            <a:spAutoFit/>
+          </a:bodyPr>
+          <a:lstStyle/>
+          <a:p>
+            <a:pPr>
+              <a:defRPr sz="1000" b="1">
+                <a:solidFill>
+                  <a:srgbClr val="1D1D4D"/>
+                </a:solidFill>
+              </a:defRPr>
+            </a:pPr>
+            <a:r>
+              <a:t>Brochureware</a:t>
+            </a:r>
+            <a:br/>
+            <a:r>
+              <a:t>BAU</a:t>
+            </a:r>
+          </a:p>
+        </p:txBody>
+      </p:sp>
+      <p:sp>
+        <p:nvSpPr>
+          <p:cNvPr id="36" name="Diamond 35"/>
+          <p:cNvSpPr/>
+          <p:nvPr/>
+        </p:nvSpPr>
+        <p:spPr>
+          <a:xfrm>
+            <a:off x="4462271" y="4544568"/>
+            <a:ext cx="128016" cy="128016"/>
+          </a:xfrm>
+          <a:prstGeom prst="diamond">
+            <a:avLst/>
+          </a:prstGeom>
+          <a:solidFill>
+            <a:srgbClr val="1D1D4D"/>
+          </a:solidFill>
+          <a:ln>
+            <a:noFill/>
+          </a:ln>
+        </p:spPr>
+        <p:style>
+          <a:lnRef idx="1">
+            <a:schemeClr val="accent1"/>
+          </a:lnRef>
+          <a:fillRef idx="3">
+            <a:schemeClr val="accent1"/>
+          </a:fillRef>
+          <a:effectRef idx="2">
+            <a:schemeClr val="accent1"/>
+          </a:effectRef>
+          <a:fontRef idx="minor">
+            <a:schemeClr val="lt1"/>
+          </a:fontRef>
+        </p:style>
+        <p:txBody>
+          <a:bodyPr rtlCol="0" anchor="ctr"/>
+          <a:lstStyle/>
+          <a:p>
+            <a:pPr algn="ctr"/>
+          </a:p>
+        </p:txBody>
+      </p:sp>
+      <p:sp>
+        <p:nvSpPr>
+          <p:cNvPr id="37" name="TextBox 36"/>
+          <p:cNvSpPr txBox="1"/>
+          <p:nvPr/>
+        </p:nvSpPr>
+        <p:spPr>
+          <a:xfrm>
+            <a:off x="4160519" y="4690872"/>
+            <a:ext cx="822960" cy="502920"/>
+          </a:xfrm>
+          <a:prstGeom prst="rect">
+            <a:avLst/>
+          </a:prstGeom>
+          <a:noFill/>
+        </p:spPr>
+        <p:txBody>
+          <a:bodyPr wrap="square">
+            <a:spAutoFit/>
+          </a:bodyPr>
+          <a:lstStyle/>
+          <a:p>
+            <a:pPr algn="ctr">
+              <a:defRPr sz="700">
+                <a:solidFill>
+                  <a:srgbClr val="1D1D4D"/>
+                </a:solidFill>
+              </a:defRPr>
+            </a:pPr>
+            <a:r>
+              <a:t>Budget</a:t>
+            </a:r>
+            <a:br/>
+            <a:r>
+              <a:t>Updates</a:t>
+            </a:r>
+          </a:p>
+        </p:txBody>
+      </p:sp>
+      <p:sp>
+        <p:nvSpPr>
+          <p:cNvPr id="38" name="Diamond 37"/>
+          <p:cNvSpPr/>
+          <p:nvPr/>
+        </p:nvSpPr>
+        <p:spPr>
+          <a:xfrm>
+            <a:off x="5783579" y="4544568"/>
+            <a:ext cx="128016" cy="128016"/>
+          </a:xfrm>
+          <a:prstGeom prst="diamond">
+            <a:avLst/>
+          </a:prstGeom>
+          <a:solidFill>
+            <a:srgbClr val="1D1D4D"/>
+          </a:solidFill>
+          <a:ln>
+            <a:noFill/>
+          </a:ln>
+        </p:spPr>
+        <p:style>
+          <a:lnRef idx="1">
+            <a:schemeClr val="accent1"/>
+          </a:lnRef>
+          <a:fillRef idx="3">
+            <a:schemeClr val="accent1"/>
+          </a:fillRef>
+          <a:effectRef idx="2">
+            <a:schemeClr val="accent1"/>
+          </a:effectRef>
+          <a:fontRef idx="minor">
+            <a:schemeClr val="lt1"/>
+          </a:fontRef>
+        </p:style>
+        <p:txBody>
+          <a:bodyPr rtlCol="0" anchor="ctr"/>
+          <a:lstStyle/>
+          <a:p>
+            <a:pPr algn="ctr"/>
+          </a:p>
+        </p:txBody>
+      </p:sp>
+      <p:sp>
+        <p:nvSpPr>
+          <p:cNvPr id="39" name="TextBox 38"/>
+          <p:cNvSpPr txBox="1"/>
+          <p:nvPr/>
+        </p:nvSpPr>
+        <p:spPr>
+          <a:xfrm>
+            <a:off x="5481827" y="4690872"/>
+            <a:ext cx="822960" cy="502920"/>
+          </a:xfrm>
+          <a:prstGeom prst="rect">
+            <a:avLst/>
+          </a:prstGeom>
+          <a:noFill/>
+        </p:spPr>
+        <p:txBody>
+          <a:bodyPr wrap="square">
+            <a:spAutoFit/>
+          </a:bodyPr>
+          <a:lstStyle/>
+          <a:p>
+            <a:pPr algn="ctr">
+              <a:defRPr sz="700">
+                <a:solidFill>
+                  <a:srgbClr val="1D1D4D"/>
+                </a:solidFill>
+              </a:defRPr>
+            </a:pPr>
+            <a:r>
+              <a:t>PTO</a:t>
+            </a:r>
+            <a:br/>
+            <a:r>
+              <a:t>Synergy</a:t>
+            </a:r>
+          </a:p>
+        </p:txBody>
+      </p:sp>
+      <p:sp>
+        <p:nvSpPr>
+          <p:cNvPr id="40" name="Diamond 39"/>
+          <p:cNvSpPr/>
+          <p:nvPr/>
+        </p:nvSpPr>
+        <p:spPr>
+          <a:xfrm>
+            <a:off x="6249923" y="4544568"/>
+            <a:ext cx="128016" cy="128016"/>
+          </a:xfrm>
+          <a:prstGeom prst="diamond">
+            <a:avLst/>
+          </a:prstGeom>
+          <a:solidFill>
+            <a:srgbClr val="1D1D4D"/>
+          </a:solidFill>
+          <a:ln>
+            <a:noFill/>
+          </a:ln>
+        </p:spPr>
+        <p:style>
+          <a:lnRef idx="1">
+            <a:schemeClr val="accent1"/>
+          </a:lnRef>
+          <a:fillRef idx="3">
+            <a:schemeClr val="accent1"/>
+          </a:fillRef>
+          <a:effectRef idx="2">
+            <a:schemeClr val="accent1"/>
+          </a:effectRef>
+          <a:fontRef idx="minor">
+            <a:schemeClr val="lt1"/>
+          </a:fontRef>
+        </p:style>
+        <p:txBody>
+          <a:bodyPr rtlCol="0" anchor="ctr"/>
+          <a:lstStyle/>
+          <a:p>
+            <a:pPr algn="ctr"/>
+          </a:p>
+        </p:txBody>
+      </p:sp>
+      <p:sp>
+        <p:nvSpPr>
+          <p:cNvPr id="41" name="TextBox 40"/>
+          <p:cNvSpPr txBox="1"/>
+          <p:nvPr/>
+        </p:nvSpPr>
+        <p:spPr>
+          <a:xfrm>
+            <a:off x="5948171" y="4690872"/>
+            <a:ext cx="822960" cy="502920"/>
+          </a:xfrm>
+          <a:prstGeom prst="rect">
+            <a:avLst/>
+          </a:prstGeom>
+          <a:noFill/>
+        </p:spPr>
+        <p:txBody>
+          <a:bodyPr wrap="square">
+            <a:spAutoFit/>
+          </a:bodyPr>
+          <a:lstStyle/>
+          <a:p>
+            <a:pPr algn="ctr">
+              <a:defRPr sz="700">
+                <a:solidFill>
+                  <a:srgbClr val="1D1D4D"/>
+                </a:solidFill>
+              </a:defRPr>
+            </a:pPr>
+            <a:r>
+              <a:t>VM</a:t>
+            </a:r>
+            <a:br/>
+            <a:r>
+              <a:t>Indirect</a:t>
+            </a:r>
+          </a:p>
+        </p:txBody>
+      </p:sp>
+      <p:sp>
+        <p:nvSpPr>
+          <p:cNvPr id="42" name="Rectangle 41"/>
+          <p:cNvSpPr/>
+          <p:nvPr/>
+        </p:nvSpPr>
+        <p:spPr>
+          <a:xfrm>
+            <a:off x="0" y="5257800"/>
+            <a:ext cx="12188952" cy="1005840"/>
+          </a:xfrm>
+          <a:prstGeom prst="rect">
+            <a:avLst/>
+          </a:prstGeom>
+          <a:solidFill>
+            <a:srgbClr val="E6EEF5"/>
+          </a:solidFill>
+          <a:ln>
+            <a:noFill/>
+          </a:ln>
+        </p:spPr>
+        <p:style>
+          <a:lnRef idx="1">
+            <a:schemeClr val="accent1"/>
+          </a:lnRef>
+          <a:fillRef idx="3">
+            <a:schemeClr val="accent1"/>
+          </a:fillRef>
+          <a:effectRef idx="2">
+            <a:schemeClr val="accent1"/>
+          </a:effectRef>
+          <a:fontRef idx="minor">
+            <a:schemeClr val="lt1"/>
+          </a:fontRef>
+        </p:style>
+        <p:txBody>
+          <a:bodyPr rtlCol="0" anchor="ctr"/>
+          <a:lstStyle/>
+          <a:p>
+            <a:pPr algn="ctr"/>
+          </a:p>
+        </p:txBody>
+      </p:sp>
+      <p:sp>
+        <p:nvSpPr>
+          <p:cNvPr id="43" name="TextBox 42"/>
+          <p:cNvSpPr txBox="1"/>
+          <p:nvPr/>
+        </p:nvSpPr>
+        <p:spPr>
+          <a:xfrm>
+            <a:off x="137160" y="5394960"/>
+            <a:ext cx="1920240" cy="822960"/>
+          </a:xfrm>
+          <a:prstGeom prst="rect">
+            <a:avLst/>
+          </a:prstGeom>
+          <a:noFill/>
+        </p:spPr>
+        <p:txBody>
+          <a:bodyPr wrap="square">
+            <a:spAutoFit/>
+          </a:bodyPr>
+          <a:lstStyle/>
+          <a:p>
+            <a:pPr>
+              <a:defRPr sz="1000" b="1">
+                <a:solidFill>
+                  <a:srgbClr val="1D1D4D"/>
+                </a:solidFill>
+              </a:defRPr>
+            </a:pPr>
+            <a:r>
+              <a:t>SAM</a:t>
+            </a:r>
+            <a:br/>
+            <a:r>
+              <a:t>Replacement</a:t>
+            </a:r>
+          </a:p>
+        </p:txBody>
+      </p:sp>
+      <p:sp>
+        <p:nvSpPr>
+          <p:cNvPr id="44" name="Diamond 43"/>
+          <p:cNvSpPr/>
+          <p:nvPr/>
+        </p:nvSpPr>
+        <p:spPr>
+          <a:xfrm>
+            <a:off x="4850892" y="5550408"/>
+            <a:ext cx="128016" cy="128016"/>
+          </a:xfrm>
+          <a:prstGeom prst="diamond">
+            <a:avLst/>
+          </a:prstGeom>
+          <a:solidFill>
+            <a:srgbClr val="1D1D4D"/>
+          </a:solidFill>
+          <a:ln>
+            <a:noFill/>
+          </a:ln>
+        </p:spPr>
+        <p:style>
+          <a:lnRef idx="1">
+            <a:schemeClr val="accent1"/>
+          </a:lnRef>
+          <a:fillRef idx="3">
+            <a:schemeClr val="accent1"/>
+          </a:fillRef>
+          <a:effectRef idx="2">
+            <a:schemeClr val="accent1"/>
+          </a:effectRef>
+          <a:fontRef idx="minor">
+            <a:schemeClr val="lt1"/>
+          </a:fontRef>
+        </p:style>
+        <p:txBody>
+          <a:bodyPr rtlCol="0" anchor="ctr"/>
+          <a:lstStyle/>
+          <a:p>
+            <a:pPr algn="ctr"/>
+          </a:p>
+        </p:txBody>
+      </p:sp>
+      <p:sp>
+        <p:nvSpPr>
+          <p:cNvPr id="45" name="TextBox 44"/>
+          <p:cNvSpPr txBox="1"/>
+          <p:nvPr/>
+        </p:nvSpPr>
+        <p:spPr>
+          <a:xfrm>
+            <a:off x="4549140" y="5696712"/>
+            <a:ext cx="822960" cy="502920"/>
+          </a:xfrm>
+          <a:prstGeom prst="rect">
+            <a:avLst/>
+          </a:prstGeom>
+          <a:noFill/>
+        </p:spPr>
+        <p:txBody>
+          <a:bodyPr wrap="square">
+            <a:spAutoFit/>
+          </a:bodyPr>
+          <a:lstStyle/>
+          <a:p>
+            <a:pPr algn="ctr">
+              <a:defRPr sz="700">
+                <a:solidFill>
+                  <a:srgbClr val="1D1D4D"/>
+                </a:solidFill>
+              </a:defRPr>
+            </a:pPr>
+            <a:r>
+              <a:t>Discovery</a:t>
+            </a:r>
+            <a:br/>
+            <a:r>
+              <a:t>27 Feb</a:t>
+            </a:r>
+          </a:p>
+        </p:txBody>
+      </p:sp>
+      <p:sp>
+        <p:nvSpPr>
+          <p:cNvPr id="46" name="Diamond 45"/>
+          <p:cNvSpPr/>
+          <p:nvPr/>
+        </p:nvSpPr>
+        <p:spPr>
+          <a:xfrm>
+            <a:off x="5317236" y="5550408"/>
+            <a:ext cx="128016" cy="128016"/>
+          </a:xfrm>
+          <a:prstGeom prst="diamond">
+            <a:avLst/>
+          </a:prstGeom>
+          <a:solidFill>
+            <a:srgbClr val="1D1D4D"/>
+          </a:solidFill>
+          <a:ln>
+            <a:noFill/>
+          </a:ln>
+        </p:spPr>
+        <p:style>
+          <a:lnRef idx="1">
+            <a:schemeClr val="accent1"/>
+          </a:lnRef>
+          <a:fillRef idx="3">
+            <a:schemeClr val="accent1"/>
+          </a:fillRef>
+          <a:effectRef idx="2">
+            <a:schemeClr val="accent1"/>
+          </a:effectRef>
+          <a:fontRef idx="minor">
+            <a:schemeClr val="lt1"/>
+          </a:fontRef>
+        </p:style>
+        <p:txBody>
+          <a:bodyPr rtlCol="0" anchor="ctr"/>
+          <a:lstStyle/>
+          <a:p>
+            <a:pPr algn="ctr"/>
+          </a:p>
+        </p:txBody>
+      </p:sp>
+      <p:sp>
+        <p:nvSpPr>
+          <p:cNvPr id="47" name="TextBox 46"/>
+          <p:cNvSpPr txBox="1"/>
+          <p:nvPr/>
+        </p:nvSpPr>
+        <p:spPr>
+          <a:xfrm>
+            <a:off x="5015483" y="5696712"/>
+            <a:ext cx="822960" cy="502920"/>
+          </a:xfrm>
+          <a:prstGeom prst="rect">
+            <a:avLst/>
+          </a:prstGeom>
+          <a:noFill/>
+        </p:spPr>
+        <p:txBody>
+          <a:bodyPr wrap="square">
+            <a:spAutoFit/>
+          </a:bodyPr>
+          <a:lstStyle/>
+          <a:p>
+            <a:pPr algn="ctr">
+              <a:defRPr sz="700">
+                <a:solidFill>
+                  <a:srgbClr val="1D1D4D"/>
+                </a:solidFill>
+              </a:defRPr>
+            </a:pPr>
+            <a:r>
+              <a:t>Decision</a:t>
+            </a:r>
+            <a:br/>
+            <a:r>
+              <a:t>3 Apr</a:t>
+            </a:r>
+          </a:p>
+        </p:txBody>
+      </p:sp>
+      <p:sp>
+        <p:nvSpPr>
+          <p:cNvPr id="48" name="Rounded Rectangle 47"/>
+          <p:cNvSpPr/>
+          <p:nvPr/>
+        </p:nvSpPr>
+        <p:spPr>
+          <a:xfrm>
+            <a:off x="9290303" y="5422392"/>
+            <a:ext cx="777240" cy="640080"/>
+          </a:xfrm>
+          <a:prstGeom prst="roundRect">
+            <a:avLst/>
+          </a:prstGeom>
+          <a:solidFill>
+            <a:srgbClr val="FF991F"/>
+          </a:solidFill>
+          <a:ln w="12700">
+            <a:solidFill>
+              <a:srgbClr val="1D1D4D"/>
+            </a:solidFill>
+          </a:ln>
+        </p:spPr>
+        <p:style>
+          <a:lnRef idx="1">
+            <a:schemeClr val="accent1"/>
+          </a:lnRef>
+          <a:fillRef idx="3">
+            <a:schemeClr val="accent1"/>
+          </a:fillRef>
+          <a:effectRef idx="2">
+            <a:schemeClr val="accent1"/>
+          </a:effectRef>
+          <a:fontRef idx="minor">
+            <a:schemeClr val="lt1"/>
+          </a:fontRef>
+        </p:style>
+        <p:txBody>
+          <a:bodyPr rtlCol="0" anchor="ctr" wrap="square"/>
+          <a:lstStyle/>
+          <a:p>
+            <a:pPr algn="ctr">
+              <a:defRPr sz="700" b="1">
+                <a:solidFill>
+                  <a:srgbClr val="FFFFFF"/>
+                </a:solidFill>
+              </a:defRPr>
+            </a:pPr>
+            <a:r>
+              <a:t>L0: Go Live</a:t>
+            </a:r>
+            <a:br/>
+            <a:r>
+              <a:t>Dec 26</a:t>
+            </a:r>
+          </a:p>
+        </p:txBody>
+      </p:sp>
+      <p:sp>
+        <p:nvSpPr>
+          <p:cNvPr id="49" name="Rectangle 48"/>
+          <p:cNvSpPr/>
+          <p:nvPr/>
+        </p:nvSpPr>
+        <p:spPr>
+          <a:xfrm>
+            <a:off x="3840479" y="822960"/>
+            <a:ext cx="18288" cy="5120640"/>
+          </a:xfrm>
+          <a:prstGeom prst="rect">
+            <a:avLst/>
+          </a:prstGeom>
+          <a:solidFill>
+            <a:srgbClr val="E50050"/>
+          </a:solidFill>
+          <a:ln>
+            <a:noFill/>
+          </a:ln>
+        </p:spPr>
+        <p:style>
+          <a:lnRef idx="1">
+            <a:schemeClr val="accent1"/>
+          </a:lnRef>
+          <a:fillRef idx="3">
+            <a:schemeClr val="accent1"/>
+          </a:fillRef>
+          <a:effectRef idx="2">
+            <a:schemeClr val="accent1"/>
+          </a:effectRef>
+          <a:fontRef idx="minor">
+            <a:schemeClr val="lt1"/>
+          </a:fontRef>
+        </p:style>
+        <p:txBody>
+          <a:bodyPr rtlCol="0" anchor="ctr"/>
+          <a:lstStyle/>
+          <a:p>
+            <a:pPr algn="ctr"/>
+          </a:p>
+        </p:txBody>
+      </p:sp>
+      <p:sp>
+        <p:nvSpPr>
+          <p:cNvPr id="50" name="TextBox 49"/>
+          <p:cNvSpPr txBox="1"/>
+          <p:nvPr/>
+        </p:nvSpPr>
+        <p:spPr>
+          <a:xfrm>
+            <a:off x="3657599" y="5989320"/>
+            <a:ext cx="457200" cy="228600"/>
           </a:xfrm>
           <a:prstGeom prst="rect">
             <a:avLst/>
@@ -5321,14 +6283,14 @@
       </p:sp>
       <p:sp>
         <p:nvSpPr>
-          <p:cNvPr id="29" name="TextBox 28"/>
+          <p:cNvPr id="51" name="TextBox 50"/>
           <p:cNvSpPr txBox="1"/>
           <p:nvPr/>
         </p:nvSpPr>
         <p:spPr>
           <a:xfrm>
-            <a:off x="274320" y="3840480"/>
-            <a:ext cx="9144000" cy="274320"/>
+            <a:off x="274320" y="6309360"/>
+            <a:ext cx="7315200" cy="274320"/>
           </a:xfrm>
           <a:prstGeom prst="rect">
             <a:avLst/>
@@ -5342,14 +6304,14 @@
           <a:lstStyle/>
           <a:p>
             <a:pPr>
-              <a:defRPr sz="1000" i="1">
+              <a:defRPr sz="900">
                 <a:solidFill>
                   <a:srgbClr val="666666"/>
                 </a:solidFill>
               </a:defRPr>
             </a:pPr>
             <a:r>
-              <a:t>L0/L1 milestones shown on separate slide</a:t>
+              <a:t>◆ L1 Milestone     ▢ L0 Target (Green = On Track, Amber = TBC)</a:t>
             </a:r>
           </a:p>
         </p:txBody>

</xml_diff>

<commit_message>
Simplified slide 3 to Outcomes cards
</commit_message>
<xml_diff>
--- a/Agile_Roadmap_Template_2026.pptx
+++ b/Agile_Roadmap_Template_2026.pptx
@@ -6450,7 +6450,7 @@
               </a:defRPr>
             </a:pPr>
             <a:r>
-              <a:t>L0 &amp; L1 Milestones</a:t>
+              <a:t>Workstream Outcomes</a:t>
             </a:r>
           </a:p>
         </p:txBody>
@@ -6527,59 +6527,24 @@
       </p:sp>
       <p:sp>
         <p:nvSpPr>
-          <p:cNvPr id="7" name="TextBox 6"/>
-          <p:cNvSpPr txBox="1"/>
-          <p:nvPr/>
-        </p:nvSpPr>
-        <p:spPr>
-          <a:xfrm>
-            <a:off x="274320" y="731520"/>
-            <a:ext cx="5486400" cy="365760"/>
-          </a:xfrm>
-          <a:prstGeom prst="rect">
-            <a:avLst/>
-          </a:prstGeom>
-          <a:noFill/>
-        </p:spPr>
-        <p:txBody>
-          <a:bodyPr wrap="none">
-            <a:spAutoFit/>
-          </a:bodyPr>
-          <a:lstStyle/>
-          <a:p>
-            <a:pPr>
-              <a:defRPr sz="1400" b="1">
-                <a:solidFill>
-                  <a:srgbClr val="1D1D4D"/>
-                </a:solidFill>
-              </a:defRPr>
-            </a:pPr>
-            <a:r>
-              <a:t>L0 Objectives</a:t>
-            </a:r>
-          </a:p>
-        </p:txBody>
-      </p:sp>
-      <p:sp>
-        <p:nvSpPr>
-          <p:cNvPr id="8" name="Rectangle 7"/>
+          <p:cNvPr id="7" name="Rounded Rectangle 6"/>
           <p:cNvSpPr/>
           <p:nvPr/>
         </p:nvSpPr>
         <p:spPr>
           <a:xfrm>
-            <a:off x="274320" y="1097280"/>
-            <a:ext cx="3200400" cy="320040"/>
-          </a:xfrm>
-          <a:prstGeom prst="rect">
-            <a:avLst/>
-          </a:prstGeom>
-          <a:solidFill>
-            <a:srgbClr val="1D1D4D"/>
-          </a:solidFill>
-          <a:ln w="6350">
+            <a:off x="365760" y="914400"/>
+            <a:ext cx="2743200" cy="2560320"/>
+          </a:xfrm>
+          <a:prstGeom prst="roundRect">
+            <a:avLst/>
+          </a:prstGeom>
+          <a:solidFill>
+            <a:srgbClr val="FFFFFF"/>
+          </a:solidFill>
+          <a:ln w="19050">
             <a:solidFill>
-              <a:srgbClr val="CCCCCC"/>
+              <a:srgbClr val="1D1D4D"/>
             </a:solidFill>
           </a:ln>
         </p:spPr>
@@ -6598,43 +6563,32 @@
           </a:fontRef>
         </p:style>
         <p:txBody>
-          <a:bodyPr rtlCol="0" anchor="ctr" wrap="square"/>
-          <a:lstStyle/>
-          <a:p>
-            <a:pPr algn="l">
-              <a:defRPr sz="1100" b="1">
-                <a:solidFill>
-                  <a:srgbClr val="FFFFFF"/>
-                </a:solidFill>
-              </a:defRPr>
-            </a:pPr>
-            <a:r>
-              <a:t>Objective</a:t>
-            </a:r>
-          </a:p>
-        </p:txBody>
-      </p:sp>
-      <p:sp>
-        <p:nvSpPr>
-          <p:cNvPr id="9" name="Rectangle 8"/>
+          <a:bodyPr rtlCol="0" anchor="ctr"/>
+          <a:lstStyle/>
+          <a:p>
+            <a:pPr algn="ctr"/>
+          </a:p>
+        </p:txBody>
+      </p:sp>
+      <p:sp>
+        <p:nvSpPr>
+          <p:cNvPr id="8" name="Rectangle 7"/>
           <p:cNvSpPr/>
           <p:nvPr/>
         </p:nvSpPr>
         <p:spPr>
           <a:xfrm>
-            <a:off x="3474720" y="1097280"/>
-            <a:ext cx="1188720" cy="320040"/>
-          </a:xfrm>
-          <a:prstGeom prst="rect">
-            <a:avLst/>
-          </a:prstGeom>
-          <a:solidFill>
-            <a:srgbClr val="1D1D4D"/>
-          </a:solidFill>
-          <a:ln w="6350">
-            <a:solidFill>
-              <a:srgbClr val="CCCCCC"/>
-            </a:solidFill>
+            <a:off x="365760" y="914400"/>
+            <a:ext cx="2743200" cy="457200"/>
+          </a:xfrm>
+          <a:prstGeom prst="rect">
+            <a:avLst/>
+          </a:prstGeom>
+          <a:solidFill>
+            <a:srgbClr val="36B37E"/>
+          </a:solidFill>
+          <a:ln>
+            <a:noFill/>
           </a:ln>
         </p:spPr>
         <p:style>
@@ -6652,42 +6606,183 @@
           </a:fontRef>
         </p:style>
         <p:txBody>
-          <a:bodyPr rtlCol="0" anchor="ctr" wrap="square"/>
-          <a:lstStyle/>
-          <a:p>
-            <a:pPr algn="ctr">
-              <a:defRPr sz="1100" b="1">
+          <a:bodyPr rtlCol="0" anchor="ctr"/>
+          <a:lstStyle/>
+          <a:p>
+            <a:pPr algn="ctr"/>
+          </a:p>
+        </p:txBody>
+      </p:sp>
+      <p:sp>
+        <p:nvSpPr>
+          <p:cNvPr id="9" name="TextBox 8"/>
+          <p:cNvSpPr txBox="1"/>
+          <p:nvPr/>
+        </p:nvSpPr>
+        <p:spPr>
+          <a:xfrm>
+            <a:off x="457200" y="987552"/>
+            <a:ext cx="2560320" cy="320040"/>
+          </a:xfrm>
+          <a:prstGeom prst="rect">
+            <a:avLst/>
+          </a:prstGeom>
+          <a:noFill/>
+        </p:spPr>
+        <p:txBody>
+          <a:bodyPr wrap="none">
+            <a:spAutoFit/>
+          </a:bodyPr>
+          <a:lstStyle/>
+          <a:p>
+            <a:pPr>
+              <a:defRPr sz="1200" b="1">
                 <a:solidFill>
                   <a:srgbClr val="FFFFFF"/>
                 </a:solidFill>
               </a:defRPr>
             </a:pPr>
             <a:r>
-              <a:t>L0 Target</a:t>
-            </a:r>
-          </a:p>
-        </p:txBody>
-      </p:sp>
-      <p:sp>
-        <p:nvSpPr>
-          <p:cNvPr id="10" name="Rectangle 9"/>
+              <a:t>Waracle Calculator</a:t>
+            </a:r>
+          </a:p>
+        </p:txBody>
+      </p:sp>
+      <p:sp>
+        <p:nvSpPr>
+          <p:cNvPr id="10" name="TextBox 9"/>
+          <p:cNvSpPr txBox="1"/>
+          <p:nvPr/>
+        </p:nvSpPr>
+        <p:spPr>
+          <a:xfrm>
+            <a:off x="457200" y="1417320"/>
+            <a:ext cx="2560320" cy="457200"/>
+          </a:xfrm>
+          <a:prstGeom prst="rect">
+            <a:avLst/>
+          </a:prstGeom>
+          <a:noFill/>
+        </p:spPr>
+        <p:txBody>
+          <a:bodyPr wrap="none">
+            <a:spAutoFit/>
+          </a:bodyPr>
+          <a:lstStyle/>
+          <a:p>
+            <a:pPr>
+              <a:defRPr sz="900" b="1">
+                <a:solidFill>
+                  <a:srgbClr val="1D1D4D"/>
+                </a:solidFill>
+              </a:defRPr>
+            </a:pPr>
+            <a:r>
+              <a:t>L0 Target: 11 Feb 2026</a:t>
+            </a:r>
+          </a:p>
+          <a:p>
+            <a:pPr>
+              <a:defRPr sz="900">
+                <a:solidFill>
+                  <a:srgbClr val="1D1D4D"/>
+                </a:solidFill>
+              </a:defRPr>
+            </a:pPr>
+            <a:r>
+              <a:t>Owner: Michael James</a:t>
+            </a:r>
+          </a:p>
+        </p:txBody>
+      </p:sp>
+      <p:sp>
+        <p:nvSpPr>
+          <p:cNvPr id="11" name="TextBox 10"/>
+          <p:cNvSpPr txBox="1"/>
+          <p:nvPr/>
+        </p:nvSpPr>
+        <p:spPr>
+          <a:xfrm>
+            <a:off x="457200" y="1920240"/>
+            <a:ext cx="2560320" cy="1463040"/>
+          </a:xfrm>
+          <a:prstGeom prst="rect">
+            <a:avLst/>
+          </a:prstGeom>
+          <a:noFill/>
+        </p:spPr>
+        <p:txBody>
+          <a:bodyPr wrap="square">
+            <a:spAutoFit/>
+          </a:bodyPr>
+          <a:lstStyle/>
+          <a:p>
+            <a:pPr>
+              <a:spcAft>
+                <a:spcPts val="400"/>
+              </a:spcAft>
+              <a:defRPr sz="900">
+                <a:solidFill>
+                  <a:srgbClr val="1D1D4D"/>
+                </a:solidFill>
+              </a:defRPr>
+            </a:pPr>
+            <a:r>
+              <a:t>• Replace 3rd party affordability calculator</a:t>
+            </a:r>
+          </a:p>
+          <a:p>
+            <a:pPr>
+              <a:spcAft>
+                <a:spcPts val="400"/>
+              </a:spcAft>
+              <a:defRPr sz="900">
+                <a:solidFill>
+                  <a:srgbClr val="1D1D4D"/>
+                </a:solidFill>
+              </a:defRPr>
+            </a:pPr>
+            <a:r>
+              <a:t>• Reduce dependency on external vendor</a:t>
+            </a:r>
+          </a:p>
+          <a:p>
+            <a:pPr>
+              <a:spcAft>
+                <a:spcPts val="400"/>
+              </a:spcAft>
+              <a:defRPr sz="900">
+                <a:solidFill>
+                  <a:srgbClr val="1D1D4D"/>
+                </a:solidFill>
+              </a:defRPr>
+            </a:pPr>
+            <a:r>
+              <a:t>• Scottish Budget compliance</a:t>
+            </a:r>
+          </a:p>
+        </p:txBody>
+      </p:sp>
+      <p:sp>
+        <p:nvSpPr>
+          <p:cNvPr id="12" name="Rounded Rectangle 11"/>
           <p:cNvSpPr/>
           <p:nvPr/>
         </p:nvSpPr>
         <p:spPr>
           <a:xfrm>
-            <a:off x="4663440" y="1097280"/>
-            <a:ext cx="731520" cy="320040"/>
-          </a:xfrm>
-          <a:prstGeom prst="rect">
-            <a:avLst/>
-          </a:prstGeom>
-          <a:solidFill>
-            <a:srgbClr val="1D1D4D"/>
-          </a:solidFill>
-          <a:ln w="6350">
+            <a:off x="3291840" y="914400"/>
+            <a:ext cx="2743200" cy="2560320"/>
+          </a:xfrm>
+          <a:prstGeom prst="roundRect">
+            <a:avLst/>
+          </a:prstGeom>
+          <a:solidFill>
+            <a:srgbClr val="FFFFFF"/>
+          </a:solidFill>
+          <a:ln w="19050">
             <a:solidFill>
-              <a:srgbClr val="CCCCCC"/>
+              <a:srgbClr val="1D1D4D"/>
             </a:solidFill>
           </a:ln>
         </p:spPr>
@@ -6706,43 +6801,32 @@
           </a:fontRef>
         </p:style>
         <p:txBody>
-          <a:bodyPr rtlCol="0" anchor="ctr" wrap="square"/>
-          <a:lstStyle/>
-          <a:p>
-            <a:pPr algn="ctr">
-              <a:defRPr sz="1100" b="1">
-                <a:solidFill>
-                  <a:srgbClr val="FFFFFF"/>
-                </a:solidFill>
-              </a:defRPr>
-            </a:pPr>
-            <a:r>
-              <a:t>RAG</a:t>
-            </a:r>
-          </a:p>
-        </p:txBody>
-      </p:sp>
-      <p:sp>
-        <p:nvSpPr>
-          <p:cNvPr id="11" name="Rectangle 10"/>
+          <a:bodyPr rtlCol="0" anchor="ctr"/>
+          <a:lstStyle/>
+          <a:p>
+            <a:pPr algn="ctr"/>
+          </a:p>
+        </p:txBody>
+      </p:sp>
+      <p:sp>
+        <p:nvSpPr>
+          <p:cNvPr id="13" name="Rectangle 12"/>
           <p:cNvSpPr/>
           <p:nvPr/>
         </p:nvSpPr>
         <p:spPr>
           <a:xfrm>
-            <a:off x="5394959" y="1097280"/>
-            <a:ext cx="1645920" cy="320040"/>
-          </a:xfrm>
-          <a:prstGeom prst="rect">
-            <a:avLst/>
-          </a:prstGeom>
-          <a:solidFill>
-            <a:srgbClr val="1D1D4D"/>
-          </a:solidFill>
-          <a:ln w="6350">
-            <a:solidFill>
-              <a:srgbClr val="CCCCCC"/>
-            </a:solidFill>
+            <a:off x="3291840" y="914400"/>
+            <a:ext cx="2743200" cy="457200"/>
+          </a:xfrm>
+          <a:prstGeom prst="rect">
+            <a:avLst/>
+          </a:prstGeom>
+          <a:solidFill>
+            <a:srgbClr val="36B37E"/>
+          </a:solidFill>
+          <a:ln>
+            <a:noFill/>
           </a:ln>
         </p:spPr>
         <p:style>
@@ -6760,42 +6844,183 @@
           </a:fontRef>
         </p:style>
         <p:txBody>
-          <a:bodyPr rtlCol="0" anchor="ctr" wrap="square"/>
-          <a:lstStyle/>
-          <a:p>
-            <a:pPr algn="ctr">
-              <a:defRPr sz="1100" b="1">
+          <a:bodyPr rtlCol="0" anchor="ctr"/>
+          <a:lstStyle/>
+          <a:p>
+            <a:pPr algn="ctr"/>
+          </a:p>
+        </p:txBody>
+      </p:sp>
+      <p:sp>
+        <p:nvSpPr>
+          <p:cNvPr id="14" name="TextBox 13"/>
+          <p:cNvSpPr txBox="1"/>
+          <p:nvPr/>
+        </p:nvSpPr>
+        <p:spPr>
+          <a:xfrm>
+            <a:off x="3383280" y="987552"/>
+            <a:ext cx="2560320" cy="320040"/>
+          </a:xfrm>
+          <a:prstGeom prst="rect">
+            <a:avLst/>
+          </a:prstGeom>
+          <a:noFill/>
+        </p:spPr>
+        <p:txBody>
+          <a:bodyPr wrap="none">
+            <a:spAutoFit/>
+          </a:bodyPr>
+          <a:lstStyle/>
+          <a:p>
+            <a:pPr>
+              <a:defRPr sz="1200" b="1">
                 <a:solidFill>
                   <a:srgbClr val="FFFFFF"/>
                 </a:solidFill>
               </a:defRPr>
             </a:pPr>
             <a:r>
-              <a:t>Owner</a:t>
-            </a:r>
-          </a:p>
-        </p:txBody>
-      </p:sp>
-      <p:sp>
-        <p:nvSpPr>
-          <p:cNvPr id="12" name="Rectangle 11"/>
+              <a:t>Direct Website</a:t>
+            </a:r>
+          </a:p>
+        </p:txBody>
+      </p:sp>
+      <p:sp>
+        <p:nvSpPr>
+          <p:cNvPr id="15" name="TextBox 14"/>
+          <p:cNvSpPr txBox="1"/>
+          <p:nvPr/>
+        </p:nvSpPr>
+        <p:spPr>
+          <a:xfrm>
+            <a:off x="3383280" y="1417320"/>
+            <a:ext cx="2560320" cy="457200"/>
+          </a:xfrm>
+          <a:prstGeom prst="rect">
+            <a:avLst/>
+          </a:prstGeom>
+          <a:noFill/>
+        </p:spPr>
+        <p:txBody>
+          <a:bodyPr wrap="none">
+            <a:spAutoFit/>
+          </a:bodyPr>
+          <a:lstStyle/>
+          <a:p>
+            <a:pPr>
+              <a:defRPr sz="900" b="1">
+                <a:solidFill>
+                  <a:srgbClr val="1D1D4D"/>
+                </a:solidFill>
+              </a:defRPr>
+            </a:pPr>
+            <a:r>
+              <a:t>L0 Target: 02 Apr 2026</a:t>
+            </a:r>
+          </a:p>
+          <a:p>
+            <a:pPr>
+              <a:defRPr sz="900">
+                <a:solidFill>
+                  <a:srgbClr val="1D1D4D"/>
+                </a:solidFill>
+              </a:defRPr>
+            </a:pPr>
+            <a:r>
+              <a:t>Owner: Michael James</a:t>
+            </a:r>
+          </a:p>
+        </p:txBody>
+      </p:sp>
+      <p:sp>
+        <p:nvSpPr>
+          <p:cNvPr id="16" name="TextBox 15"/>
+          <p:cNvSpPr txBox="1"/>
+          <p:nvPr/>
+        </p:nvSpPr>
+        <p:spPr>
+          <a:xfrm>
+            <a:off x="3383280" y="1920240"/>
+            <a:ext cx="2560320" cy="1463040"/>
+          </a:xfrm>
+          <a:prstGeom prst="rect">
+            <a:avLst/>
+          </a:prstGeom>
+          <a:noFill/>
+        </p:spPr>
+        <p:txBody>
+          <a:bodyPr wrap="square">
+            <a:spAutoFit/>
+          </a:bodyPr>
+          <a:lstStyle/>
+          <a:p>
+            <a:pPr>
+              <a:spcAft>
+                <a:spcPts val="400"/>
+              </a:spcAft>
+              <a:defRPr sz="900">
+                <a:solidFill>
+                  <a:srgbClr val="1D1D4D"/>
+                </a:solidFill>
+              </a:defRPr>
+            </a:pPr>
+            <a:r>
+              <a:t>• CBIS rebranding for Nationwide</a:t>
+            </a:r>
+          </a:p>
+          <a:p>
+            <a:pPr>
+              <a:spcAft>
+                <a:spcPts val="400"/>
+              </a:spcAft>
+              <a:defRPr sz="900">
+                <a:solidFill>
+                  <a:srgbClr val="1D1D4D"/>
+                </a:solidFill>
+              </a:defRPr>
+            </a:pPr>
+            <a:r>
+              <a:t>• Clydesdale Direct re-platform</a:t>
+            </a:r>
+          </a:p>
+          <a:p>
+            <a:pPr>
+              <a:spcAft>
+                <a:spcPts val="400"/>
+              </a:spcAft>
+              <a:defRPr sz="900">
+                <a:solidFill>
+                  <a:srgbClr val="1D1D4D"/>
+                </a:solidFill>
+              </a:defRPr>
+            </a:pPr>
+            <a:r>
+              <a:t>• FSMA Part VII compliance</a:t>
+            </a:r>
+          </a:p>
+        </p:txBody>
+      </p:sp>
+      <p:sp>
+        <p:nvSpPr>
+          <p:cNvPr id="17" name="Rounded Rectangle 16"/>
           <p:cNvSpPr/>
           <p:nvPr/>
         </p:nvSpPr>
         <p:spPr>
           <a:xfrm>
-            <a:off x="274320" y="1417319"/>
-            <a:ext cx="3200400" cy="320040"/>
-          </a:xfrm>
-          <a:prstGeom prst="rect">
+            <a:off x="6217920" y="914400"/>
+            <a:ext cx="2743200" cy="2560320"/>
+          </a:xfrm>
+          <a:prstGeom prst="roundRect">
             <a:avLst/>
           </a:prstGeom>
           <a:solidFill>
             <a:srgbClr val="FFFFFF"/>
           </a:solidFill>
-          <a:ln w="6350">
+          <a:ln w="19050">
             <a:solidFill>
-              <a:srgbClr val="CCCCCC"/>
+              <a:srgbClr val="1D1D4D"/>
             </a:solidFill>
           </a:ln>
         </p:spPr>
@@ -6814,43 +7039,32 @@
           </a:fontRef>
         </p:style>
         <p:txBody>
-          <a:bodyPr rtlCol="0" anchor="ctr" wrap="square"/>
-          <a:lstStyle/>
-          <a:p>
-            <a:pPr algn="l">
-              <a:defRPr sz="1000" b="0">
-                <a:solidFill>
-                  <a:srgbClr val="1D1D4D"/>
-                </a:solidFill>
-              </a:defRPr>
-            </a:pPr>
-            <a:r>
-              <a:t>Waracle Calculator</a:t>
-            </a:r>
-          </a:p>
-        </p:txBody>
-      </p:sp>
-      <p:sp>
-        <p:nvSpPr>
-          <p:cNvPr id="13" name="Rectangle 12"/>
+          <a:bodyPr rtlCol="0" anchor="ctr"/>
+          <a:lstStyle/>
+          <a:p>
+            <a:pPr algn="ctr"/>
+          </a:p>
+        </p:txBody>
+      </p:sp>
+      <p:sp>
+        <p:nvSpPr>
+          <p:cNvPr id="18" name="Rectangle 17"/>
           <p:cNvSpPr/>
           <p:nvPr/>
         </p:nvSpPr>
         <p:spPr>
           <a:xfrm>
-            <a:off x="3474720" y="1417319"/>
-            <a:ext cx="1188720" cy="320040"/>
-          </a:xfrm>
-          <a:prstGeom prst="rect">
-            <a:avLst/>
-          </a:prstGeom>
-          <a:solidFill>
-            <a:srgbClr val="FFFFFF"/>
-          </a:solidFill>
-          <a:ln w="6350">
-            <a:solidFill>
-              <a:srgbClr val="CCCCCC"/>
-            </a:solidFill>
+            <a:off x="6217920" y="914400"/>
+            <a:ext cx="2743200" cy="457200"/>
+          </a:xfrm>
+          <a:prstGeom prst="rect">
+            <a:avLst/>
+          </a:prstGeom>
+          <a:solidFill>
+            <a:srgbClr val="36B37E"/>
+          </a:solidFill>
+          <a:ln>
+            <a:noFill/>
           </a:ln>
         </p:spPr>
         <p:style>
@@ -6868,42 +7082,183 @@
           </a:fontRef>
         </p:style>
         <p:txBody>
-          <a:bodyPr rtlCol="0" anchor="ctr" wrap="square"/>
-          <a:lstStyle/>
-          <a:p>
-            <a:pPr algn="ctr">
-              <a:defRPr sz="1000" b="0">
+          <a:bodyPr rtlCol="0" anchor="ctr"/>
+          <a:lstStyle/>
+          <a:p>
+            <a:pPr algn="ctr"/>
+          </a:p>
+        </p:txBody>
+      </p:sp>
+      <p:sp>
+        <p:nvSpPr>
+          <p:cNvPr id="19" name="TextBox 18"/>
+          <p:cNvSpPr txBox="1"/>
+          <p:nvPr/>
+        </p:nvSpPr>
+        <p:spPr>
+          <a:xfrm>
+            <a:off x="6309360" y="987552"/>
+            <a:ext cx="2560320" cy="320040"/>
+          </a:xfrm>
+          <a:prstGeom prst="rect">
+            <a:avLst/>
+          </a:prstGeom>
+          <a:noFill/>
+        </p:spPr>
+        <p:txBody>
+          <a:bodyPr wrap="none">
+            <a:spAutoFit/>
+          </a:bodyPr>
+          <a:lstStyle/>
+          <a:p>
+            <a:pPr>
+              <a:defRPr sz="1200" b="1">
+                <a:solidFill>
+                  <a:srgbClr val="FFFFFF"/>
+                </a:solidFill>
+              </a:defRPr>
+            </a:pPr>
+            <a:r>
+              <a:t>Growth</a:t>
+            </a:r>
+          </a:p>
+        </p:txBody>
+      </p:sp>
+      <p:sp>
+        <p:nvSpPr>
+          <p:cNvPr id="20" name="TextBox 19"/>
+          <p:cNvSpPr txBox="1"/>
+          <p:nvPr/>
+        </p:nvSpPr>
+        <p:spPr>
+          <a:xfrm>
+            <a:off x="6309360" y="1417320"/>
+            <a:ext cx="2560320" cy="457200"/>
+          </a:xfrm>
+          <a:prstGeom prst="rect">
+            <a:avLst/>
+          </a:prstGeom>
+          <a:noFill/>
+        </p:spPr>
+        <p:txBody>
+          <a:bodyPr wrap="none">
+            <a:spAutoFit/>
+          </a:bodyPr>
+          <a:lstStyle/>
+          <a:p>
+            <a:pPr>
+              <a:defRPr sz="900" b="1">
                 <a:solidFill>
                   <a:srgbClr val="1D1D4D"/>
                 </a:solidFill>
               </a:defRPr>
             </a:pPr>
             <a:r>
-              <a:t>11 Feb 2026</a:t>
-            </a:r>
-          </a:p>
-        </p:txBody>
-      </p:sp>
-      <p:sp>
-        <p:nvSpPr>
-          <p:cNvPr id="14" name="Rectangle 13"/>
+              <a:t>L0 Target: 31 Mar 2027</a:t>
+            </a:r>
+          </a:p>
+          <a:p>
+            <a:pPr>
+              <a:defRPr sz="900">
+                <a:solidFill>
+                  <a:srgbClr val="1D1D4D"/>
+                </a:solidFill>
+              </a:defRPr>
+            </a:pPr>
+            <a:r>
+              <a:t>Owner: Michael James</a:t>
+            </a:r>
+          </a:p>
+        </p:txBody>
+      </p:sp>
+      <p:sp>
+        <p:nvSpPr>
+          <p:cNvPr id="21" name="TextBox 20"/>
+          <p:cNvSpPr txBox="1"/>
+          <p:nvPr/>
+        </p:nvSpPr>
+        <p:spPr>
+          <a:xfrm>
+            <a:off x="6309360" y="1920240"/>
+            <a:ext cx="2560320" cy="1463040"/>
+          </a:xfrm>
+          <a:prstGeom prst="rect">
+            <a:avLst/>
+          </a:prstGeom>
+          <a:noFill/>
+        </p:spPr>
+        <p:txBody>
+          <a:bodyPr wrap="square">
+            <a:spAutoFit/>
+          </a:bodyPr>
+          <a:lstStyle/>
+          <a:p>
+            <a:pPr>
+              <a:spcAft>
+                <a:spcPts val="400"/>
+              </a:spcAft>
+              <a:defRPr sz="900">
+                <a:solidFill>
+                  <a:srgbClr val="1D1D4D"/>
+                </a:solidFill>
+              </a:defRPr>
+            </a:pPr>
+            <a:r>
+              <a:t>• 10to8 appointment booking &amp; live chat</a:t>
+            </a:r>
+          </a:p>
+          <a:p>
+            <a:pPr>
+              <a:spcAft>
+                <a:spcPts val="400"/>
+              </a:spcAft>
+              <a:defRPr sz="900">
+                <a:solidFill>
+                  <a:srgbClr val="1D1D4D"/>
+                </a:solidFill>
+              </a:defRPr>
+            </a:pPr>
+            <a:r>
+              <a:t>• Operational efficiencies</a:t>
+            </a:r>
+          </a:p>
+          <a:p>
+            <a:pPr>
+              <a:spcAft>
+                <a:spcPts val="400"/>
+              </a:spcAft>
+              <a:defRPr sz="900">
+                <a:solidFill>
+                  <a:srgbClr val="1D1D4D"/>
+                </a:solidFill>
+              </a:defRPr>
+            </a:pPr>
+            <a:r>
+              <a:t>• Broker communications improvements</a:t>
+            </a:r>
+          </a:p>
+        </p:txBody>
+      </p:sp>
+      <p:sp>
+        <p:nvSpPr>
+          <p:cNvPr id="22" name="Rounded Rectangle 21"/>
           <p:cNvSpPr/>
           <p:nvPr/>
         </p:nvSpPr>
         <p:spPr>
           <a:xfrm>
-            <a:off x="4663440" y="1417319"/>
-            <a:ext cx="731520" cy="320040"/>
-          </a:xfrm>
-          <a:prstGeom prst="rect">
-            <a:avLst/>
-          </a:prstGeom>
-          <a:solidFill>
-            <a:srgbClr val="36B37E"/>
-          </a:solidFill>
-          <a:ln w="6350">
+            <a:off x="9144000" y="914400"/>
+            <a:ext cx="2743200" cy="2560320"/>
+          </a:xfrm>
+          <a:prstGeom prst="roundRect">
+            <a:avLst/>
+          </a:prstGeom>
+          <a:solidFill>
+            <a:srgbClr val="FFFFFF"/>
+          </a:solidFill>
+          <a:ln w="19050">
             <a:solidFill>
-              <a:srgbClr val="CCCCCC"/>
+              <a:srgbClr val="1D1D4D"/>
             </a:solidFill>
           </a:ln>
         </p:spPr>
@@ -6922,43 +7277,32 @@
           </a:fontRef>
         </p:style>
         <p:txBody>
-          <a:bodyPr rtlCol="0" anchor="ctr" wrap="square"/>
-          <a:lstStyle/>
-          <a:p>
-            <a:pPr algn="ctr">
-              <a:defRPr sz="1000" b="0">
-                <a:solidFill>
-                  <a:srgbClr val="FFFFFF"/>
-                </a:solidFill>
-              </a:defRPr>
-            </a:pPr>
-            <a:r>
-              <a:t>Green</a:t>
-            </a:r>
-          </a:p>
-        </p:txBody>
-      </p:sp>
-      <p:sp>
-        <p:nvSpPr>
-          <p:cNvPr id="15" name="Rectangle 14"/>
+          <a:bodyPr rtlCol="0" anchor="ctr"/>
+          <a:lstStyle/>
+          <a:p>
+            <a:pPr algn="ctr"/>
+          </a:p>
+        </p:txBody>
+      </p:sp>
+      <p:sp>
+        <p:nvSpPr>
+          <p:cNvPr id="23" name="Rectangle 22"/>
           <p:cNvSpPr/>
           <p:nvPr/>
         </p:nvSpPr>
         <p:spPr>
           <a:xfrm>
-            <a:off x="5394959" y="1417319"/>
-            <a:ext cx="1645920" cy="320040"/>
-          </a:xfrm>
-          <a:prstGeom prst="rect">
-            <a:avLst/>
-          </a:prstGeom>
-          <a:solidFill>
-            <a:srgbClr val="FFFFFF"/>
-          </a:solidFill>
-          <a:ln w="6350">
-            <a:solidFill>
-              <a:srgbClr val="CCCCCC"/>
-            </a:solidFill>
+            <a:off x="9144000" y="914400"/>
+            <a:ext cx="2743200" cy="457200"/>
+          </a:xfrm>
+          <a:prstGeom prst="rect">
+            <a:avLst/>
+          </a:prstGeom>
+          <a:solidFill>
+            <a:srgbClr val="FF991F"/>
+          </a:solidFill>
+          <a:ln>
+            <a:noFill/>
           </a:ln>
         </p:spPr>
         <p:style>
@@ -6976,1112 +7320,23 @@
           </a:fontRef>
         </p:style>
         <p:txBody>
-          <a:bodyPr rtlCol="0" anchor="ctr" wrap="square"/>
-          <a:lstStyle/>
-          <a:p>
-            <a:pPr algn="ctr">
-              <a:defRPr sz="1000" b="0">
-                <a:solidFill>
-                  <a:srgbClr val="1D1D4D"/>
-                </a:solidFill>
-              </a:defRPr>
-            </a:pPr>
-            <a:r>
-              <a:t>Michael James</a:t>
-            </a:r>
-          </a:p>
-        </p:txBody>
-      </p:sp>
-      <p:sp>
-        <p:nvSpPr>
-          <p:cNvPr id="16" name="Rectangle 15"/>
-          <p:cNvSpPr/>
-          <p:nvPr/>
-        </p:nvSpPr>
-        <p:spPr>
-          <a:xfrm>
-            <a:off x="274320" y="1737360"/>
-            <a:ext cx="3200400" cy="320040"/>
-          </a:xfrm>
-          <a:prstGeom prst="rect">
-            <a:avLst/>
-          </a:prstGeom>
-          <a:solidFill>
-            <a:srgbClr val="E6EEF5"/>
-          </a:solidFill>
-          <a:ln w="6350">
-            <a:solidFill>
-              <a:srgbClr val="CCCCCC"/>
-            </a:solidFill>
-          </a:ln>
-        </p:spPr>
-        <p:style>
-          <a:lnRef idx="1">
-            <a:schemeClr val="accent1"/>
-          </a:lnRef>
-          <a:fillRef idx="3">
-            <a:schemeClr val="accent1"/>
-          </a:fillRef>
-          <a:effectRef idx="2">
-            <a:schemeClr val="accent1"/>
-          </a:effectRef>
-          <a:fontRef idx="minor">
-            <a:schemeClr val="lt1"/>
-          </a:fontRef>
-        </p:style>
-        <p:txBody>
-          <a:bodyPr rtlCol="0" anchor="ctr" wrap="square"/>
-          <a:lstStyle/>
-          <a:p>
-            <a:pPr algn="l">
-              <a:defRPr sz="1000" b="0">
-                <a:solidFill>
-                  <a:srgbClr val="1D1D4D"/>
-                </a:solidFill>
-              </a:defRPr>
-            </a:pPr>
-            <a:r>
-              <a:t>Direct Website Re-platform</a:t>
-            </a:r>
-          </a:p>
-        </p:txBody>
-      </p:sp>
-      <p:sp>
-        <p:nvSpPr>
-          <p:cNvPr id="17" name="Rectangle 16"/>
-          <p:cNvSpPr/>
-          <p:nvPr/>
-        </p:nvSpPr>
-        <p:spPr>
-          <a:xfrm>
-            <a:off x="3474720" y="1737360"/>
-            <a:ext cx="1188720" cy="320040"/>
-          </a:xfrm>
-          <a:prstGeom prst="rect">
-            <a:avLst/>
-          </a:prstGeom>
-          <a:solidFill>
-            <a:srgbClr val="E6EEF5"/>
-          </a:solidFill>
-          <a:ln w="6350">
-            <a:solidFill>
-              <a:srgbClr val="CCCCCC"/>
-            </a:solidFill>
-          </a:ln>
-        </p:spPr>
-        <p:style>
-          <a:lnRef idx="1">
-            <a:schemeClr val="accent1"/>
-          </a:lnRef>
-          <a:fillRef idx="3">
-            <a:schemeClr val="accent1"/>
-          </a:fillRef>
-          <a:effectRef idx="2">
-            <a:schemeClr val="accent1"/>
-          </a:effectRef>
-          <a:fontRef idx="minor">
-            <a:schemeClr val="lt1"/>
-          </a:fontRef>
-        </p:style>
-        <p:txBody>
-          <a:bodyPr rtlCol="0" anchor="ctr" wrap="square"/>
-          <a:lstStyle/>
-          <a:p>
-            <a:pPr algn="ctr">
-              <a:defRPr sz="1000" b="0">
-                <a:solidFill>
-                  <a:srgbClr val="1D1D4D"/>
-                </a:solidFill>
-              </a:defRPr>
-            </a:pPr>
-            <a:r>
-              <a:t>02 Apr 2026</a:t>
-            </a:r>
-          </a:p>
-        </p:txBody>
-      </p:sp>
-      <p:sp>
-        <p:nvSpPr>
-          <p:cNvPr id="18" name="Rectangle 17"/>
-          <p:cNvSpPr/>
-          <p:nvPr/>
-        </p:nvSpPr>
-        <p:spPr>
-          <a:xfrm>
-            <a:off x="4663440" y="1737360"/>
-            <a:ext cx="731520" cy="320040"/>
-          </a:xfrm>
-          <a:prstGeom prst="rect">
-            <a:avLst/>
-          </a:prstGeom>
-          <a:solidFill>
-            <a:srgbClr val="36B37E"/>
-          </a:solidFill>
-          <a:ln w="6350">
-            <a:solidFill>
-              <a:srgbClr val="CCCCCC"/>
-            </a:solidFill>
-          </a:ln>
-        </p:spPr>
-        <p:style>
-          <a:lnRef idx="1">
-            <a:schemeClr val="accent1"/>
-          </a:lnRef>
-          <a:fillRef idx="3">
-            <a:schemeClr val="accent1"/>
-          </a:fillRef>
-          <a:effectRef idx="2">
-            <a:schemeClr val="accent1"/>
-          </a:effectRef>
-          <a:fontRef idx="minor">
-            <a:schemeClr val="lt1"/>
-          </a:fontRef>
-        </p:style>
-        <p:txBody>
-          <a:bodyPr rtlCol="0" anchor="ctr" wrap="square"/>
-          <a:lstStyle/>
-          <a:p>
-            <a:pPr algn="ctr">
-              <a:defRPr sz="1000" b="0">
-                <a:solidFill>
-                  <a:srgbClr val="FFFFFF"/>
-                </a:solidFill>
-              </a:defRPr>
-            </a:pPr>
-            <a:r>
-              <a:t>Green</a:t>
-            </a:r>
-          </a:p>
-        </p:txBody>
-      </p:sp>
-      <p:sp>
-        <p:nvSpPr>
-          <p:cNvPr id="19" name="Rectangle 18"/>
-          <p:cNvSpPr/>
-          <p:nvPr/>
-        </p:nvSpPr>
-        <p:spPr>
-          <a:xfrm>
-            <a:off x="5394959" y="1737360"/>
-            <a:ext cx="1645920" cy="320040"/>
-          </a:xfrm>
-          <a:prstGeom prst="rect">
-            <a:avLst/>
-          </a:prstGeom>
-          <a:solidFill>
-            <a:srgbClr val="E6EEF5"/>
-          </a:solidFill>
-          <a:ln w="6350">
-            <a:solidFill>
-              <a:srgbClr val="CCCCCC"/>
-            </a:solidFill>
-          </a:ln>
-        </p:spPr>
-        <p:style>
-          <a:lnRef idx="1">
-            <a:schemeClr val="accent1"/>
-          </a:lnRef>
-          <a:fillRef idx="3">
-            <a:schemeClr val="accent1"/>
-          </a:fillRef>
-          <a:effectRef idx="2">
-            <a:schemeClr val="accent1"/>
-          </a:effectRef>
-          <a:fontRef idx="minor">
-            <a:schemeClr val="lt1"/>
-          </a:fontRef>
-        </p:style>
-        <p:txBody>
-          <a:bodyPr rtlCol="0" anchor="ctr" wrap="square"/>
-          <a:lstStyle/>
-          <a:p>
-            <a:pPr algn="ctr">
-              <a:defRPr sz="1000" b="0">
-                <a:solidFill>
-                  <a:srgbClr val="1D1D4D"/>
-                </a:solidFill>
-              </a:defRPr>
-            </a:pPr>
-            <a:r>
-              <a:t>Michael James</a:t>
-            </a:r>
-          </a:p>
-        </p:txBody>
-      </p:sp>
-      <p:sp>
-        <p:nvSpPr>
-          <p:cNvPr id="20" name="Rectangle 19"/>
-          <p:cNvSpPr/>
-          <p:nvPr/>
-        </p:nvSpPr>
-        <p:spPr>
-          <a:xfrm>
-            <a:off x="274320" y="2057400"/>
-            <a:ext cx="3200400" cy="320040"/>
-          </a:xfrm>
-          <a:prstGeom prst="rect">
-            <a:avLst/>
-          </a:prstGeom>
-          <a:solidFill>
-            <a:srgbClr val="FFFFFF"/>
-          </a:solidFill>
-          <a:ln w="6350">
-            <a:solidFill>
-              <a:srgbClr val="CCCCCC"/>
-            </a:solidFill>
-          </a:ln>
-        </p:spPr>
-        <p:style>
-          <a:lnRef idx="1">
-            <a:schemeClr val="accent1"/>
-          </a:lnRef>
-          <a:fillRef idx="3">
-            <a:schemeClr val="accent1"/>
-          </a:fillRef>
-          <a:effectRef idx="2">
-            <a:schemeClr val="accent1"/>
-          </a:effectRef>
-          <a:fontRef idx="minor">
-            <a:schemeClr val="lt1"/>
-          </a:fontRef>
-        </p:style>
-        <p:txBody>
-          <a:bodyPr rtlCol="0" anchor="ctr" wrap="square"/>
-          <a:lstStyle/>
-          <a:p>
-            <a:pPr algn="l">
-              <a:defRPr sz="1000" b="0">
-                <a:solidFill>
-                  <a:srgbClr val="1D1D4D"/>
-                </a:solidFill>
-              </a:defRPr>
-            </a:pPr>
-            <a:r>
-              <a:t>Growth - Operational Efficiencies</a:t>
-            </a:r>
-          </a:p>
-        </p:txBody>
-      </p:sp>
-      <p:sp>
-        <p:nvSpPr>
-          <p:cNvPr id="21" name="Rectangle 20"/>
-          <p:cNvSpPr/>
-          <p:nvPr/>
-        </p:nvSpPr>
-        <p:spPr>
-          <a:xfrm>
-            <a:off x="3474720" y="2057400"/>
-            <a:ext cx="1188720" cy="320040"/>
-          </a:xfrm>
-          <a:prstGeom prst="rect">
-            <a:avLst/>
-          </a:prstGeom>
-          <a:solidFill>
-            <a:srgbClr val="FFFFFF"/>
-          </a:solidFill>
-          <a:ln w="6350">
-            <a:solidFill>
-              <a:srgbClr val="CCCCCC"/>
-            </a:solidFill>
-          </a:ln>
-        </p:spPr>
-        <p:style>
-          <a:lnRef idx="1">
-            <a:schemeClr val="accent1"/>
-          </a:lnRef>
-          <a:fillRef idx="3">
-            <a:schemeClr val="accent1"/>
-          </a:fillRef>
-          <a:effectRef idx="2">
-            <a:schemeClr val="accent1"/>
-          </a:effectRef>
-          <a:fontRef idx="minor">
-            <a:schemeClr val="lt1"/>
-          </a:fontRef>
-        </p:style>
-        <p:txBody>
-          <a:bodyPr rtlCol="0" anchor="ctr" wrap="square"/>
-          <a:lstStyle/>
-          <a:p>
-            <a:pPr algn="ctr">
-              <a:defRPr sz="1000" b="0">
-                <a:solidFill>
-                  <a:srgbClr val="1D1D4D"/>
-                </a:solidFill>
-              </a:defRPr>
-            </a:pPr>
-            <a:r>
-              <a:t>31 Mar 2027</a:t>
-            </a:r>
-          </a:p>
-        </p:txBody>
-      </p:sp>
-      <p:sp>
-        <p:nvSpPr>
-          <p:cNvPr id="22" name="Rectangle 21"/>
-          <p:cNvSpPr/>
-          <p:nvPr/>
-        </p:nvSpPr>
-        <p:spPr>
-          <a:xfrm>
-            <a:off x="4663440" y="2057400"/>
-            <a:ext cx="731520" cy="320040"/>
-          </a:xfrm>
-          <a:prstGeom prst="rect">
-            <a:avLst/>
-          </a:prstGeom>
-          <a:solidFill>
-            <a:srgbClr val="36B37E"/>
-          </a:solidFill>
-          <a:ln w="6350">
-            <a:solidFill>
-              <a:srgbClr val="CCCCCC"/>
-            </a:solidFill>
-          </a:ln>
-        </p:spPr>
-        <p:style>
-          <a:lnRef idx="1">
-            <a:schemeClr val="accent1"/>
-          </a:lnRef>
-          <a:fillRef idx="3">
-            <a:schemeClr val="accent1"/>
-          </a:fillRef>
-          <a:effectRef idx="2">
-            <a:schemeClr val="accent1"/>
-          </a:effectRef>
-          <a:fontRef idx="minor">
-            <a:schemeClr val="lt1"/>
-          </a:fontRef>
-        </p:style>
-        <p:txBody>
-          <a:bodyPr rtlCol="0" anchor="ctr" wrap="square"/>
-          <a:lstStyle/>
-          <a:p>
-            <a:pPr algn="ctr">
-              <a:defRPr sz="1000" b="0">
-                <a:solidFill>
-                  <a:srgbClr val="FFFFFF"/>
-                </a:solidFill>
-              </a:defRPr>
-            </a:pPr>
-            <a:r>
-              <a:t>Green</a:t>
-            </a:r>
-          </a:p>
-        </p:txBody>
-      </p:sp>
-      <p:sp>
-        <p:nvSpPr>
-          <p:cNvPr id="23" name="Rectangle 22"/>
-          <p:cNvSpPr/>
-          <p:nvPr/>
-        </p:nvSpPr>
-        <p:spPr>
-          <a:xfrm>
-            <a:off x="5394959" y="2057400"/>
-            <a:ext cx="1645920" cy="320040"/>
-          </a:xfrm>
-          <a:prstGeom prst="rect">
-            <a:avLst/>
-          </a:prstGeom>
-          <a:solidFill>
-            <a:srgbClr val="FFFFFF"/>
-          </a:solidFill>
-          <a:ln w="6350">
-            <a:solidFill>
-              <a:srgbClr val="CCCCCC"/>
-            </a:solidFill>
-          </a:ln>
-        </p:spPr>
-        <p:style>
-          <a:lnRef idx="1">
-            <a:schemeClr val="accent1"/>
-          </a:lnRef>
-          <a:fillRef idx="3">
-            <a:schemeClr val="accent1"/>
-          </a:fillRef>
-          <a:effectRef idx="2">
-            <a:schemeClr val="accent1"/>
-          </a:effectRef>
-          <a:fontRef idx="minor">
-            <a:schemeClr val="lt1"/>
-          </a:fontRef>
-        </p:style>
-        <p:txBody>
-          <a:bodyPr rtlCol="0" anchor="ctr" wrap="square"/>
-          <a:lstStyle/>
-          <a:p>
-            <a:pPr algn="ctr">
-              <a:defRPr sz="1000" b="0">
-                <a:solidFill>
-                  <a:srgbClr val="1D1D4D"/>
-                </a:solidFill>
-              </a:defRPr>
-            </a:pPr>
-            <a:r>
-              <a:t>Michael James</a:t>
-            </a:r>
-          </a:p>
-        </p:txBody>
-      </p:sp>
-      <p:sp>
-        <p:nvSpPr>
-          <p:cNvPr id="24" name="Rectangle 23"/>
-          <p:cNvSpPr/>
-          <p:nvPr/>
-        </p:nvSpPr>
-        <p:spPr>
-          <a:xfrm>
-            <a:off x="274320" y="2377439"/>
-            <a:ext cx="3200400" cy="320040"/>
-          </a:xfrm>
-          <a:prstGeom prst="rect">
-            <a:avLst/>
-          </a:prstGeom>
-          <a:solidFill>
-            <a:srgbClr val="E6EEF5"/>
-          </a:solidFill>
-          <a:ln w="6350">
-            <a:solidFill>
-              <a:srgbClr val="CCCCCC"/>
-            </a:solidFill>
-          </a:ln>
-        </p:spPr>
-        <p:style>
-          <a:lnRef idx="1">
-            <a:schemeClr val="accent1"/>
-          </a:lnRef>
-          <a:fillRef idx="3">
-            <a:schemeClr val="accent1"/>
-          </a:fillRef>
-          <a:effectRef idx="2">
-            <a:schemeClr val="accent1"/>
-          </a:effectRef>
-          <a:fontRef idx="minor">
-            <a:schemeClr val="lt1"/>
-          </a:fontRef>
-        </p:style>
-        <p:txBody>
-          <a:bodyPr rtlCol="0" anchor="ctr" wrap="square"/>
-          <a:lstStyle/>
-          <a:p>
-            <a:pPr algn="l">
-              <a:defRPr sz="1000" b="0">
-                <a:solidFill>
-                  <a:srgbClr val="1D1D4D"/>
-                </a:solidFill>
-              </a:defRPr>
-            </a:pPr>
-            <a:r>
-              <a:t>Growth - Communications</a:t>
-            </a:r>
-          </a:p>
-        </p:txBody>
-      </p:sp>
-      <p:sp>
-        <p:nvSpPr>
-          <p:cNvPr id="25" name="Rectangle 24"/>
-          <p:cNvSpPr/>
-          <p:nvPr/>
-        </p:nvSpPr>
-        <p:spPr>
-          <a:xfrm>
-            <a:off x="3474720" y="2377439"/>
-            <a:ext cx="1188720" cy="320040"/>
-          </a:xfrm>
-          <a:prstGeom prst="rect">
-            <a:avLst/>
-          </a:prstGeom>
-          <a:solidFill>
-            <a:srgbClr val="E6EEF5"/>
-          </a:solidFill>
-          <a:ln w="6350">
-            <a:solidFill>
-              <a:srgbClr val="CCCCCC"/>
-            </a:solidFill>
-          </a:ln>
-        </p:spPr>
-        <p:style>
-          <a:lnRef idx="1">
-            <a:schemeClr val="accent1"/>
-          </a:lnRef>
-          <a:fillRef idx="3">
-            <a:schemeClr val="accent1"/>
-          </a:fillRef>
-          <a:effectRef idx="2">
-            <a:schemeClr val="accent1"/>
-          </a:effectRef>
-          <a:fontRef idx="minor">
-            <a:schemeClr val="lt1"/>
-          </a:fontRef>
-        </p:style>
-        <p:txBody>
-          <a:bodyPr rtlCol="0" anchor="ctr" wrap="square"/>
-          <a:lstStyle/>
-          <a:p>
-            <a:pPr algn="ctr">
-              <a:defRPr sz="1000" b="0">
-                <a:solidFill>
-                  <a:srgbClr val="1D1D4D"/>
-                </a:solidFill>
-              </a:defRPr>
-            </a:pPr>
-            <a:r>
-              <a:t>31 Mar 2027</a:t>
-            </a:r>
-          </a:p>
-        </p:txBody>
-      </p:sp>
-      <p:sp>
-        <p:nvSpPr>
-          <p:cNvPr id="26" name="Rectangle 25"/>
-          <p:cNvSpPr/>
-          <p:nvPr/>
-        </p:nvSpPr>
-        <p:spPr>
-          <a:xfrm>
-            <a:off x="4663440" y="2377439"/>
-            <a:ext cx="731520" cy="320040"/>
-          </a:xfrm>
-          <a:prstGeom prst="rect">
-            <a:avLst/>
-          </a:prstGeom>
-          <a:solidFill>
-            <a:srgbClr val="36B37E"/>
-          </a:solidFill>
-          <a:ln w="6350">
-            <a:solidFill>
-              <a:srgbClr val="CCCCCC"/>
-            </a:solidFill>
-          </a:ln>
-        </p:spPr>
-        <p:style>
-          <a:lnRef idx="1">
-            <a:schemeClr val="accent1"/>
-          </a:lnRef>
-          <a:fillRef idx="3">
-            <a:schemeClr val="accent1"/>
-          </a:fillRef>
-          <a:effectRef idx="2">
-            <a:schemeClr val="accent1"/>
-          </a:effectRef>
-          <a:fontRef idx="minor">
-            <a:schemeClr val="lt1"/>
-          </a:fontRef>
-        </p:style>
-        <p:txBody>
-          <a:bodyPr rtlCol="0" anchor="ctr" wrap="square"/>
-          <a:lstStyle/>
-          <a:p>
-            <a:pPr algn="ctr">
-              <a:defRPr sz="1000" b="0">
-                <a:solidFill>
-                  <a:srgbClr val="FFFFFF"/>
-                </a:solidFill>
-              </a:defRPr>
-            </a:pPr>
-            <a:r>
-              <a:t>Green</a:t>
-            </a:r>
-          </a:p>
-        </p:txBody>
-      </p:sp>
-      <p:sp>
-        <p:nvSpPr>
-          <p:cNvPr id="27" name="Rectangle 26"/>
-          <p:cNvSpPr/>
-          <p:nvPr/>
-        </p:nvSpPr>
-        <p:spPr>
-          <a:xfrm>
-            <a:off x="5394959" y="2377439"/>
-            <a:ext cx="1645920" cy="320040"/>
-          </a:xfrm>
-          <a:prstGeom prst="rect">
-            <a:avLst/>
-          </a:prstGeom>
-          <a:solidFill>
-            <a:srgbClr val="E6EEF5"/>
-          </a:solidFill>
-          <a:ln w="6350">
-            <a:solidFill>
-              <a:srgbClr val="CCCCCC"/>
-            </a:solidFill>
-          </a:ln>
-        </p:spPr>
-        <p:style>
-          <a:lnRef idx="1">
-            <a:schemeClr val="accent1"/>
-          </a:lnRef>
-          <a:fillRef idx="3">
-            <a:schemeClr val="accent1"/>
-          </a:fillRef>
-          <a:effectRef idx="2">
-            <a:schemeClr val="accent1"/>
-          </a:effectRef>
-          <a:fontRef idx="minor">
-            <a:schemeClr val="lt1"/>
-          </a:fontRef>
-        </p:style>
-        <p:txBody>
-          <a:bodyPr rtlCol="0" anchor="ctr" wrap="square"/>
-          <a:lstStyle/>
-          <a:p>
-            <a:pPr algn="ctr">
-              <a:defRPr sz="1000" b="0">
-                <a:solidFill>
-                  <a:srgbClr val="1D1D4D"/>
-                </a:solidFill>
-              </a:defRPr>
-            </a:pPr>
-            <a:r>
-              <a:t>Michael James</a:t>
-            </a:r>
-          </a:p>
-        </p:txBody>
-      </p:sp>
-      <p:sp>
-        <p:nvSpPr>
-          <p:cNvPr id="28" name="Rectangle 27"/>
-          <p:cNvSpPr/>
-          <p:nvPr/>
-        </p:nvSpPr>
-        <p:spPr>
-          <a:xfrm>
-            <a:off x="274320" y="2697480"/>
-            <a:ext cx="3200400" cy="320040"/>
-          </a:xfrm>
-          <a:prstGeom prst="rect">
-            <a:avLst/>
-          </a:prstGeom>
-          <a:solidFill>
-            <a:srgbClr val="FFFFFF"/>
-          </a:solidFill>
-          <a:ln w="6350">
-            <a:solidFill>
-              <a:srgbClr val="CCCCCC"/>
-            </a:solidFill>
-          </a:ln>
-        </p:spPr>
-        <p:style>
-          <a:lnRef idx="1">
-            <a:schemeClr val="accent1"/>
-          </a:lnRef>
-          <a:fillRef idx="3">
-            <a:schemeClr val="accent1"/>
-          </a:fillRef>
-          <a:effectRef idx="2">
-            <a:schemeClr val="accent1"/>
-          </a:effectRef>
-          <a:fontRef idx="minor">
-            <a:schemeClr val="lt1"/>
-          </a:fontRef>
-        </p:style>
-        <p:txBody>
-          <a:bodyPr rtlCol="0" anchor="ctr" wrap="square"/>
-          <a:lstStyle/>
-          <a:p>
-            <a:pPr algn="l">
-              <a:defRPr sz="1000" b="0">
-                <a:solidFill>
-                  <a:srgbClr val="1D1D4D"/>
-                </a:solidFill>
-              </a:defRPr>
-            </a:pPr>
-            <a:r>
-              <a:t>Growth - Case Segmentation</a:t>
-            </a:r>
-          </a:p>
-        </p:txBody>
-      </p:sp>
-      <p:sp>
-        <p:nvSpPr>
-          <p:cNvPr id="29" name="Rectangle 28"/>
-          <p:cNvSpPr/>
-          <p:nvPr/>
-        </p:nvSpPr>
-        <p:spPr>
-          <a:xfrm>
-            <a:off x="3474720" y="2697480"/>
-            <a:ext cx="1188720" cy="320040"/>
-          </a:xfrm>
-          <a:prstGeom prst="rect">
-            <a:avLst/>
-          </a:prstGeom>
-          <a:solidFill>
-            <a:srgbClr val="FFFFFF"/>
-          </a:solidFill>
-          <a:ln w="6350">
-            <a:solidFill>
-              <a:srgbClr val="CCCCCC"/>
-            </a:solidFill>
-          </a:ln>
-        </p:spPr>
-        <p:style>
-          <a:lnRef idx="1">
-            <a:schemeClr val="accent1"/>
-          </a:lnRef>
-          <a:fillRef idx="3">
-            <a:schemeClr val="accent1"/>
-          </a:fillRef>
-          <a:effectRef idx="2">
-            <a:schemeClr val="accent1"/>
-          </a:effectRef>
-          <a:fontRef idx="minor">
-            <a:schemeClr val="lt1"/>
-          </a:fontRef>
-        </p:style>
-        <p:txBody>
-          <a:bodyPr rtlCol="0" anchor="ctr" wrap="square"/>
-          <a:lstStyle/>
-          <a:p>
-            <a:pPr algn="ctr">
-              <a:defRPr sz="1000" b="0">
-                <a:solidFill>
-                  <a:srgbClr val="1D1D4D"/>
-                </a:solidFill>
-              </a:defRPr>
-            </a:pPr>
-            <a:r>
-              <a:t>31 Mar 2027</a:t>
-            </a:r>
-          </a:p>
-        </p:txBody>
-      </p:sp>
-      <p:sp>
-        <p:nvSpPr>
-          <p:cNvPr id="30" name="Rectangle 29"/>
-          <p:cNvSpPr/>
-          <p:nvPr/>
-        </p:nvSpPr>
-        <p:spPr>
-          <a:xfrm>
-            <a:off x="4663440" y="2697480"/>
-            <a:ext cx="731520" cy="320040"/>
-          </a:xfrm>
-          <a:prstGeom prst="rect">
-            <a:avLst/>
-          </a:prstGeom>
-          <a:solidFill>
-            <a:srgbClr val="36B37E"/>
-          </a:solidFill>
-          <a:ln w="6350">
-            <a:solidFill>
-              <a:srgbClr val="CCCCCC"/>
-            </a:solidFill>
-          </a:ln>
-        </p:spPr>
-        <p:style>
-          <a:lnRef idx="1">
-            <a:schemeClr val="accent1"/>
-          </a:lnRef>
-          <a:fillRef idx="3">
-            <a:schemeClr val="accent1"/>
-          </a:fillRef>
-          <a:effectRef idx="2">
-            <a:schemeClr val="accent1"/>
-          </a:effectRef>
-          <a:fontRef idx="minor">
-            <a:schemeClr val="lt1"/>
-          </a:fontRef>
-        </p:style>
-        <p:txBody>
-          <a:bodyPr rtlCol="0" anchor="ctr" wrap="square"/>
-          <a:lstStyle/>
-          <a:p>
-            <a:pPr algn="ctr">
-              <a:defRPr sz="1000" b="0">
-                <a:solidFill>
-                  <a:srgbClr val="FFFFFF"/>
-                </a:solidFill>
-              </a:defRPr>
-            </a:pPr>
-            <a:r>
-              <a:t>Green</a:t>
-            </a:r>
-          </a:p>
-        </p:txBody>
-      </p:sp>
-      <p:sp>
-        <p:nvSpPr>
-          <p:cNvPr id="31" name="Rectangle 30"/>
-          <p:cNvSpPr/>
-          <p:nvPr/>
-        </p:nvSpPr>
-        <p:spPr>
-          <a:xfrm>
-            <a:off x="5394959" y="2697480"/>
-            <a:ext cx="1645920" cy="320040"/>
-          </a:xfrm>
-          <a:prstGeom prst="rect">
-            <a:avLst/>
-          </a:prstGeom>
-          <a:solidFill>
-            <a:srgbClr val="FFFFFF"/>
-          </a:solidFill>
-          <a:ln w="6350">
-            <a:solidFill>
-              <a:srgbClr val="CCCCCC"/>
-            </a:solidFill>
-          </a:ln>
-        </p:spPr>
-        <p:style>
-          <a:lnRef idx="1">
-            <a:schemeClr val="accent1"/>
-          </a:lnRef>
-          <a:fillRef idx="3">
-            <a:schemeClr val="accent1"/>
-          </a:fillRef>
-          <a:effectRef idx="2">
-            <a:schemeClr val="accent1"/>
-          </a:effectRef>
-          <a:fontRef idx="minor">
-            <a:schemeClr val="lt1"/>
-          </a:fontRef>
-        </p:style>
-        <p:txBody>
-          <a:bodyPr rtlCol="0" anchor="ctr" wrap="square"/>
-          <a:lstStyle/>
-          <a:p>
-            <a:pPr algn="ctr">
-              <a:defRPr sz="1000" b="0">
-                <a:solidFill>
-                  <a:srgbClr val="1D1D4D"/>
-                </a:solidFill>
-              </a:defRPr>
-            </a:pPr>
-            <a:r>
-              <a:t>Michael James</a:t>
-            </a:r>
-          </a:p>
-        </p:txBody>
-      </p:sp>
-      <p:sp>
-        <p:nvSpPr>
-          <p:cNvPr id="32" name="Rectangle 31"/>
-          <p:cNvSpPr/>
-          <p:nvPr/>
-        </p:nvSpPr>
-        <p:spPr>
-          <a:xfrm>
-            <a:off x="274320" y="3017520"/>
-            <a:ext cx="3200400" cy="320040"/>
-          </a:xfrm>
-          <a:prstGeom prst="rect">
-            <a:avLst/>
-          </a:prstGeom>
-          <a:solidFill>
-            <a:srgbClr val="E6EEF5"/>
-          </a:solidFill>
-          <a:ln w="6350">
-            <a:solidFill>
-              <a:srgbClr val="CCCCCC"/>
-            </a:solidFill>
-          </a:ln>
-        </p:spPr>
-        <p:style>
-          <a:lnRef idx="1">
-            <a:schemeClr val="accent1"/>
-          </a:lnRef>
-          <a:fillRef idx="3">
-            <a:schemeClr val="accent1"/>
-          </a:fillRef>
-          <a:effectRef idx="2">
-            <a:schemeClr val="accent1"/>
-          </a:effectRef>
-          <a:fontRef idx="minor">
-            <a:schemeClr val="lt1"/>
-          </a:fontRef>
-        </p:style>
-        <p:txBody>
-          <a:bodyPr rtlCol="0" anchor="ctr" wrap="square"/>
-          <a:lstStyle/>
-          <a:p>
-            <a:pPr algn="l">
-              <a:defRPr sz="1000" b="0">
-                <a:solidFill>
-                  <a:srgbClr val="1D1D4D"/>
-                </a:solidFill>
-              </a:defRPr>
-            </a:pPr>
-            <a:r>
-              <a:t>SAM Replacement</a:t>
-            </a:r>
-          </a:p>
-        </p:txBody>
-      </p:sp>
-      <p:sp>
-        <p:nvSpPr>
-          <p:cNvPr id="33" name="Rectangle 32"/>
-          <p:cNvSpPr/>
-          <p:nvPr/>
-        </p:nvSpPr>
-        <p:spPr>
-          <a:xfrm>
-            <a:off x="3474720" y="3017520"/>
-            <a:ext cx="1188720" cy="320040"/>
-          </a:xfrm>
-          <a:prstGeom prst="rect">
-            <a:avLst/>
-          </a:prstGeom>
-          <a:solidFill>
-            <a:srgbClr val="E6EEF5"/>
-          </a:solidFill>
-          <a:ln w="6350">
-            <a:solidFill>
-              <a:srgbClr val="CCCCCC"/>
-            </a:solidFill>
-          </a:ln>
-        </p:spPr>
-        <p:style>
-          <a:lnRef idx="1">
-            <a:schemeClr val="accent1"/>
-          </a:lnRef>
-          <a:fillRef idx="3">
-            <a:schemeClr val="accent1"/>
-          </a:fillRef>
-          <a:effectRef idx="2">
-            <a:schemeClr val="accent1"/>
-          </a:effectRef>
-          <a:fontRef idx="minor">
-            <a:schemeClr val="lt1"/>
-          </a:fontRef>
-        </p:style>
-        <p:txBody>
-          <a:bodyPr rtlCol="0" anchor="ctr" wrap="square"/>
-          <a:lstStyle/>
-          <a:p>
-            <a:pPr algn="ctr">
-              <a:defRPr sz="1000" b="0">
-                <a:solidFill>
-                  <a:srgbClr val="1D1D4D"/>
-                </a:solidFill>
-              </a:defRPr>
-            </a:pPr>
-            <a:r>
-              <a:t>31 Dec 2026</a:t>
-            </a:r>
-          </a:p>
-        </p:txBody>
-      </p:sp>
-      <p:sp>
-        <p:nvSpPr>
-          <p:cNvPr id="34" name="Rectangle 33"/>
-          <p:cNvSpPr/>
-          <p:nvPr/>
-        </p:nvSpPr>
-        <p:spPr>
-          <a:xfrm>
-            <a:off x="4663440" y="3017520"/>
-            <a:ext cx="731520" cy="320040"/>
-          </a:xfrm>
-          <a:prstGeom prst="rect">
-            <a:avLst/>
-          </a:prstGeom>
-          <a:solidFill>
-            <a:srgbClr val="36B37E"/>
-          </a:solidFill>
-          <a:ln w="6350">
-            <a:solidFill>
-              <a:srgbClr val="CCCCCC"/>
-            </a:solidFill>
-          </a:ln>
-        </p:spPr>
-        <p:style>
-          <a:lnRef idx="1">
-            <a:schemeClr val="accent1"/>
-          </a:lnRef>
-          <a:fillRef idx="3">
-            <a:schemeClr val="accent1"/>
-          </a:fillRef>
-          <a:effectRef idx="2">
-            <a:schemeClr val="accent1"/>
-          </a:effectRef>
-          <a:fontRef idx="minor">
-            <a:schemeClr val="lt1"/>
-          </a:fontRef>
-        </p:style>
-        <p:txBody>
-          <a:bodyPr rtlCol="0" anchor="ctr" wrap="square"/>
-          <a:lstStyle/>
-          <a:p>
-            <a:pPr algn="ctr">
-              <a:defRPr sz="1000" b="0">
-                <a:solidFill>
-                  <a:srgbClr val="FFFFFF"/>
-                </a:solidFill>
-              </a:defRPr>
-            </a:pPr>
-            <a:r>
-              <a:t>Green</a:t>
-            </a:r>
-          </a:p>
-        </p:txBody>
-      </p:sp>
-      <p:sp>
-        <p:nvSpPr>
-          <p:cNvPr id="35" name="Rectangle 34"/>
-          <p:cNvSpPr/>
-          <p:nvPr/>
-        </p:nvSpPr>
-        <p:spPr>
-          <a:xfrm>
-            <a:off x="5394959" y="3017520"/>
-            <a:ext cx="1645920" cy="320040"/>
-          </a:xfrm>
-          <a:prstGeom prst="rect">
-            <a:avLst/>
-          </a:prstGeom>
-          <a:solidFill>
-            <a:srgbClr val="E6EEF5"/>
-          </a:solidFill>
-          <a:ln w="6350">
-            <a:solidFill>
-              <a:srgbClr val="CCCCCC"/>
-            </a:solidFill>
-          </a:ln>
-        </p:spPr>
-        <p:style>
-          <a:lnRef idx="1">
-            <a:schemeClr val="accent1"/>
-          </a:lnRef>
-          <a:fillRef idx="3">
-            <a:schemeClr val="accent1"/>
-          </a:fillRef>
-          <a:effectRef idx="2">
-            <a:schemeClr val="accent1"/>
-          </a:effectRef>
-          <a:fontRef idx="minor">
-            <a:schemeClr val="lt1"/>
-          </a:fontRef>
-        </p:style>
-        <p:txBody>
-          <a:bodyPr rtlCol="0" anchor="ctr" wrap="square"/>
-          <a:lstStyle/>
-          <a:p>
-            <a:pPr algn="ctr">
-              <a:defRPr sz="1000" b="0">
-                <a:solidFill>
-                  <a:srgbClr val="1D1D4D"/>
-                </a:solidFill>
-              </a:defRPr>
-            </a:pPr>
-            <a:r>
-              <a:t>Prashant Nair</a:t>
-            </a:r>
-          </a:p>
-        </p:txBody>
-      </p:sp>
-      <p:sp>
-        <p:nvSpPr>
-          <p:cNvPr id="36" name="TextBox 35"/>
+          <a:bodyPr rtlCol="0" anchor="ctr"/>
+          <a:lstStyle/>
+          <a:p>
+            <a:pPr algn="ctr"/>
+          </a:p>
+        </p:txBody>
+      </p:sp>
+      <p:sp>
+        <p:nvSpPr>
+          <p:cNvPr id="24" name="TextBox 23"/>
           <p:cNvSpPr txBox="1"/>
           <p:nvPr/>
         </p:nvSpPr>
         <p:spPr>
           <a:xfrm>
-            <a:off x="274320" y="3657600"/>
-            <a:ext cx="5486400" cy="365760"/>
+            <a:off x="9235440" y="987552"/>
+            <a:ext cx="2560320" cy="320040"/>
           </a:xfrm>
           <a:prstGeom prst="rect">
             <a:avLst/>
@@ -8095,1526 +7350,164 @@
           <a:lstStyle/>
           <a:p>
             <a:pPr>
-              <a:defRPr sz="1400" b="1">
+              <a:defRPr sz="1200" b="1">
+                <a:solidFill>
+                  <a:srgbClr val="FFFFFF"/>
+                </a:solidFill>
+              </a:defRPr>
+            </a:pPr>
+            <a:r>
+              <a:t>SAM Replacement</a:t>
+            </a:r>
+          </a:p>
+        </p:txBody>
+      </p:sp>
+      <p:sp>
+        <p:nvSpPr>
+          <p:cNvPr id="25" name="TextBox 24"/>
+          <p:cNvSpPr txBox="1"/>
+          <p:nvPr/>
+        </p:nvSpPr>
+        <p:spPr>
+          <a:xfrm>
+            <a:off x="9235440" y="1417320"/>
+            <a:ext cx="2560320" cy="457200"/>
+          </a:xfrm>
+          <a:prstGeom prst="rect">
+            <a:avLst/>
+          </a:prstGeom>
+          <a:noFill/>
+        </p:spPr>
+        <p:txBody>
+          <a:bodyPr wrap="none">
+            <a:spAutoFit/>
+          </a:bodyPr>
+          <a:lstStyle/>
+          <a:p>
+            <a:pPr>
+              <a:defRPr sz="900" b="1">
                 <a:solidFill>
                   <a:srgbClr val="1D1D4D"/>
                 </a:solidFill>
               </a:defRPr>
             </a:pPr>
             <a:r>
-              <a:t>Key L1 Milestones (Next 90 Days)</a:t>
-            </a:r>
-          </a:p>
-        </p:txBody>
-      </p:sp>
-      <p:sp>
-        <p:nvSpPr>
-          <p:cNvPr id="37" name="Rectangle 36"/>
-          <p:cNvSpPr/>
-          <p:nvPr/>
-        </p:nvSpPr>
-        <p:spPr>
-          <a:xfrm>
-            <a:off x="274320" y="4023360"/>
-            <a:ext cx="2926080" cy="320040"/>
-          </a:xfrm>
-          <a:prstGeom prst="rect">
-            <a:avLst/>
-          </a:prstGeom>
-          <a:solidFill>
-            <a:srgbClr val="1D1D4D"/>
-          </a:solidFill>
-          <a:ln w="6350">
-            <a:solidFill>
-              <a:srgbClr val="CCCCCC"/>
-            </a:solidFill>
-          </a:ln>
-        </p:spPr>
-        <p:style>
-          <a:lnRef idx="1">
-            <a:schemeClr val="accent1"/>
-          </a:lnRef>
-          <a:fillRef idx="3">
-            <a:schemeClr val="accent1"/>
-          </a:fillRef>
-          <a:effectRef idx="2">
-            <a:schemeClr val="accent1"/>
-          </a:effectRef>
-          <a:fontRef idx="minor">
-            <a:schemeClr val="lt1"/>
-          </a:fontRef>
-        </p:style>
-        <p:txBody>
-          <a:bodyPr rtlCol="0" anchor="ctr" wrap="square"/>
-          <a:lstStyle/>
-          <a:p>
-            <a:pPr algn="l">
-              <a:defRPr sz="1100" b="1">
-                <a:solidFill>
-                  <a:srgbClr val="FFFFFF"/>
-                </a:solidFill>
-              </a:defRPr>
-            </a:pPr>
-            <a:r>
-              <a:t>Milestone</a:t>
-            </a:r>
-          </a:p>
-        </p:txBody>
-      </p:sp>
-      <p:sp>
-        <p:nvSpPr>
-          <p:cNvPr id="38" name="Rectangle 37"/>
-          <p:cNvSpPr/>
-          <p:nvPr/>
-        </p:nvSpPr>
-        <p:spPr>
-          <a:xfrm>
-            <a:off x="3200400" y="4023360"/>
-            <a:ext cx="1645920" cy="320040"/>
-          </a:xfrm>
-          <a:prstGeom prst="rect">
-            <a:avLst/>
-          </a:prstGeom>
-          <a:solidFill>
-            <a:srgbClr val="1D1D4D"/>
-          </a:solidFill>
-          <a:ln w="6350">
-            <a:solidFill>
-              <a:srgbClr val="CCCCCC"/>
-            </a:solidFill>
-          </a:ln>
-        </p:spPr>
-        <p:style>
-          <a:lnRef idx="1">
-            <a:schemeClr val="accent1"/>
-          </a:lnRef>
-          <a:fillRef idx="3">
-            <a:schemeClr val="accent1"/>
-          </a:fillRef>
-          <a:effectRef idx="2">
-            <a:schemeClr val="accent1"/>
-          </a:effectRef>
-          <a:fontRef idx="minor">
-            <a:schemeClr val="lt1"/>
-          </a:fontRef>
-        </p:style>
-        <p:txBody>
-          <a:bodyPr rtlCol="0" anchor="ctr" wrap="square"/>
-          <a:lstStyle/>
-          <a:p>
-            <a:pPr algn="l">
-              <a:defRPr sz="1100" b="1">
-                <a:solidFill>
-                  <a:srgbClr val="FFFFFF"/>
-                </a:solidFill>
-              </a:defRPr>
-            </a:pPr>
-            <a:r>
-              <a:t>Parent L0</a:t>
-            </a:r>
-          </a:p>
-        </p:txBody>
-      </p:sp>
-      <p:sp>
-        <p:nvSpPr>
-          <p:cNvPr id="39" name="Rectangle 38"/>
-          <p:cNvSpPr/>
-          <p:nvPr/>
-        </p:nvSpPr>
-        <p:spPr>
-          <a:xfrm>
-            <a:off x="4846320" y="4023360"/>
-            <a:ext cx="914400" cy="320040"/>
-          </a:xfrm>
-          <a:prstGeom prst="rect">
-            <a:avLst/>
-          </a:prstGeom>
-          <a:solidFill>
-            <a:srgbClr val="1D1D4D"/>
-          </a:solidFill>
-          <a:ln w="6350">
-            <a:solidFill>
-              <a:srgbClr val="CCCCCC"/>
-            </a:solidFill>
-          </a:ln>
-        </p:spPr>
-        <p:style>
-          <a:lnRef idx="1">
-            <a:schemeClr val="accent1"/>
-          </a:lnRef>
-          <a:fillRef idx="3">
-            <a:schemeClr val="accent1"/>
-          </a:fillRef>
-          <a:effectRef idx="2">
-            <a:schemeClr val="accent1"/>
-          </a:effectRef>
-          <a:fontRef idx="minor">
-            <a:schemeClr val="lt1"/>
-          </a:fontRef>
-        </p:style>
-        <p:txBody>
-          <a:bodyPr rtlCol="0" anchor="ctr" wrap="square"/>
+              <a:t>L0 Target: Dec 2026</a:t>
+            </a:r>
+          </a:p>
+          <a:p>
+            <a:pPr>
+              <a:defRPr sz="900">
+                <a:solidFill>
+                  <a:srgbClr val="1D1D4D"/>
+                </a:solidFill>
+              </a:defRPr>
+            </a:pPr>
+            <a:r>
+              <a:t>Owner: Prashant Nair</a:t>
+            </a:r>
+          </a:p>
+        </p:txBody>
+      </p:sp>
+      <p:sp>
+        <p:nvSpPr>
+          <p:cNvPr id="26" name="TextBox 25"/>
+          <p:cNvSpPr txBox="1"/>
+          <p:nvPr/>
+        </p:nvSpPr>
+        <p:spPr>
+          <a:xfrm>
+            <a:off x="9235440" y="1920240"/>
+            <a:ext cx="2560320" cy="1463040"/>
+          </a:xfrm>
+          <a:prstGeom prst="rect">
+            <a:avLst/>
+          </a:prstGeom>
+          <a:noFill/>
+        </p:spPr>
+        <p:txBody>
+          <a:bodyPr wrap="square">
+            <a:spAutoFit/>
+          </a:bodyPr>
+          <a:lstStyle/>
+          <a:p>
+            <a:pPr>
+              <a:spcAft>
+                <a:spcPts val="400"/>
+              </a:spcAft>
+              <a:defRPr sz="900">
+                <a:solidFill>
+                  <a:srgbClr val="1D1D4D"/>
+                </a:solidFill>
+              </a:defRPr>
+            </a:pPr>
+            <a:r>
+              <a:t>• Replace Security Activity Management system</a:t>
+            </a:r>
+          </a:p>
+          <a:p>
+            <a:pPr>
+              <a:spcAft>
+                <a:spcPts val="400"/>
+              </a:spcAft>
+              <a:defRPr sz="900">
+                <a:solidFill>
+                  <a:srgbClr val="1D1D4D"/>
+                </a:solidFill>
+              </a:defRPr>
+            </a:pPr>
+            <a:r>
+              <a:t>• Migrate to Collate (subject to decision)</a:t>
+            </a:r>
+          </a:p>
+          <a:p>
+            <a:pPr>
+              <a:spcAft>
+                <a:spcPts val="400"/>
+              </a:spcAft>
+              <a:defRPr sz="900">
+                <a:solidFill>
+                  <a:srgbClr val="1D1D4D"/>
+                </a:solidFill>
+              </a:defRPr>
+            </a:pPr>
+            <a:r>
+              <a:t>• Decommission legacy SAM by support end</a:t>
+            </a:r>
+          </a:p>
+        </p:txBody>
+      </p:sp>
+      <p:sp>
+        <p:nvSpPr>
+          <p:cNvPr id="27" name="TextBox 26"/>
+          <p:cNvSpPr txBox="1"/>
+          <p:nvPr/>
+        </p:nvSpPr>
+        <p:spPr>
+          <a:xfrm>
+            <a:off x="365760" y="3657600"/>
+            <a:ext cx="10972800" cy="365760"/>
+          </a:xfrm>
+          <a:prstGeom prst="rect">
+            <a:avLst/>
+          </a:prstGeom>
+          <a:noFill/>
+        </p:spPr>
+        <p:txBody>
+          <a:bodyPr wrap="none">
+            <a:spAutoFit/>
+          </a:bodyPr>
           <a:lstStyle/>
           <a:p>
             <a:pPr algn="ctr">
-              <a:defRPr sz="1100" b="1">
-                <a:solidFill>
-                  <a:srgbClr val="FFFFFF"/>
-                </a:solidFill>
-              </a:defRPr>
-            </a:pPr>
-            <a:r>
-              <a:t>Due</a:t>
-            </a:r>
-          </a:p>
-        </p:txBody>
-      </p:sp>
-      <p:sp>
-        <p:nvSpPr>
-          <p:cNvPr id="40" name="Rectangle 39"/>
-          <p:cNvSpPr/>
-          <p:nvPr/>
-        </p:nvSpPr>
-        <p:spPr>
-          <a:xfrm>
-            <a:off x="5760720" y="4023360"/>
-            <a:ext cx="731520" cy="320040"/>
-          </a:xfrm>
-          <a:prstGeom prst="rect">
-            <a:avLst/>
-          </a:prstGeom>
-          <a:solidFill>
-            <a:srgbClr val="1D1D4D"/>
-          </a:solidFill>
-          <a:ln w="6350">
-            <a:solidFill>
-              <a:srgbClr val="CCCCCC"/>
-            </a:solidFill>
-          </a:ln>
-        </p:spPr>
-        <p:style>
-          <a:lnRef idx="1">
-            <a:schemeClr val="accent1"/>
-          </a:lnRef>
-          <a:fillRef idx="3">
-            <a:schemeClr val="accent1"/>
-          </a:fillRef>
-          <a:effectRef idx="2">
-            <a:schemeClr val="accent1"/>
-          </a:effectRef>
-          <a:fontRef idx="minor">
-            <a:schemeClr val="lt1"/>
-          </a:fontRef>
-        </p:style>
-        <p:txBody>
-          <a:bodyPr rtlCol="0" anchor="ctr" wrap="square"/>
-          <a:lstStyle/>
-          <a:p>
-            <a:pPr algn="ctr">
-              <a:defRPr sz="1100" b="1">
-                <a:solidFill>
-                  <a:srgbClr val="FFFFFF"/>
-                </a:solidFill>
-              </a:defRPr>
-            </a:pPr>
-            <a:r>
-              <a:t>RAG</a:t>
-            </a:r>
-          </a:p>
-        </p:txBody>
-      </p:sp>
-      <p:sp>
-        <p:nvSpPr>
-          <p:cNvPr id="41" name="Rectangle 40"/>
-          <p:cNvSpPr/>
-          <p:nvPr/>
-        </p:nvSpPr>
-        <p:spPr>
-          <a:xfrm>
-            <a:off x="274320" y="4343400"/>
-            <a:ext cx="2926080" cy="320040"/>
-          </a:xfrm>
-          <a:prstGeom prst="rect">
-            <a:avLst/>
-          </a:prstGeom>
-          <a:solidFill>
-            <a:srgbClr val="FFFFFF"/>
-          </a:solidFill>
-          <a:ln w="6350">
-            <a:solidFill>
-              <a:srgbClr val="CCCCCC"/>
-            </a:solidFill>
-          </a:ln>
-        </p:spPr>
-        <p:style>
-          <a:lnRef idx="1">
-            <a:schemeClr val="accent1"/>
-          </a:lnRef>
-          <a:fillRef idx="3">
-            <a:schemeClr val="accent1"/>
-          </a:fillRef>
-          <a:effectRef idx="2">
-            <a:schemeClr val="accent1"/>
-          </a:effectRef>
-          <a:fontRef idx="minor">
-            <a:schemeClr val="lt1"/>
-          </a:fontRef>
-        </p:style>
-        <p:txBody>
-          <a:bodyPr rtlCol="0" anchor="ctr" wrap="square"/>
-          <a:lstStyle/>
-          <a:p>
-            <a:pPr algn="l">
-              <a:defRPr sz="1000" b="0">
+              <a:defRPr sz="1100">
                 <a:solidFill>
                   <a:srgbClr val="1D1D4D"/>
                 </a:solidFill>
               </a:defRPr>
             </a:pPr>
             <a:r>
-              <a:t>CB AFCALC Governance</a:t>
-            </a:r>
-          </a:p>
-        </p:txBody>
-      </p:sp>
-      <p:sp>
-        <p:nvSpPr>
-          <p:cNvPr id="42" name="Rectangle 41"/>
-          <p:cNvSpPr/>
-          <p:nvPr/>
-        </p:nvSpPr>
-        <p:spPr>
-          <a:xfrm>
-            <a:off x="3200400" y="4343400"/>
-            <a:ext cx="1645920" cy="320040"/>
-          </a:xfrm>
-          <a:prstGeom prst="rect">
-            <a:avLst/>
-          </a:prstGeom>
-          <a:solidFill>
-            <a:srgbClr val="FFFFFF"/>
-          </a:solidFill>
-          <a:ln w="6350">
-            <a:solidFill>
-              <a:srgbClr val="CCCCCC"/>
-            </a:solidFill>
-          </a:ln>
-        </p:spPr>
-        <p:style>
-          <a:lnRef idx="1">
-            <a:schemeClr val="accent1"/>
-          </a:lnRef>
-          <a:fillRef idx="3">
-            <a:schemeClr val="accent1"/>
-          </a:fillRef>
-          <a:effectRef idx="2">
-            <a:schemeClr val="accent1"/>
-          </a:effectRef>
-          <a:fontRef idx="minor">
-            <a:schemeClr val="lt1"/>
-          </a:fontRef>
-        </p:style>
-        <p:txBody>
-          <a:bodyPr rtlCol="0" anchor="ctr" wrap="square"/>
-          <a:lstStyle/>
-          <a:p>
-            <a:pPr algn="l">
-              <a:defRPr sz="1000" b="0">
-                <a:solidFill>
-                  <a:srgbClr val="1D1D4D"/>
-                </a:solidFill>
-              </a:defRPr>
-            </a:pPr>
-            <a:r>
-              <a:t>Waracle</a:t>
-            </a:r>
-          </a:p>
-        </p:txBody>
-      </p:sp>
-      <p:sp>
-        <p:nvSpPr>
-          <p:cNvPr id="43" name="Rectangle 42"/>
-          <p:cNvSpPr/>
-          <p:nvPr/>
-        </p:nvSpPr>
-        <p:spPr>
-          <a:xfrm>
-            <a:off x="4846320" y="4343400"/>
-            <a:ext cx="914400" cy="320040"/>
-          </a:xfrm>
-          <a:prstGeom prst="rect">
-            <a:avLst/>
-          </a:prstGeom>
-          <a:solidFill>
-            <a:srgbClr val="FFFFFF"/>
-          </a:solidFill>
-          <a:ln w="6350">
-            <a:solidFill>
-              <a:srgbClr val="CCCCCC"/>
-            </a:solidFill>
-          </a:ln>
-        </p:spPr>
-        <p:style>
-          <a:lnRef idx="1">
-            <a:schemeClr val="accent1"/>
-          </a:lnRef>
-          <a:fillRef idx="3">
-            <a:schemeClr val="accent1"/>
-          </a:fillRef>
-          <a:effectRef idx="2">
-            <a:schemeClr val="accent1"/>
-          </a:effectRef>
-          <a:fontRef idx="minor">
-            <a:schemeClr val="lt1"/>
-          </a:fontRef>
-        </p:style>
-        <p:txBody>
-          <a:bodyPr rtlCol="0" anchor="ctr" wrap="square"/>
-          <a:lstStyle/>
-          <a:p>
-            <a:pPr algn="ctr">
-              <a:defRPr sz="1000" b="0">
-                <a:solidFill>
-                  <a:srgbClr val="1D1D4D"/>
-                </a:solidFill>
-              </a:defRPr>
-            </a:pPr>
-            <a:r>
-              <a:t>10 Feb</a:t>
-            </a:r>
-          </a:p>
-        </p:txBody>
-      </p:sp>
-      <p:sp>
-        <p:nvSpPr>
-          <p:cNvPr id="44" name="Rectangle 43"/>
-          <p:cNvSpPr/>
-          <p:nvPr/>
-        </p:nvSpPr>
-        <p:spPr>
-          <a:xfrm>
-            <a:off x="5760720" y="4343400"/>
-            <a:ext cx="731520" cy="320040"/>
-          </a:xfrm>
-          <a:prstGeom prst="rect">
-            <a:avLst/>
-          </a:prstGeom>
-          <a:solidFill>
-            <a:srgbClr val="36B37E"/>
-          </a:solidFill>
-          <a:ln w="6350">
-            <a:solidFill>
-              <a:srgbClr val="CCCCCC"/>
-            </a:solidFill>
-          </a:ln>
-        </p:spPr>
-        <p:style>
-          <a:lnRef idx="1">
-            <a:schemeClr val="accent1"/>
-          </a:lnRef>
-          <a:fillRef idx="3">
-            <a:schemeClr val="accent1"/>
-          </a:fillRef>
-          <a:effectRef idx="2">
-            <a:schemeClr val="accent1"/>
-          </a:effectRef>
-          <a:fontRef idx="minor">
-            <a:schemeClr val="lt1"/>
-          </a:fontRef>
-        </p:style>
-        <p:txBody>
-          <a:bodyPr rtlCol="0" anchor="ctr" wrap="square"/>
-          <a:lstStyle/>
-          <a:p>
-            <a:pPr algn="ctr">
-              <a:defRPr sz="1000" b="0">
-                <a:solidFill>
-                  <a:srgbClr val="FFFFFF"/>
-                </a:solidFill>
-              </a:defRPr>
-            </a:pPr>
-            <a:r>
-              <a:t>Green</a:t>
-            </a:r>
-          </a:p>
-        </p:txBody>
-      </p:sp>
-      <p:sp>
-        <p:nvSpPr>
-          <p:cNvPr id="45" name="Rectangle 44"/>
-          <p:cNvSpPr/>
-          <p:nvPr/>
-        </p:nvSpPr>
-        <p:spPr>
-          <a:xfrm>
-            <a:off x="274320" y="4663440"/>
-            <a:ext cx="2926080" cy="320040"/>
-          </a:xfrm>
-          <a:prstGeom prst="rect">
-            <a:avLst/>
-          </a:prstGeom>
-          <a:solidFill>
-            <a:srgbClr val="E6EEF5"/>
-          </a:solidFill>
-          <a:ln w="6350">
-            <a:solidFill>
-              <a:srgbClr val="CCCCCC"/>
-            </a:solidFill>
-          </a:ln>
-        </p:spPr>
-        <p:style>
-          <a:lnRef idx="1">
-            <a:schemeClr val="accent1"/>
-          </a:lnRef>
-          <a:fillRef idx="3">
-            <a:schemeClr val="accent1"/>
-          </a:fillRef>
-          <a:effectRef idx="2">
-            <a:schemeClr val="accent1"/>
-          </a:effectRef>
-          <a:fontRef idx="minor">
-            <a:schemeClr val="lt1"/>
-          </a:fontRef>
-        </p:style>
-        <p:txBody>
-          <a:bodyPr rtlCol="0" anchor="ctr" wrap="square"/>
-          <a:lstStyle/>
-          <a:p>
-            <a:pPr algn="l">
-              <a:defRPr sz="1000" b="0">
-                <a:solidFill>
-                  <a:srgbClr val="1D1D4D"/>
-                </a:solidFill>
-              </a:defRPr>
-            </a:pPr>
-            <a:r>
-              <a:t>CBIS Rebranding</a:t>
-            </a:r>
-          </a:p>
-        </p:txBody>
-      </p:sp>
-      <p:sp>
-        <p:nvSpPr>
-          <p:cNvPr id="46" name="Rectangle 45"/>
-          <p:cNvSpPr/>
-          <p:nvPr/>
-        </p:nvSpPr>
-        <p:spPr>
-          <a:xfrm>
-            <a:off x="3200400" y="4663440"/>
-            <a:ext cx="1645920" cy="320040"/>
-          </a:xfrm>
-          <a:prstGeom prst="rect">
-            <a:avLst/>
-          </a:prstGeom>
-          <a:solidFill>
-            <a:srgbClr val="E6EEF5"/>
-          </a:solidFill>
-          <a:ln w="6350">
-            <a:solidFill>
-              <a:srgbClr val="CCCCCC"/>
-            </a:solidFill>
-          </a:ln>
-        </p:spPr>
-        <p:style>
-          <a:lnRef idx="1">
-            <a:schemeClr val="accent1"/>
-          </a:lnRef>
-          <a:fillRef idx="3">
-            <a:schemeClr val="accent1"/>
-          </a:fillRef>
-          <a:effectRef idx="2">
-            <a:schemeClr val="accent1"/>
-          </a:effectRef>
-          <a:fontRef idx="minor">
-            <a:schemeClr val="lt1"/>
-          </a:fontRef>
-        </p:style>
-        <p:txBody>
-          <a:bodyPr rtlCol="0" anchor="ctr" wrap="square"/>
-          <a:lstStyle/>
-          <a:p>
-            <a:pPr algn="l">
-              <a:defRPr sz="1000" b="0">
-                <a:solidFill>
-                  <a:srgbClr val="1D1D4D"/>
-                </a:solidFill>
-              </a:defRPr>
-            </a:pPr>
-            <a:r>
-              <a:t>Direct Website</a:t>
-            </a:r>
-          </a:p>
-        </p:txBody>
-      </p:sp>
-      <p:sp>
-        <p:nvSpPr>
-          <p:cNvPr id="47" name="Rectangle 46"/>
-          <p:cNvSpPr/>
-          <p:nvPr/>
-        </p:nvSpPr>
-        <p:spPr>
-          <a:xfrm>
-            <a:off x="4846320" y="4663440"/>
-            <a:ext cx="914400" cy="320040"/>
-          </a:xfrm>
-          <a:prstGeom prst="rect">
-            <a:avLst/>
-          </a:prstGeom>
-          <a:solidFill>
-            <a:srgbClr val="E6EEF5"/>
-          </a:solidFill>
-          <a:ln w="6350">
-            <a:solidFill>
-              <a:srgbClr val="CCCCCC"/>
-            </a:solidFill>
-          </a:ln>
-        </p:spPr>
-        <p:style>
-          <a:lnRef idx="1">
-            <a:schemeClr val="accent1"/>
-          </a:lnRef>
-          <a:fillRef idx="3">
-            <a:schemeClr val="accent1"/>
-          </a:fillRef>
-          <a:effectRef idx="2">
-            <a:schemeClr val="accent1"/>
-          </a:effectRef>
-          <a:fontRef idx="minor">
-            <a:schemeClr val="lt1"/>
-          </a:fontRef>
-        </p:style>
-        <p:txBody>
-          <a:bodyPr rtlCol="0" anchor="ctr" wrap="square"/>
-          <a:lstStyle/>
-          <a:p>
-            <a:pPr algn="ctr">
-              <a:defRPr sz="1000" b="0">
-                <a:solidFill>
-                  <a:srgbClr val="1D1D4D"/>
-                </a:solidFill>
-              </a:defRPr>
-            </a:pPr>
-            <a:r>
-              <a:t>10 Feb</a:t>
-            </a:r>
-          </a:p>
-        </p:txBody>
-      </p:sp>
-      <p:sp>
-        <p:nvSpPr>
-          <p:cNvPr id="48" name="Rectangle 47"/>
-          <p:cNvSpPr/>
-          <p:nvPr/>
-        </p:nvSpPr>
-        <p:spPr>
-          <a:xfrm>
-            <a:off x="5760720" y="4663440"/>
-            <a:ext cx="731520" cy="320040"/>
-          </a:xfrm>
-          <a:prstGeom prst="rect">
-            <a:avLst/>
-          </a:prstGeom>
-          <a:solidFill>
-            <a:srgbClr val="36B37E"/>
-          </a:solidFill>
-          <a:ln w="6350">
-            <a:solidFill>
-              <a:srgbClr val="CCCCCC"/>
-            </a:solidFill>
-          </a:ln>
-        </p:spPr>
-        <p:style>
-          <a:lnRef idx="1">
-            <a:schemeClr val="accent1"/>
-          </a:lnRef>
-          <a:fillRef idx="3">
-            <a:schemeClr val="accent1"/>
-          </a:fillRef>
-          <a:effectRef idx="2">
-            <a:schemeClr val="accent1"/>
-          </a:effectRef>
-          <a:fontRef idx="minor">
-            <a:schemeClr val="lt1"/>
-          </a:fontRef>
-        </p:style>
-        <p:txBody>
-          <a:bodyPr rtlCol="0" anchor="ctr" wrap="square"/>
-          <a:lstStyle/>
-          <a:p>
-            <a:pPr algn="ctr">
-              <a:defRPr sz="1000" b="0">
-                <a:solidFill>
-                  <a:srgbClr val="FFFFFF"/>
-                </a:solidFill>
-              </a:defRPr>
-            </a:pPr>
-            <a:r>
-              <a:t>Green</a:t>
-            </a:r>
-          </a:p>
-        </p:txBody>
-      </p:sp>
-      <p:sp>
-        <p:nvSpPr>
-          <p:cNvPr id="49" name="Rectangle 48"/>
-          <p:cNvSpPr/>
-          <p:nvPr/>
-        </p:nvSpPr>
-        <p:spPr>
-          <a:xfrm>
-            <a:off x="274320" y="4983480"/>
-            <a:ext cx="2926080" cy="320040"/>
-          </a:xfrm>
-          <a:prstGeom prst="rect">
-            <a:avLst/>
-          </a:prstGeom>
-          <a:solidFill>
-            <a:srgbClr val="FFFFFF"/>
-          </a:solidFill>
-          <a:ln w="6350">
-            <a:solidFill>
-              <a:srgbClr val="CCCCCC"/>
-            </a:solidFill>
-          </a:ln>
-        </p:spPr>
-        <p:style>
-          <a:lnRef idx="1">
-            <a:schemeClr val="accent1"/>
-          </a:lnRef>
-          <a:fillRef idx="3">
-            <a:schemeClr val="accent1"/>
-          </a:fillRef>
-          <a:effectRef idx="2">
-            <a:schemeClr val="accent1"/>
-          </a:effectRef>
-          <a:fontRef idx="minor">
-            <a:schemeClr val="lt1"/>
-          </a:fontRef>
-        </p:style>
-        <p:txBody>
-          <a:bodyPr rtlCol="0" anchor="ctr" wrap="square"/>
-          <a:lstStyle/>
-          <a:p>
-            <a:pPr algn="l">
-              <a:defRPr sz="1000" b="0">
-                <a:solidFill>
-                  <a:srgbClr val="1D1D4D"/>
-                </a:solidFill>
-              </a:defRPr>
-            </a:pPr>
-            <a:r>
-              <a:t>10to8 Appointment Booking</a:t>
-            </a:r>
-          </a:p>
-        </p:txBody>
-      </p:sp>
-      <p:sp>
-        <p:nvSpPr>
-          <p:cNvPr id="50" name="Rectangle 49"/>
-          <p:cNvSpPr/>
-          <p:nvPr/>
-        </p:nvSpPr>
-        <p:spPr>
-          <a:xfrm>
-            <a:off x="3200400" y="4983480"/>
-            <a:ext cx="1645920" cy="320040"/>
-          </a:xfrm>
-          <a:prstGeom prst="rect">
-            <a:avLst/>
-          </a:prstGeom>
-          <a:solidFill>
-            <a:srgbClr val="FFFFFF"/>
-          </a:solidFill>
-          <a:ln w="6350">
-            <a:solidFill>
-              <a:srgbClr val="CCCCCC"/>
-            </a:solidFill>
-          </a:ln>
-        </p:spPr>
-        <p:style>
-          <a:lnRef idx="1">
-            <a:schemeClr val="accent1"/>
-          </a:lnRef>
-          <a:fillRef idx="3">
-            <a:schemeClr val="accent1"/>
-          </a:fillRef>
-          <a:effectRef idx="2">
-            <a:schemeClr val="accent1"/>
-          </a:effectRef>
-          <a:fontRef idx="minor">
-            <a:schemeClr val="lt1"/>
-          </a:fontRef>
-        </p:style>
-        <p:txBody>
-          <a:bodyPr rtlCol="0" anchor="ctr" wrap="square"/>
-          <a:lstStyle/>
-          <a:p>
-            <a:pPr algn="l">
-              <a:defRPr sz="1000" b="0">
-                <a:solidFill>
-                  <a:srgbClr val="1D1D4D"/>
-                </a:solidFill>
-              </a:defRPr>
-            </a:pPr>
-            <a:r>
-              <a:t>Growth Ops</a:t>
-            </a:r>
-          </a:p>
-        </p:txBody>
-      </p:sp>
-      <p:sp>
-        <p:nvSpPr>
-          <p:cNvPr id="51" name="Rectangle 50"/>
-          <p:cNvSpPr/>
-          <p:nvPr/>
-        </p:nvSpPr>
-        <p:spPr>
-          <a:xfrm>
-            <a:off x="4846320" y="4983480"/>
-            <a:ext cx="914400" cy="320040"/>
-          </a:xfrm>
-          <a:prstGeom prst="rect">
-            <a:avLst/>
-          </a:prstGeom>
-          <a:solidFill>
-            <a:srgbClr val="FFFFFF"/>
-          </a:solidFill>
-          <a:ln w="6350">
-            <a:solidFill>
-              <a:srgbClr val="CCCCCC"/>
-            </a:solidFill>
-          </a:ln>
-        </p:spPr>
-        <p:style>
-          <a:lnRef idx="1">
-            <a:schemeClr val="accent1"/>
-          </a:lnRef>
-          <a:fillRef idx="3">
-            <a:schemeClr val="accent1"/>
-          </a:fillRef>
-          <a:effectRef idx="2">
-            <a:schemeClr val="accent1"/>
-          </a:effectRef>
-          <a:fontRef idx="minor">
-            <a:schemeClr val="lt1"/>
-          </a:fontRef>
-        </p:style>
-        <p:txBody>
-          <a:bodyPr rtlCol="0" anchor="ctr" wrap="square"/>
-          <a:lstStyle/>
-          <a:p>
-            <a:pPr algn="ctr">
-              <a:defRPr sz="1000" b="0">
-                <a:solidFill>
-                  <a:srgbClr val="1D1D4D"/>
-                </a:solidFill>
-              </a:defRPr>
-            </a:pPr>
-            <a:r>
-              <a:t>18 Feb</a:t>
-            </a:r>
-          </a:p>
-        </p:txBody>
-      </p:sp>
-      <p:sp>
-        <p:nvSpPr>
-          <p:cNvPr id="52" name="Rectangle 51"/>
-          <p:cNvSpPr/>
-          <p:nvPr/>
-        </p:nvSpPr>
-        <p:spPr>
-          <a:xfrm>
-            <a:off x="5760720" y="4983480"/>
-            <a:ext cx="731520" cy="320040"/>
-          </a:xfrm>
-          <a:prstGeom prst="rect">
-            <a:avLst/>
-          </a:prstGeom>
-          <a:solidFill>
-            <a:srgbClr val="36B37E"/>
-          </a:solidFill>
-          <a:ln w="6350">
-            <a:solidFill>
-              <a:srgbClr val="CCCCCC"/>
-            </a:solidFill>
-          </a:ln>
-        </p:spPr>
-        <p:style>
-          <a:lnRef idx="1">
-            <a:schemeClr val="accent1"/>
-          </a:lnRef>
-          <a:fillRef idx="3">
-            <a:schemeClr val="accent1"/>
-          </a:fillRef>
-          <a:effectRef idx="2">
-            <a:schemeClr val="accent1"/>
-          </a:effectRef>
-          <a:fontRef idx="minor">
-            <a:schemeClr val="lt1"/>
-          </a:fontRef>
-        </p:style>
-        <p:txBody>
-          <a:bodyPr rtlCol="0" anchor="ctr" wrap="square"/>
-          <a:lstStyle/>
-          <a:p>
-            <a:pPr algn="ctr">
-              <a:defRPr sz="1000" b="0">
-                <a:solidFill>
-                  <a:srgbClr val="FFFFFF"/>
-                </a:solidFill>
-              </a:defRPr>
-            </a:pPr>
-            <a:r>
-              <a:t>Green</a:t>
-            </a:r>
-          </a:p>
-        </p:txBody>
-      </p:sp>
-      <p:sp>
-        <p:nvSpPr>
-          <p:cNvPr id="53" name="Rectangle 52"/>
-          <p:cNvSpPr/>
-          <p:nvPr/>
-        </p:nvSpPr>
-        <p:spPr>
-          <a:xfrm>
-            <a:off x="274320" y="5303520"/>
-            <a:ext cx="2926080" cy="320040"/>
-          </a:xfrm>
-          <a:prstGeom prst="rect">
-            <a:avLst/>
-          </a:prstGeom>
-          <a:solidFill>
-            <a:srgbClr val="E6EEF5"/>
-          </a:solidFill>
-          <a:ln w="6350">
-            <a:solidFill>
-              <a:srgbClr val="CCCCCC"/>
-            </a:solidFill>
-          </a:ln>
-        </p:spPr>
-        <p:style>
-          <a:lnRef idx="1">
-            <a:schemeClr val="accent1"/>
-          </a:lnRef>
-          <a:fillRef idx="3">
-            <a:schemeClr val="accent1"/>
-          </a:fillRef>
-          <a:effectRef idx="2">
-            <a:schemeClr val="accent1"/>
-          </a:effectRef>
-          <a:fontRef idx="minor">
-            <a:schemeClr val="lt1"/>
-          </a:fontRef>
-        </p:style>
-        <p:txBody>
-          <a:bodyPr rtlCol="0" anchor="ctr" wrap="square"/>
-          <a:lstStyle/>
-          <a:p>
-            <a:pPr algn="l">
-              <a:defRPr sz="1000" b="0">
-                <a:solidFill>
-                  <a:srgbClr val="1D1D4D"/>
-                </a:solidFill>
-              </a:defRPr>
-            </a:pPr>
-            <a:r>
-              <a:t>Re-platform Clydesdale Direct</a:t>
-            </a:r>
-          </a:p>
-        </p:txBody>
-      </p:sp>
-      <p:sp>
-        <p:nvSpPr>
-          <p:cNvPr id="54" name="Rectangle 53"/>
-          <p:cNvSpPr/>
-          <p:nvPr/>
-        </p:nvSpPr>
-        <p:spPr>
-          <a:xfrm>
-            <a:off x="3200400" y="5303520"/>
-            <a:ext cx="1645920" cy="320040"/>
-          </a:xfrm>
-          <a:prstGeom prst="rect">
-            <a:avLst/>
-          </a:prstGeom>
-          <a:solidFill>
-            <a:srgbClr val="E6EEF5"/>
-          </a:solidFill>
-          <a:ln w="6350">
-            <a:solidFill>
-              <a:srgbClr val="CCCCCC"/>
-            </a:solidFill>
-          </a:ln>
-        </p:spPr>
-        <p:style>
-          <a:lnRef idx="1">
-            <a:schemeClr val="accent1"/>
-          </a:lnRef>
-          <a:fillRef idx="3">
-            <a:schemeClr val="accent1"/>
-          </a:fillRef>
-          <a:effectRef idx="2">
-            <a:schemeClr val="accent1"/>
-          </a:effectRef>
-          <a:fontRef idx="minor">
-            <a:schemeClr val="lt1"/>
-          </a:fontRef>
-        </p:style>
-        <p:txBody>
-          <a:bodyPr rtlCol="0" anchor="ctr" wrap="square"/>
-          <a:lstStyle/>
-          <a:p>
-            <a:pPr algn="l">
-              <a:defRPr sz="1000" b="0">
-                <a:solidFill>
-                  <a:srgbClr val="1D1D4D"/>
-                </a:solidFill>
-              </a:defRPr>
-            </a:pPr>
-            <a:r>
-              <a:t>Direct Website</a:t>
-            </a:r>
-          </a:p>
-        </p:txBody>
-      </p:sp>
-      <p:sp>
-        <p:nvSpPr>
-          <p:cNvPr id="55" name="Rectangle 54"/>
-          <p:cNvSpPr/>
-          <p:nvPr/>
-        </p:nvSpPr>
-        <p:spPr>
-          <a:xfrm>
-            <a:off x="4846320" y="5303520"/>
-            <a:ext cx="914400" cy="320040"/>
-          </a:xfrm>
-          <a:prstGeom prst="rect">
-            <a:avLst/>
-          </a:prstGeom>
-          <a:solidFill>
-            <a:srgbClr val="E6EEF5"/>
-          </a:solidFill>
-          <a:ln w="6350">
-            <a:solidFill>
-              <a:srgbClr val="CCCCCC"/>
-            </a:solidFill>
-          </a:ln>
-        </p:spPr>
-        <p:style>
-          <a:lnRef idx="1">
-            <a:schemeClr val="accent1"/>
-          </a:lnRef>
-          <a:fillRef idx="3">
-            <a:schemeClr val="accent1"/>
-          </a:fillRef>
-          <a:effectRef idx="2">
-            <a:schemeClr val="accent1"/>
-          </a:effectRef>
-          <a:fontRef idx="minor">
-            <a:schemeClr val="lt1"/>
-          </a:fontRef>
-        </p:style>
-        <p:txBody>
-          <a:bodyPr rtlCol="0" anchor="ctr" wrap="square"/>
-          <a:lstStyle/>
-          <a:p>
-            <a:pPr algn="ctr">
-              <a:defRPr sz="1000" b="0">
-                <a:solidFill>
-                  <a:srgbClr val="1D1D4D"/>
-                </a:solidFill>
-              </a:defRPr>
-            </a:pPr>
-            <a:r>
-              <a:t>20 Feb</a:t>
-            </a:r>
-          </a:p>
-        </p:txBody>
-      </p:sp>
-      <p:sp>
-        <p:nvSpPr>
-          <p:cNvPr id="56" name="Rectangle 55"/>
-          <p:cNvSpPr/>
-          <p:nvPr/>
-        </p:nvSpPr>
-        <p:spPr>
-          <a:xfrm>
-            <a:off x="5760720" y="5303520"/>
-            <a:ext cx="731520" cy="320040"/>
-          </a:xfrm>
-          <a:prstGeom prst="rect">
-            <a:avLst/>
-          </a:prstGeom>
-          <a:solidFill>
-            <a:srgbClr val="36B37E"/>
-          </a:solidFill>
-          <a:ln w="6350">
-            <a:solidFill>
-              <a:srgbClr val="CCCCCC"/>
-            </a:solidFill>
-          </a:ln>
-        </p:spPr>
-        <p:style>
-          <a:lnRef idx="1">
-            <a:schemeClr val="accent1"/>
-          </a:lnRef>
-          <a:fillRef idx="3">
-            <a:schemeClr val="accent1"/>
-          </a:fillRef>
-          <a:effectRef idx="2">
-            <a:schemeClr val="accent1"/>
-          </a:effectRef>
-          <a:fontRef idx="minor">
-            <a:schemeClr val="lt1"/>
-          </a:fontRef>
-        </p:style>
-        <p:txBody>
-          <a:bodyPr rtlCol="0" anchor="ctr" wrap="square"/>
-          <a:lstStyle/>
-          <a:p>
-            <a:pPr algn="ctr">
-              <a:defRPr sz="1000" b="0">
-                <a:solidFill>
-                  <a:srgbClr val="FFFFFF"/>
-                </a:solidFill>
-              </a:defRPr>
-            </a:pPr>
-            <a:r>
-              <a:t>Green</a:t>
-            </a:r>
-          </a:p>
-        </p:txBody>
-      </p:sp>
-      <p:sp>
-        <p:nvSpPr>
-          <p:cNvPr id="57" name="Rectangle 56"/>
-          <p:cNvSpPr/>
-          <p:nvPr/>
-        </p:nvSpPr>
-        <p:spPr>
-          <a:xfrm>
-            <a:off x="274320" y="5623560"/>
-            <a:ext cx="2926080" cy="320040"/>
-          </a:xfrm>
-          <a:prstGeom prst="rect">
-            <a:avLst/>
-          </a:prstGeom>
-          <a:solidFill>
-            <a:srgbClr val="FFFFFF"/>
-          </a:solidFill>
-          <a:ln w="6350">
-            <a:solidFill>
-              <a:srgbClr val="CCCCCC"/>
-            </a:solidFill>
-          </a:ln>
-        </p:spPr>
-        <p:style>
-          <a:lnRef idx="1">
-            <a:schemeClr val="accent1"/>
-          </a:lnRef>
-          <a:fillRef idx="3">
-            <a:schemeClr val="accent1"/>
-          </a:fillRef>
-          <a:effectRef idx="2">
-            <a:schemeClr val="accent1"/>
-          </a:effectRef>
-          <a:fontRef idx="minor">
-            <a:schemeClr val="lt1"/>
-          </a:fontRef>
-        </p:style>
-        <p:txBody>
-          <a:bodyPr rtlCol="0" anchor="ctr" wrap="square"/>
-          <a:lstStyle/>
-          <a:p>
-            <a:pPr algn="l">
-              <a:defRPr sz="1000" b="0">
-                <a:solidFill>
-                  <a:srgbClr val="1D1D4D"/>
-                </a:solidFill>
-              </a:defRPr>
-            </a:pPr>
-            <a:r>
-              <a:t>SAM Discovery</a:t>
-            </a:r>
-          </a:p>
-        </p:txBody>
-      </p:sp>
-      <p:sp>
-        <p:nvSpPr>
-          <p:cNvPr id="58" name="Rectangle 57"/>
-          <p:cNvSpPr/>
-          <p:nvPr/>
-        </p:nvSpPr>
-        <p:spPr>
-          <a:xfrm>
-            <a:off x="3200400" y="5623560"/>
-            <a:ext cx="1645920" cy="320040"/>
-          </a:xfrm>
-          <a:prstGeom prst="rect">
-            <a:avLst/>
-          </a:prstGeom>
-          <a:solidFill>
-            <a:srgbClr val="FFFFFF"/>
-          </a:solidFill>
-          <a:ln w="6350">
-            <a:solidFill>
-              <a:srgbClr val="CCCCCC"/>
-            </a:solidFill>
-          </a:ln>
-        </p:spPr>
-        <p:style>
-          <a:lnRef idx="1">
-            <a:schemeClr val="accent1"/>
-          </a:lnRef>
-          <a:fillRef idx="3">
-            <a:schemeClr val="accent1"/>
-          </a:fillRef>
-          <a:effectRef idx="2">
-            <a:schemeClr val="accent1"/>
-          </a:effectRef>
-          <a:fontRef idx="minor">
-            <a:schemeClr val="lt1"/>
-          </a:fontRef>
-        </p:style>
-        <p:txBody>
-          <a:bodyPr rtlCol="0" anchor="ctr" wrap="square"/>
-          <a:lstStyle/>
-          <a:p>
-            <a:pPr algn="l">
-              <a:defRPr sz="1000" b="0">
-                <a:solidFill>
-                  <a:srgbClr val="1D1D4D"/>
-                </a:solidFill>
-              </a:defRPr>
-            </a:pPr>
-            <a:r>
-              <a:t>SAM</a:t>
-            </a:r>
-          </a:p>
-        </p:txBody>
-      </p:sp>
-      <p:sp>
-        <p:nvSpPr>
-          <p:cNvPr id="59" name="Rectangle 58"/>
-          <p:cNvSpPr/>
-          <p:nvPr/>
-        </p:nvSpPr>
-        <p:spPr>
-          <a:xfrm>
-            <a:off x="4846320" y="5623560"/>
-            <a:ext cx="914400" cy="320040"/>
-          </a:xfrm>
-          <a:prstGeom prst="rect">
-            <a:avLst/>
-          </a:prstGeom>
-          <a:solidFill>
-            <a:srgbClr val="FFFFFF"/>
-          </a:solidFill>
-          <a:ln w="6350">
-            <a:solidFill>
-              <a:srgbClr val="CCCCCC"/>
-            </a:solidFill>
-          </a:ln>
-        </p:spPr>
-        <p:style>
-          <a:lnRef idx="1">
-            <a:schemeClr val="accent1"/>
-          </a:lnRef>
-          <a:fillRef idx="3">
-            <a:schemeClr val="accent1"/>
-          </a:fillRef>
-          <a:effectRef idx="2">
-            <a:schemeClr val="accent1"/>
-          </a:effectRef>
-          <a:fontRef idx="minor">
-            <a:schemeClr val="lt1"/>
-          </a:fontRef>
-        </p:style>
-        <p:txBody>
-          <a:bodyPr rtlCol="0" anchor="ctr" wrap="square"/>
-          <a:lstStyle/>
-          <a:p>
-            <a:pPr algn="ctr">
-              <a:defRPr sz="1000" b="0">
-                <a:solidFill>
-                  <a:srgbClr val="1D1D4D"/>
-                </a:solidFill>
-              </a:defRPr>
-            </a:pPr>
-            <a:r>
-              <a:t>27 Feb</a:t>
-            </a:r>
-          </a:p>
-        </p:txBody>
-      </p:sp>
-      <p:sp>
-        <p:nvSpPr>
-          <p:cNvPr id="60" name="Rectangle 59"/>
-          <p:cNvSpPr/>
-          <p:nvPr/>
-        </p:nvSpPr>
-        <p:spPr>
-          <a:xfrm>
-            <a:off x="5760720" y="5623560"/>
-            <a:ext cx="731520" cy="320040"/>
-          </a:xfrm>
-          <a:prstGeom prst="rect">
-            <a:avLst/>
-          </a:prstGeom>
-          <a:solidFill>
-            <a:srgbClr val="36B37E"/>
-          </a:solidFill>
-          <a:ln w="6350">
-            <a:solidFill>
-              <a:srgbClr val="CCCCCC"/>
-            </a:solidFill>
-          </a:ln>
-        </p:spPr>
-        <p:style>
-          <a:lnRef idx="1">
-            <a:schemeClr val="accent1"/>
-          </a:lnRef>
-          <a:fillRef idx="3">
-            <a:schemeClr val="accent1"/>
-          </a:fillRef>
-          <a:effectRef idx="2">
-            <a:schemeClr val="accent1"/>
-          </a:effectRef>
-          <a:fontRef idx="minor">
-            <a:schemeClr val="lt1"/>
-          </a:fontRef>
-        </p:style>
-        <p:txBody>
-          <a:bodyPr rtlCol="0" anchor="ctr" wrap="square"/>
-          <a:lstStyle/>
-          <a:p>
-            <a:pPr algn="ctr">
-              <a:defRPr sz="1000" b="0">
-                <a:solidFill>
-                  <a:srgbClr val="FFFFFF"/>
-                </a:solidFill>
-              </a:defRPr>
-            </a:pPr>
-            <a:r>
-              <a:t>Green</a:t>
-            </a:r>
-          </a:p>
-        </p:txBody>
-      </p:sp>
-      <p:sp>
-        <p:nvSpPr>
-          <p:cNvPr id="61" name="Rectangle 60"/>
-          <p:cNvSpPr/>
-          <p:nvPr/>
-        </p:nvSpPr>
-        <p:spPr>
-          <a:xfrm>
-            <a:off x="274320" y="5943600"/>
-            <a:ext cx="2926080" cy="320040"/>
-          </a:xfrm>
-          <a:prstGeom prst="rect">
-            <a:avLst/>
-          </a:prstGeom>
-          <a:solidFill>
-            <a:srgbClr val="E6EEF5"/>
-          </a:solidFill>
-          <a:ln w="6350">
-            <a:solidFill>
-              <a:srgbClr val="CCCCCC"/>
-            </a:solidFill>
-          </a:ln>
-        </p:spPr>
-        <p:style>
-          <a:lnRef idx="1">
-            <a:schemeClr val="accent1"/>
-          </a:lnRef>
-          <a:fillRef idx="3">
-            <a:schemeClr val="accent1"/>
-          </a:fillRef>
-          <a:effectRef idx="2">
-            <a:schemeClr val="accent1"/>
-          </a:effectRef>
-          <a:fontRef idx="minor">
-            <a:schemeClr val="lt1"/>
-          </a:fontRef>
-        </p:style>
-        <p:txBody>
-          <a:bodyPr rtlCol="0" anchor="ctr" wrap="square"/>
-          <a:lstStyle/>
-          <a:p>
-            <a:pPr algn="l">
-              <a:defRPr sz="1000" b="0">
-                <a:solidFill>
-                  <a:srgbClr val="1D1D4D"/>
-                </a:solidFill>
-              </a:defRPr>
-            </a:pPr>
-            <a:r>
-              <a:t>SAM Decision</a:t>
-            </a:r>
-          </a:p>
-        </p:txBody>
-      </p:sp>
-      <p:sp>
-        <p:nvSpPr>
-          <p:cNvPr id="62" name="Rectangle 61"/>
-          <p:cNvSpPr/>
-          <p:nvPr/>
-        </p:nvSpPr>
-        <p:spPr>
-          <a:xfrm>
-            <a:off x="3200400" y="5943600"/>
-            <a:ext cx="1645920" cy="320040"/>
-          </a:xfrm>
-          <a:prstGeom prst="rect">
-            <a:avLst/>
-          </a:prstGeom>
-          <a:solidFill>
-            <a:srgbClr val="E6EEF5"/>
-          </a:solidFill>
-          <a:ln w="6350">
-            <a:solidFill>
-              <a:srgbClr val="CCCCCC"/>
-            </a:solidFill>
-          </a:ln>
-        </p:spPr>
-        <p:style>
-          <a:lnRef idx="1">
-            <a:schemeClr val="accent1"/>
-          </a:lnRef>
-          <a:fillRef idx="3">
-            <a:schemeClr val="accent1"/>
-          </a:fillRef>
-          <a:effectRef idx="2">
-            <a:schemeClr val="accent1"/>
-          </a:effectRef>
-          <a:fontRef idx="minor">
-            <a:schemeClr val="lt1"/>
-          </a:fontRef>
-        </p:style>
-        <p:txBody>
-          <a:bodyPr rtlCol="0" anchor="ctr" wrap="square"/>
-          <a:lstStyle/>
-          <a:p>
-            <a:pPr algn="l">
-              <a:defRPr sz="1000" b="0">
-                <a:solidFill>
-                  <a:srgbClr val="1D1D4D"/>
-                </a:solidFill>
-              </a:defRPr>
-            </a:pPr>
-            <a:r>
-              <a:t>SAM</a:t>
-            </a:r>
-          </a:p>
-        </p:txBody>
-      </p:sp>
-      <p:sp>
-        <p:nvSpPr>
-          <p:cNvPr id="63" name="Rectangle 62"/>
-          <p:cNvSpPr/>
-          <p:nvPr/>
-        </p:nvSpPr>
-        <p:spPr>
-          <a:xfrm>
-            <a:off x="4846320" y="5943600"/>
-            <a:ext cx="914400" cy="320040"/>
-          </a:xfrm>
-          <a:prstGeom prst="rect">
-            <a:avLst/>
-          </a:prstGeom>
-          <a:solidFill>
-            <a:srgbClr val="E6EEF5"/>
-          </a:solidFill>
-          <a:ln w="6350">
-            <a:solidFill>
-              <a:srgbClr val="CCCCCC"/>
-            </a:solidFill>
-          </a:ln>
-        </p:spPr>
-        <p:style>
-          <a:lnRef idx="1">
-            <a:schemeClr val="accent1"/>
-          </a:lnRef>
-          <a:fillRef idx="3">
-            <a:schemeClr val="accent1"/>
-          </a:fillRef>
-          <a:effectRef idx="2">
-            <a:schemeClr val="accent1"/>
-          </a:effectRef>
-          <a:fontRef idx="minor">
-            <a:schemeClr val="lt1"/>
-          </a:fontRef>
-        </p:style>
-        <p:txBody>
-          <a:bodyPr rtlCol="0" anchor="ctr" wrap="square"/>
-          <a:lstStyle/>
-          <a:p>
-            <a:pPr algn="ctr">
-              <a:defRPr sz="1000" b="0">
-                <a:solidFill>
-                  <a:srgbClr val="1D1D4D"/>
-                </a:solidFill>
-              </a:defRPr>
-            </a:pPr>
-            <a:r>
-              <a:t>03 Apr</a:t>
-            </a:r>
-          </a:p>
-        </p:txBody>
-      </p:sp>
-      <p:sp>
-        <p:nvSpPr>
-          <p:cNvPr id="64" name="Rectangle 63"/>
-          <p:cNvSpPr/>
-          <p:nvPr/>
-        </p:nvSpPr>
-        <p:spPr>
-          <a:xfrm>
-            <a:off x="5760720" y="5943600"/>
-            <a:ext cx="731520" cy="320040"/>
-          </a:xfrm>
-          <a:prstGeom prst="rect">
-            <a:avLst/>
-          </a:prstGeom>
-          <a:solidFill>
-            <a:srgbClr val="36B37E"/>
-          </a:solidFill>
-          <a:ln w="6350">
-            <a:solidFill>
-              <a:srgbClr val="CCCCCC"/>
-            </a:solidFill>
-          </a:ln>
-        </p:spPr>
-        <p:style>
-          <a:lnRef idx="1">
-            <a:schemeClr val="accent1"/>
-          </a:lnRef>
-          <a:fillRef idx="3">
-            <a:schemeClr val="accent1"/>
-          </a:fillRef>
-          <a:effectRef idx="2">
-            <a:schemeClr val="accent1"/>
-          </a:effectRef>
-          <a:fontRef idx="minor">
-            <a:schemeClr val="lt1"/>
-          </a:fontRef>
-        </p:style>
-        <p:txBody>
-          <a:bodyPr rtlCol="0" anchor="ctr" wrap="square"/>
-          <a:lstStyle/>
-          <a:p>
-            <a:pPr algn="ctr">
-              <a:defRPr sz="1000" b="0">
-                <a:solidFill>
-                  <a:srgbClr val="FFFFFF"/>
-                </a:solidFill>
-              </a:defRPr>
-            </a:pPr>
-            <a:r>
-              <a:t>Green</a:t>
+              <a:t>4 Active Workstreams  •  3 Green / 1 Amber  •  Next milestone: Waracle 11 Feb</a:t>
             </a:r>
           </a:p>
         </p:txBody>

</xml_diff>